<commit_message>
Changes before error encountered
Co-authored-by: TLX542 <146343079+TLX542@users.noreply.github.com>
</commit_message>
<xml_diff>
--- a/GeoRace_presentation.pptx
+++ b/GeoRace_presentation.pptx
@@ -22,6 +22,10 @@
     <p:sldId id="270" r:id="rId16"/>
     <p:sldId id="271" r:id="rId17"/>
     <p:sldId id="272" r:id="rId18"/>
+    <p:sldId id="273" r:id="rId19"/>
+    <p:sldId id="274" r:id="rId20"/>
+    <p:sldId id="275" r:id="rId21"/>
+    <p:sldId id="276" r:id="rId22"/>
   </p:sldIdLst>
   <p:sldSz cx="9144000" cy="5143500" type="screen16x9"/>
   <p:notesSz cx="6858000" cy="9144000"/>
@@ -3210,7 +3214,7 @@
             </a:pPr>
             <a:r>
               <a:rPr/>
-              <a:t>🟦 Slide 9 – Fonctionnalités clés</a:t>
+              <a:t>🟦 Slide 9 – Quick demo (key points for presentation)</a:t>
             </a:r>
           </a:p>
         </p:txBody>
@@ -3235,62 +3239,86 @@
             </a:pPr>
             <a:r>
               <a:rPr b="1"/>
-              <a:t>Technologie au service de la performance</a:t>
+              <a:t>Presentation script - Key points to emphasize</a:t>
             </a:r>
           </a:p>
           <a:p>
             <a:pPr lvl="0"/>
             <a:r>
               <a:rPr b="1"/>
-              <a:t>GPS haute précision</a:t>
-            </a:r>
-            <a:r>
-              <a:rPr/>
-              <a:t> : tracking en temps réel pendant les duels</a:t>
+              <a:t>Equidistant finish point</a:t>
+            </a:r>
+            <a:r>
+              <a:rPr/>
+              <a:t>: “Each runner covers exactly the same distance - total fairness”</a:t>
             </a:r>
           </a:p>
           <a:p>
             <a:pPr lvl="0"/>
             <a:r>
               <a:rPr b="1"/>
-              <a:t>Algorithme intelligent</a:t>
-            </a:r>
-            <a:r>
-              <a:rPr/>
-              <a:t> : calcul de points équidistants accessibles</a:t>
+              <a:t>ELO Matchmaking</a:t>
+            </a:r>
+            <a:r>
+              <a:rPr/>
+              <a:t>: “You always face someone at your level - neither too easy nor impossible”</a:t>
             </a:r>
           </a:p>
           <a:p>
             <a:pPr lvl="0"/>
             <a:r>
               <a:rPr b="1"/>
-              <a:t>Sécurité</a:t>
-            </a:r>
-            <a:r>
-              <a:rPr/>
-              <a:t> : position visible uniquement en duel actif</a:t>
+              <a:t>Real-time duel</a:t>
+            </a:r>
+            <a:r>
+              <a:rPr/>
+              <a:t>: “No after-the-fact comparison - it’s a real race, now”</a:t>
             </a:r>
           </a:p>
           <a:p>
             <a:pPr lvl="0"/>
             <a:r>
               <a:rPr b="1"/>
-              <a:t>Anti-triche</a:t>
-            </a:r>
-            <a:r>
-              <a:rPr/>
-              <a:t> : détection de vitesse anormale et validation communautaire</a:t>
+              <a:t>Security and privacy</a:t>
+            </a:r>
+            <a:r>
+              <a:rPr/>
+              <a:t>: “Your position is only visible during active duels”</a:t>
             </a:r>
           </a:p>
           <a:p>
             <a:pPr lvl="0"/>
             <a:r>
               <a:rPr b="1"/>
-              <a:t>Optimisation batterie</a:t>
-            </a:r>
-            <a:r>
-              <a:rPr/>
-              <a:t> : mode économie d’énergie</a:t>
+              <a:t>Anti-cheat</a:t>
+            </a:r>
+            <a:r>
+              <a:rPr/>
+              <a:t>: “Automatic GPS anomaly detection - no cheaters”</a:t>
+            </a:r>
+          </a:p>
+          <a:p>
+            <a:pPr lvl="0"/>
+            <a:r>
+              <a:rPr b="1"/>
+              <a:t>Social engagement</a:t>
+            </a:r>
+            <a:r>
+              <a:rPr/>
+              <a:t>: “Profiles, chat, badges, local tournaments - a real community”</a:t>
+            </a:r>
+          </a:p>
+          <a:p>
+            <a:pPr lvl="0" indent="0" marL="0">
+              <a:buNone/>
+            </a:pPr>
+            <a:r>
+              <a:rPr b="1"/>
+              <a:t>Key message</a:t>
+            </a:r>
+            <a:r>
+              <a:rPr/>
+              <a:t>: Fair real-time dueling changes everything - it’s no longer tracking, it’s competition!</a:t>
             </a:r>
           </a:p>
         </p:txBody>
@@ -3337,7 +3365,7 @@
             </a:pPr>
             <a:r>
               <a:rPr/>
-              <a:t>🟦 Slide 10 – Cible</a:t>
+              <a:t>🟦 Slide 10 – Social aspect</a:t>
             </a:r>
           </a:p>
         </p:txBody>
@@ -3362,67 +3390,46 @@
             </a:pPr>
             <a:r>
               <a:rPr b="1"/>
-              <a:t>Qui utilise GeoRace ?</a:t>
-            </a:r>
-          </a:p>
-          <a:p>
-            <a:pPr lvl="0"/>
-            <a:r>
-              <a:rPr/>
-              <a:t>🏃‍♂️ </a:t>
-            </a:r>
-            <a:r>
-              <a:rPr b="1"/>
-              <a:t>Coureurs réguliers</a:t>
-            </a:r>
-            <a:r>
-              <a:rPr/>
-              <a:t> : cherchent à améliorer leurs performances</a:t>
-            </a:r>
-          </a:p>
-          <a:p>
-            <a:pPr lvl="0"/>
-            <a:r>
-              <a:rPr/>
-              <a:t>👟 </a:t>
-            </a:r>
-            <a:r>
-              <a:rPr b="1"/>
-              <a:t>Coureurs occasionnels</a:t>
-            </a:r>
-            <a:r>
-              <a:rPr/>
-              <a:t> : ont besoin de motivation pour rester réguliers</a:t>
-            </a:r>
-          </a:p>
-          <a:p>
-            <a:pPr lvl="0"/>
-            <a:r>
-              <a:rPr/>
-              <a:t>🏅 </a:t>
-            </a:r>
-            <a:r>
-              <a:rPr b="1"/>
-              <a:t>Coureurs compétitifs</a:t>
-            </a:r>
-            <a:r>
-              <a:rPr/>
-              <a:t> : veulent tester leur niveau entre les courses officielles</a:t>
-            </a:r>
-          </a:p>
-          <a:p>
-            <a:pPr lvl="0"/>
-            <a:r>
-              <a:rPr/>
-              <a:t>👥 </a:t>
-            </a:r>
-            <a:r>
-              <a:rPr b="1"/>
-              <a:t>Nouveaux coureurs</a:t>
-            </a:r>
-            <a:r>
-              <a:rPr/>
-              <a:t> : cherchent une communauté motivante</a:t>
+              <a:t>Build a runner community</a:t>
+            </a:r>
+          </a:p>
+          <a:p>
+            <a:pPr lvl="0" indent="0" marL="0">
+              <a:buNone/>
+            </a:pPr>
+            <a:r>
+              <a:rPr b="1"/>
+              <a:t>01 - BALANCED MATCHMAKING</a:t>
+            </a:r>
+            <a:r>
+              <a:rPr/>
+              <a:t> Automatic connection between runners of similar levels through ELO</a:t>
+            </a:r>
+          </a:p>
+          <a:p>
+            <a:pPr lvl="0" indent="0" marL="0">
+              <a:buNone/>
+            </a:pPr>
+            <a:r>
+              <a:rPr b="1"/>
+              <a:t>02 - DISCUSSION AND SHARING</a:t>
+            </a:r>
+            <a:r>
+              <a:rPr/>
+              <a:t> Live chat, friend adding, detailed profiles with statistics</a:t>
+            </a:r>
+          </a:p>
+          <a:p>
+            <a:pPr lvl="0" indent="0" marL="0">
+              <a:buNone/>
+            </a:pPr>
+            <a:r>
+              <a:rPr b="1"/>
+              <a:t>03 - COMMUNITY EVENTS</a:t>
+            </a:r>
+            <a:r>
+              <a:rPr/>
+              <a:t> Organized races, collective challenges, local leagues by city/neighborhood</a:t>
             </a:r>
           </a:p>
         </p:txBody>
@@ -3469,7 +3476,7 @@
             </a:pPr>
             <a:r>
               <a:rPr/>
-              <a:t>🟦 Slide 11 – Différenciation</a:t>
+              <a:t>🟦 Slide 11 – ELO ranking system</a:t>
             </a:r>
           </a:p>
         </p:txBody>
@@ -3494,67 +3501,46 @@
             </a:pPr>
             <a:r>
               <a:rPr b="1"/>
-              <a:t>Ce que les autres apps ne font pas :</a:t>
-            </a:r>
-          </a:p>
-          <a:p>
-            <a:pPr lvl="0"/>
-            <a:r>
-              <a:rPr b="1"/>
-              <a:t>Strava</a:t>
-            </a:r>
-            <a:r>
-              <a:rPr/>
-              <a:t> → réseau social, pas de compétition temps réel</a:t>
-            </a:r>
-          </a:p>
-          <a:p>
-            <a:pPr lvl="0"/>
-            <a:r>
-              <a:rPr b="1"/>
-              <a:t>Nike Run Club</a:t>
-            </a:r>
-            <a:r>
-              <a:rPr/>
-              <a:t> → tracking + défis asynchrones</a:t>
-            </a:r>
-          </a:p>
-          <a:p>
-            <a:pPr lvl="0"/>
-            <a:r>
-              <a:rPr b="1"/>
-              <a:t>Runkeeper</a:t>
-            </a:r>
-            <a:r>
-              <a:rPr/>
-              <a:t> → GPS basique sans interaction</a:t>
-            </a:r>
-          </a:p>
-          <a:p>
-            <a:pPr lvl="0" indent="0" marL="0">
-              <a:buNone/>
-            </a:pPr>
-            <a:r>
-              <a:rPr b="1"/>
-              <a:t>GeoRace combine :</a:t>
-            </a:r>
-          </a:p>
-          <a:p>
-            <a:pPr lvl="0" indent="0" marL="1270000">
-              <a:buNone/>
-            </a:pPr>
-            <a:r>
-              <a:rPr sz="2000"/>
-              <a:t>Duels spontanés en temps réel + Point d’arrivée équitable + Matchmaking ELO</a:t>
-            </a:r>
-          </a:p>
-          <a:p>
-            <a:pPr lvl="0" indent="0" marL="0">
-              <a:buNone/>
-            </a:pPr>
-            <a:r>
-              <a:rPr b="1"/>
-              <a:t>= Concept unique sur le marché</a:t>
+              <a:t>Fair competition and motivating progression</a:t>
+            </a:r>
+          </a:p>
+          <a:p>
+            <a:pPr lvl="0" indent="0" marL="0">
+              <a:buNone/>
+            </a:pPr>
+            <a:r>
+              <a:rPr b="1"/>
+              <a:t>01 - BALANCED MATCHES</a:t>
+            </a:r>
+            <a:r>
+              <a:rPr/>
+              <a:t> ELO algorithm pairs you with runners of similar level</a:t>
+            </a:r>
+          </a:p>
+          <a:p>
+            <a:pPr lvl="0" indent="0" marL="0">
+              <a:buNone/>
+            </a:pPr>
+            <a:r>
+              <a:rPr b="1"/>
+              <a:t>02 - VISIBLE PROGRESSION</a:t>
+            </a:r>
+            <a:r>
+              <a:rPr/>
+              <a:t> Track your rise in rankings (Bronze → Silver → Gold → Platinum)</a:t>
+            </a:r>
+          </a:p>
+          <a:p>
+            <a:pPr lvl="0" indent="0" marL="0">
+              <a:buNone/>
+            </a:pPr>
+            <a:r>
+              <a:rPr b="1"/>
+              <a:t>03 - REWARDS AND BADGES</a:t>
+            </a:r>
+            <a:r>
+              <a:rPr/>
+              <a:t> Unlock achievements at each level reached</a:t>
             </a:r>
           </a:p>
         </p:txBody>
@@ -3601,7 +3587,7 @@
             </a:pPr>
             <a:r>
               <a:rPr/>
-              <a:t>🟦 Slide 12 – Modèle économique</a:t>
+              <a:t>�� Slide 12 – GeoRace benefits</a:t>
             </a:r>
           </a:p>
         </p:txBody>
@@ -3626,46 +3612,46 @@
             </a:pPr>
             <a:r>
               <a:rPr b="1"/>
-              <a:t>Freemium avec valeur ajoutée</a:t>
-            </a:r>
-          </a:p>
-          <a:p>
-            <a:pPr lvl="0" indent="0" marL="0">
-              <a:buNone/>
-            </a:pPr>
-            <a:r>
-              <a:rPr b="1"/>
-              <a:t>Gratuit :</a:t>
-            </a:r>
-            <a:r>
-              <a:rPr/>
-              <a:t> * 3 duels par jour * Classement ELO * Statistiques de base * Événements communautaires</a:t>
-            </a:r>
-          </a:p>
-          <a:p>
-            <a:pPr lvl="0" indent="0" marL="0">
-              <a:buNone/>
-            </a:pPr>
-            <a:r>
-              <a:rPr b="1"/>
-              <a:t>Premium (4,99€/mois) :</a:t>
-            </a:r>
-            <a:r>
-              <a:rPr/>
-              <a:t> * Duels illimités * Statistiques avancées * Personnalisation profil * Mode entraînement contre vos records * Pas de publicités</a:t>
-            </a:r>
-          </a:p>
-          <a:p>
-            <a:pPr lvl="0" indent="0" marL="0">
-              <a:buNone/>
-            </a:pPr>
-            <a:r>
-              <a:rPr b="1"/>
-              <a:t>Revenus additionnels :</a:t>
-            </a:r>
-            <a:r>
-              <a:rPr/>
-              <a:t> * Partenariats marques (Nike, Adidas) * Événements premium avec prix</a:t>
+              <a:t>More than a running app</a:t>
+            </a:r>
+          </a:p>
+          <a:p>
+            <a:pPr lvl="0" indent="0" marL="0">
+              <a:buNone/>
+            </a:pPr>
+            <a:r>
+              <a:rPr b="1"/>
+              <a:t>01 - INCREASED MOTIVATION</a:t>
+            </a:r>
+            <a:r>
+              <a:rPr/>
+              <a:t> Each outing becomes a concrete and exciting challenge</a:t>
+            </a:r>
+          </a:p>
+          <a:p>
+            <a:pPr lvl="0" indent="0" marL="0">
+              <a:buNone/>
+            </a:pPr>
+            <a:r>
+              <a:rPr b="1"/>
+              <a:t>02 - PERFORMANCE IMPROVEMENT</a:t>
+            </a:r>
+            <a:r>
+              <a:rPr/>
+              <a:t> Competition naturally pushes self-improvement</a:t>
+            </a:r>
+          </a:p>
+          <a:p>
+            <a:pPr lvl="0" indent="0" marL="0">
+              <a:buNone/>
+            </a:pPr>
+            <a:r>
+              <a:rPr b="1"/>
+              <a:t>03 - SOCIAL WELL-BEING</a:t>
+            </a:r>
+            <a:r>
+              <a:rPr/>
+              <a:t> Meet and interact with other passionate runners</a:t>
             </a:r>
           </a:p>
         </p:txBody>
@@ -3712,7 +3698,7 @@
             </a:pPr>
             <a:r>
               <a:rPr/>
-              <a:t>🟦 Slide 13 – Roadmap</a:t>
+              <a:t>🟦 Slide 13 – Key features</a:t>
             </a:r>
           </a:p>
         </p:txBody>
@@ -3737,58 +3723,62 @@
             </a:pPr>
             <a:r>
               <a:rPr b="1"/>
-              <a:t>Déploiement progressif</a:t>
-            </a:r>
-          </a:p>
-          <a:p>
-            <a:pPr lvl="0" indent="0" marL="0">
-              <a:buNone/>
-            </a:pPr>
-            <a:r>
-              <a:rPr b="1"/>
-              <a:t>Phase 1 (6 mois) - MVP</a:t>
-            </a:r>
-            <a:r>
-              <a:rPr/>
-              <a:t> * Duels 1v1 en temps réel * Système ELO * Test dans 2-3 villes pilotes * </a:t>
-            </a:r>
-            <a:r>
-              <a:rPr b="1"/>
-              <a:t>Objectif : 500 utilisateurs actifs</a:t>
-            </a:r>
-          </a:p>
-          <a:p>
-            <a:pPr lvl="0" indent="0" marL="0">
-              <a:buNone/>
-            </a:pPr>
-            <a:r>
-              <a:rPr b="1"/>
-              <a:t>Phase 2 (12 mois) - Gamification</a:t>
-            </a:r>
-            <a:r>
-              <a:rPr/>
-              <a:t> * Badges, statistiques, profils * Événements communautaires * </a:t>
-            </a:r>
-            <a:r>
-              <a:rPr b="1"/>
-              <a:t>Objectif : 5 000 utilisateurs</a:t>
-            </a:r>
-          </a:p>
-          <a:p>
-            <a:pPr lvl="0" indent="0" marL="0">
-              <a:buNone/>
-            </a:pPr>
-            <a:r>
-              <a:rPr b="1"/>
-              <a:t>Phase 3 (24 mois) - Scale</a:t>
-            </a:r>
-            <a:r>
-              <a:rPr/>
-              <a:t> * Version Premium * Duels multi-joueurs * Expansion nationale * </a:t>
-            </a:r>
-            <a:r>
-              <a:rPr b="1"/>
-              <a:t>Objectif : 50 000 utilisateurs</a:t>
+              <a:t>Technology serving performance</a:t>
+            </a:r>
+          </a:p>
+          <a:p>
+            <a:pPr lvl="0"/>
+            <a:r>
+              <a:rPr b="1"/>
+              <a:t>High-precision GPS</a:t>
+            </a:r>
+            <a:r>
+              <a:rPr/>
+              <a:t>: real-time tracking during duels</a:t>
+            </a:r>
+          </a:p>
+          <a:p>
+            <a:pPr lvl="0"/>
+            <a:r>
+              <a:rPr b="1"/>
+              <a:t>Intelligent algorithm</a:t>
+            </a:r>
+            <a:r>
+              <a:rPr/>
+              <a:t>: calculation of accessible equidistant points</a:t>
+            </a:r>
+          </a:p>
+          <a:p>
+            <a:pPr lvl="0"/>
+            <a:r>
+              <a:rPr b="1"/>
+              <a:t>Security</a:t>
+            </a:r>
+            <a:r>
+              <a:rPr/>
+              <a:t>: position visible only during active duel</a:t>
+            </a:r>
+          </a:p>
+          <a:p>
+            <a:pPr lvl="0"/>
+            <a:r>
+              <a:rPr b="1"/>
+              <a:t>Anti-cheat</a:t>
+            </a:r>
+            <a:r>
+              <a:rPr/>
+              <a:t>: abnormal speed detection and community validation</a:t>
+            </a:r>
+          </a:p>
+          <a:p>
+            <a:pPr lvl="0"/>
+            <a:r>
+              <a:rPr b="1"/>
+              <a:t>Battery optimization</a:t>
+            </a:r>
+            <a:r>
+              <a:rPr/>
+              <a:t>: energy-saving mode</a:t>
             </a:r>
           </a:p>
         </p:txBody>
@@ -3835,7 +3825,7 @@
             </a:pPr>
             <a:r>
               <a:rPr/>
-              <a:t>🟦 Slide 14 – Défis &amp; Solutions</a:t>
+              <a:t>🟦 Slide 14 – Target audience</a:t>
             </a:r>
           </a:p>
         </p:txBody>
@@ -3860,59 +3850,67 @@
             </a:pPr>
             <a:r>
               <a:rPr b="1"/>
-              <a:t>Anticiper les obstacles</a:t>
-            </a:r>
-          </a:p>
-          <a:p>
-            <a:pPr lvl="0" indent="0" marL="0">
-              <a:buNone/>
-            </a:pPr>
-            <a:r>
-              <a:rPr b="1"/>
-              <a:t>Défi : Sécurité des coureurs</a:t>
-            </a:r>
-            <a:r>
-              <a:rPr/>
-              <a:t> → Alertes de sécurité, mode “course prudente”</a:t>
-            </a:r>
-          </a:p>
-          <a:p>
-            <a:pPr lvl="0" indent="0" marL="0">
-              <a:buNone/>
-            </a:pPr>
-            <a:r>
-              <a:rPr b="1"/>
-              <a:t>Défi : Zones rurales (peu d’utilisateurs)</a:t>
-            </a:r>
-            <a:r>
-              <a:rPr/>
-              <a:t> → Mode asynchrone contre “ghost runners”</a:t>
-            </a:r>
-          </a:p>
-          <a:p>
-            <a:pPr lvl="0" indent="0" marL="0">
-              <a:buNone/>
-            </a:pPr>
-            <a:r>
-              <a:rPr b="1"/>
-              <a:t>Défi : Triche (vélo, voiture)</a:t>
-            </a:r>
-            <a:r>
-              <a:rPr/>
-              <a:t> → Détection vitesse anormale + validation communautaire</a:t>
-            </a:r>
-          </a:p>
-          <a:p>
-            <a:pPr lvl="0" indent="0" marL="0">
-              <a:buNone/>
-            </a:pPr>
-            <a:r>
-              <a:rPr b="1"/>
-              <a:t>Défi : Vie privée</a:t>
-            </a:r>
-            <a:r>
-              <a:rPr/>
-              <a:t> → Position visible uniquement en duel, blocage d’utilisateurs</a:t>
+              <a:t>Who uses GeoRace?</a:t>
+            </a:r>
+          </a:p>
+          <a:p>
+            <a:pPr lvl="0"/>
+            <a:r>
+              <a:rPr/>
+              <a:t>🏃‍♂️ </a:t>
+            </a:r>
+            <a:r>
+              <a:rPr b="1"/>
+              <a:t>Regular runners</a:t>
+            </a:r>
+            <a:r>
+              <a:rPr/>
+              <a:t>: seeking to improve their performance</a:t>
+            </a:r>
+          </a:p>
+          <a:p>
+            <a:pPr lvl="0"/>
+            <a:r>
+              <a:rPr/>
+              <a:t>👟 </a:t>
+            </a:r>
+            <a:r>
+              <a:rPr b="1"/>
+              <a:t>Occasional runners</a:t>
+            </a:r>
+            <a:r>
+              <a:rPr/>
+              <a:t>: need motivation to stay consistent</a:t>
+            </a:r>
+          </a:p>
+          <a:p>
+            <a:pPr lvl="0"/>
+            <a:r>
+              <a:rPr/>
+              <a:t>🏅 </a:t>
+            </a:r>
+            <a:r>
+              <a:rPr b="1"/>
+              <a:t>Competitive runners</a:t>
+            </a:r>
+            <a:r>
+              <a:rPr/>
+              <a:t>: want to test their level between official races</a:t>
+            </a:r>
+          </a:p>
+          <a:p>
+            <a:pPr lvl="0"/>
+            <a:r>
+              <a:rPr/>
+              <a:t>👥 </a:t>
+            </a:r>
+            <a:r>
+              <a:rPr b="1"/>
+              <a:t>New runners</a:t>
+            </a:r>
+            <a:r>
+              <a:rPr/>
+              <a:t>: looking for a motivating community</a:t>
             </a:r>
           </a:p>
         </p:txBody>
@@ -3959,7 +3957,7 @@
             </a:pPr>
             <a:r>
               <a:rPr/>
-              <a:t>🟦 Slide 15 – Vision</a:t>
+              <a:t>🟦 Slide 15 – Differentiation vs competitors</a:t>
             </a:r>
           </a:p>
         </p:txBody>
@@ -3979,33 +3977,72 @@
           <a:bodyPr/>
           <a:lstStyle/>
           <a:p>
+            <a:pPr lvl="0" indent="0" marL="0">
+              <a:buNone/>
+            </a:pPr>
+            <a:r>
+              <a:rPr b="1"/>
+              <a:t>What other apps don’t do:</a:t>
+            </a:r>
+          </a:p>
+          <a:p>
+            <a:pPr lvl="0"/>
+            <a:r>
+              <a:rPr b="1"/>
+              <a:t>Strava</a:t>
+            </a:r>
+            <a:r>
+              <a:rPr/>
+              <a:t> → social network, no real-time competition</a:t>
+            </a:r>
+          </a:p>
+          <a:p>
+            <a:pPr lvl="0"/>
+            <a:r>
+              <a:rPr b="1"/>
+              <a:t>Nike Run Club</a:t>
+            </a:r>
+            <a:r>
+              <a:rPr/>
+              <a:t> → tracking + asynchronous challenges</a:t>
+            </a:r>
+          </a:p>
+          <a:p>
+            <a:pPr lvl="0"/>
+            <a:r>
+              <a:rPr b="1"/>
+              <a:t>Runkeeper</a:t>
+            </a:r>
+            <a:r>
+              <a:rPr/>
+              <a:t> → basic GPS without interaction</a:t>
+            </a:r>
+          </a:p>
+          <a:p>
+            <a:pPr lvl="0" indent="0" marL="0">
+              <a:buNone/>
+            </a:pPr>
+            <a:r>
+              <a:rPr b="1"/>
+              <a:t>GeoRace combines:</a:t>
+            </a:r>
+          </a:p>
+          <a:p>
             <a:pPr lvl="0" indent="0" marL="1270000">
               <a:buNone/>
             </a:pPr>
             <a:r>
               <a:rPr sz="2000"/>
-              <a:t>GeoRace ne se contente pas de tracker vos courses. Nous transformons la course à pied en une </a:t>
-            </a:r>
-            <a:r>
-              <a:rPr sz="2000" b="1"/>
-              <a:t>expérience sociale, compétitive et motivante</a:t>
-            </a:r>
-            <a:r>
-              <a:rPr sz="2000"/>
-              <a:t> accessible à tous, partout, à tout moment.</a:t>
-            </a:r>
-          </a:p>
-          <a:p>
-            <a:pPr lvl="0" indent="0" marL="0">
-              <a:buNone/>
-            </a:pPr>
-            <a:r>
-              <a:rPr b="1"/>
-              <a:t>Notre ambition :</a:t>
-            </a:r>
-            <a:r>
-              <a:rPr/>
-              <a:t> Devenir la référence de la course compétitive en temps réel et créer une communauté mondiale de coureurs passionnés par le défi.</a:t>
+              <a:t>Spontaneous real-time duels + Fair finish point + ELO Matchmaking</a:t>
+            </a:r>
+          </a:p>
+          <a:p>
+            <a:pPr lvl="0" indent="0" marL="0">
+              <a:buNone/>
+            </a:pPr>
+            <a:r>
+              <a:rPr b="1"/>
+              <a:t>= Unique concept in the market</a:t>
             </a:r>
           </a:p>
         </p:txBody>
@@ -4052,7 +4089,7 @@
             </a:pPr>
             <a:r>
               <a:rPr/>
-              <a:t>🟦 Slide 16 – Phrase finale</a:t>
+              <a:t>🟦 Slide 16 – Business model</a:t>
             </a:r>
           </a:p>
         </p:txBody>
@@ -4077,25 +4114,293 @@
             </a:pPr>
             <a:r>
               <a:rPr b="1"/>
-              <a:t>GeoRace</a:t>
-            </a:r>
-          </a:p>
-          <a:p>
-            <a:pPr lvl="0" indent="0" marL="1270000">
-              <a:buNone/>
-            </a:pPr>
-            <a:r>
-              <a:rPr sz="2000"/>
-              <a:t>Chaque course est un duel. Chaque duel est une opportunité. Transformez votre motivation.</a:t>
-            </a:r>
-          </a:p>
-          <a:p>
-            <a:pPr lvl="0" indent="0" marL="0">
-              <a:buNone/>
-            </a:pPr>
-            <a:r>
-              <a:rPr b="1"/>
-              <a:t>Prêt à relever le défi ?</a:t>
+              <a:t>Freemium with added value</a:t>
+            </a:r>
+          </a:p>
+          <a:p>
+            <a:pPr lvl="0" indent="0" marL="0">
+              <a:buNone/>
+            </a:pPr>
+            <a:r>
+              <a:rPr b="1"/>
+              <a:t>Free:</a:t>
+            </a:r>
+            <a:r>
+              <a:rPr/>
+              <a:t> * 3 duels per day * ELO ranking * Basic statistics * Community events</a:t>
+            </a:r>
+          </a:p>
+          <a:p>
+            <a:pPr lvl="0" indent="0" marL="0">
+              <a:buNone/>
+            </a:pPr>
+            <a:r>
+              <a:rPr b="1"/>
+              <a:t>Premium (€4.99/month):</a:t>
+            </a:r>
+            <a:r>
+              <a:rPr/>
+              <a:t> * Unlimited duels * Advanced statistics * Profile customization * Training mode against your records * No ads</a:t>
+            </a:r>
+          </a:p>
+          <a:p>
+            <a:pPr lvl="0" indent="0" marL="0">
+              <a:buNone/>
+            </a:pPr>
+            <a:r>
+              <a:rPr b="1"/>
+              <a:t>Additional revenues:</a:t>
+            </a:r>
+            <a:r>
+              <a:rPr/>
+              <a:t> * Brand partnerships (Nike, Adidas) * Premium events with prizes</a:t>
+            </a:r>
+          </a:p>
+        </p:txBody>
+      </p:sp>
+    </p:spTree>
+  </p:cSld>
+</p:sld>
+</file>
+
+<file path=ppt/slides/slide18.xml><?xml version="1.0" encoding="utf-8"?>
+<p:sld xmlns:a="http://schemas.openxmlformats.org/drawingml/2006/main" xmlns:r="http://schemas.openxmlformats.org/officeDocument/2006/relationships" xmlns:p="http://schemas.openxmlformats.org/presentationml/2006/main">
+  <p:cSld>
+    <p:spTree>
+      <p:nvGrpSpPr>
+        <p:cNvPr id="1" name=""/>
+        <p:cNvGrpSpPr/>
+        <p:nvPr/>
+      </p:nvGrpSpPr>
+      <p:grpSpPr>
+        <a:xfrm>
+          <a:off x="0" y="0"/>
+          <a:ext cx="0" cy="0"/>
+          <a:chOff x="0" y="0"/>
+          <a:chExt cx="0" cy="0"/>
+        </a:xfrm>
+      </p:grpSpPr>
+      <p:sp>
+        <p:nvSpPr>
+          <p:cNvPr id="2" name="Title 1"/>
+          <p:cNvSpPr>
+            <a:spLocks noGrp="1"/>
+          </p:cNvSpPr>
+          <p:nvPr>
+            <p:ph type="title"/>
+          </p:nvPr>
+        </p:nvSpPr>
+        <p:spPr/>
+        <p:txBody>
+          <a:bodyPr/>
+          <a:lstStyle/>
+          <a:p>
+            <a:pPr lvl="0" indent="0" marL="0">
+              <a:buNone/>
+            </a:pPr>
+            <a:r>
+              <a:rPr/>
+              <a:t>🟦 Slide 17 – Roadmap</a:t>
+            </a:r>
+          </a:p>
+        </p:txBody>
+      </p:sp>
+      <p:sp>
+        <p:nvSpPr>
+          <p:cNvPr id="3" name="Content Placeholder 2"/>
+          <p:cNvSpPr>
+            <a:spLocks noGrp="1"/>
+          </p:cNvSpPr>
+          <p:nvPr>
+            <p:ph idx="1"/>
+          </p:nvPr>
+        </p:nvSpPr>
+        <p:spPr/>
+        <p:txBody>
+          <a:bodyPr/>
+          <a:lstStyle/>
+          <a:p>
+            <a:pPr lvl="0" indent="0" marL="0">
+              <a:buNone/>
+            </a:pPr>
+            <a:r>
+              <a:rPr b="1"/>
+              <a:t>Progressive deployment</a:t>
+            </a:r>
+          </a:p>
+          <a:p>
+            <a:pPr lvl="0" indent="0" marL="0">
+              <a:buNone/>
+            </a:pPr>
+            <a:r>
+              <a:rPr b="1"/>
+              <a:t>Phase 1 (6 months) - MVP</a:t>
+            </a:r>
+            <a:r>
+              <a:rPr/>
+              <a:t> * 1v1 real-time duels * ELO system * Test in 2-3 pilot cities * </a:t>
+            </a:r>
+            <a:r>
+              <a:rPr b="1"/>
+              <a:t>Goal: 500 active users</a:t>
+            </a:r>
+          </a:p>
+          <a:p>
+            <a:pPr lvl="0" indent="0" marL="0">
+              <a:buNone/>
+            </a:pPr>
+            <a:r>
+              <a:rPr b="1"/>
+              <a:t>Phase 2 (12 months) - Gamification</a:t>
+            </a:r>
+            <a:r>
+              <a:rPr/>
+              <a:t> * Badges, statistics, profiles * Community events * </a:t>
+            </a:r>
+            <a:r>
+              <a:rPr b="1"/>
+              <a:t>Goal: 5,000 users</a:t>
+            </a:r>
+          </a:p>
+          <a:p>
+            <a:pPr lvl="0" indent="0" marL="0">
+              <a:buNone/>
+            </a:pPr>
+            <a:r>
+              <a:rPr b="1"/>
+              <a:t>Phase 3 (24 months) - Scale</a:t>
+            </a:r>
+            <a:r>
+              <a:rPr/>
+              <a:t> * Premium version * Multi-player duels * National expansion * </a:t>
+            </a:r>
+            <a:r>
+              <a:rPr b="1"/>
+              <a:t>Goal: 50,000 users</a:t>
+            </a:r>
+          </a:p>
+        </p:txBody>
+      </p:sp>
+    </p:spTree>
+  </p:cSld>
+</p:sld>
+</file>
+
+<file path=ppt/slides/slide19.xml><?xml version="1.0" encoding="utf-8"?>
+<p:sld xmlns:a="http://schemas.openxmlformats.org/drawingml/2006/main" xmlns:r="http://schemas.openxmlformats.org/officeDocument/2006/relationships" xmlns:p="http://schemas.openxmlformats.org/presentationml/2006/main">
+  <p:cSld>
+    <p:spTree>
+      <p:nvGrpSpPr>
+        <p:cNvPr id="1" name=""/>
+        <p:cNvGrpSpPr/>
+        <p:nvPr/>
+      </p:nvGrpSpPr>
+      <p:grpSpPr>
+        <a:xfrm>
+          <a:off x="0" y="0"/>
+          <a:ext cx="0" cy="0"/>
+          <a:chOff x="0" y="0"/>
+          <a:chExt cx="0" cy="0"/>
+        </a:xfrm>
+      </p:grpSpPr>
+      <p:sp>
+        <p:nvSpPr>
+          <p:cNvPr id="2" name="Title 1"/>
+          <p:cNvSpPr>
+            <a:spLocks noGrp="1"/>
+          </p:cNvSpPr>
+          <p:nvPr>
+            <p:ph type="title"/>
+          </p:nvPr>
+        </p:nvSpPr>
+        <p:spPr/>
+        <p:txBody>
+          <a:bodyPr/>
+          <a:lstStyle/>
+          <a:p>
+            <a:pPr lvl="0" indent="0" marL="0">
+              <a:buNone/>
+            </a:pPr>
+            <a:r>
+              <a:rPr/>
+              <a:t>🟦 Slide 18 – Challenges &amp; Solutions</a:t>
+            </a:r>
+          </a:p>
+        </p:txBody>
+      </p:sp>
+      <p:sp>
+        <p:nvSpPr>
+          <p:cNvPr id="3" name="Content Placeholder 2"/>
+          <p:cNvSpPr>
+            <a:spLocks noGrp="1"/>
+          </p:cNvSpPr>
+          <p:nvPr>
+            <p:ph idx="1"/>
+          </p:nvPr>
+        </p:nvSpPr>
+        <p:spPr/>
+        <p:txBody>
+          <a:bodyPr/>
+          <a:lstStyle/>
+          <a:p>
+            <a:pPr lvl="0" indent="0" marL="0">
+              <a:buNone/>
+            </a:pPr>
+            <a:r>
+              <a:rPr b="1"/>
+              <a:t>Anticipating obstacles</a:t>
+            </a:r>
+          </a:p>
+          <a:p>
+            <a:pPr lvl="0" indent="0" marL="0">
+              <a:buNone/>
+            </a:pPr>
+            <a:r>
+              <a:rPr b="1"/>
+              <a:t>Challenge: Runner safety</a:t>
+            </a:r>
+            <a:r>
+              <a:rPr/>
+              <a:t> → Safety alerts, “cautious race” mode</a:t>
+            </a:r>
+          </a:p>
+          <a:p>
+            <a:pPr lvl="0" indent="0" marL="0">
+              <a:buNone/>
+            </a:pPr>
+            <a:r>
+              <a:rPr b="1"/>
+              <a:t>Challenge: Rural areas (few users)</a:t>
+            </a:r>
+            <a:r>
+              <a:rPr/>
+              <a:t> → Asynchronous mode against “ghost runners”</a:t>
+            </a:r>
+          </a:p>
+          <a:p>
+            <a:pPr lvl="0" indent="0" marL="0">
+              <a:buNone/>
+            </a:pPr>
+            <a:r>
+              <a:rPr b="1"/>
+              <a:t>Challenge: Cheating (bike, car)</a:t>
+            </a:r>
+            <a:r>
+              <a:rPr/>
+              <a:t> → Abnormal speed detection + community validation</a:t>
+            </a:r>
+          </a:p>
+          <a:p>
+            <a:pPr lvl="0" indent="0" marL="0">
+              <a:buNone/>
+            </a:pPr>
+            <a:r>
+              <a:rPr b="1"/>
+              <a:t>Challenge: Privacy</a:t>
+            </a:r>
+            <a:r>
+              <a:rPr/>
+              <a:t> → Position visible only during duel, user blocking</a:t>
             </a:r>
           </a:p>
         </p:txBody>
@@ -4142,7 +4447,7 @@
             </a:pPr>
             <a:r>
               <a:rPr/>
-              <a:t>🟦 Slide 1 – Titre</a:t>
+              <a:t>🟦 Slide 1 – Title</a:t>
             </a:r>
           </a:p>
         </p:txBody>
@@ -4176,20 +4481,203 @@
             </a:pPr>
             <a:r>
               <a:rPr sz="2000"/>
-              <a:t>L’application de course compétitive en temps réel</a:t>
-            </a:r>
-          </a:p>
-          <a:p>
-            <a:pPr lvl="0" indent="0" marL="0">
-              <a:buNone/>
-            </a:pPr>
-            <a:r>
-              <a:rPr b="1"/>
-              <a:t>Sous‑titre :</a:t>
-            </a:r>
-            <a:r>
-              <a:rPr/>
-              <a:t> Transformez chaque sortie running en duel excitant.</a:t>
+              <a:t>The real-time competitive running app</a:t>
+            </a:r>
+          </a:p>
+          <a:p>
+            <a:pPr lvl="0" indent="0" marL="0">
+              <a:buNone/>
+            </a:pPr>
+            <a:r>
+              <a:rPr b="1"/>
+              <a:t>Subtitle:</a:t>
+            </a:r>
+            <a:r>
+              <a:rPr/>
+              <a:t> Turn every run into an exciting duel.</a:t>
+            </a:r>
+          </a:p>
+        </p:txBody>
+      </p:sp>
+    </p:spTree>
+  </p:cSld>
+</p:sld>
+</file>
+
+<file path=ppt/slides/slide20.xml><?xml version="1.0" encoding="utf-8"?>
+<p:sld xmlns:a="http://schemas.openxmlformats.org/drawingml/2006/main" xmlns:r="http://schemas.openxmlformats.org/officeDocument/2006/relationships" xmlns:p="http://schemas.openxmlformats.org/presentationml/2006/main">
+  <p:cSld>
+    <p:spTree>
+      <p:nvGrpSpPr>
+        <p:cNvPr id="1" name=""/>
+        <p:cNvGrpSpPr/>
+        <p:nvPr/>
+      </p:nvGrpSpPr>
+      <p:grpSpPr>
+        <a:xfrm>
+          <a:off x="0" y="0"/>
+          <a:ext cx="0" cy="0"/>
+          <a:chOff x="0" y="0"/>
+          <a:chExt cx="0" cy="0"/>
+        </a:xfrm>
+      </p:grpSpPr>
+      <p:sp>
+        <p:nvSpPr>
+          <p:cNvPr id="2" name="Title 1"/>
+          <p:cNvSpPr>
+            <a:spLocks noGrp="1"/>
+          </p:cNvSpPr>
+          <p:nvPr>
+            <p:ph type="title"/>
+          </p:nvPr>
+        </p:nvSpPr>
+        <p:spPr/>
+        <p:txBody>
+          <a:bodyPr/>
+          <a:lstStyle/>
+          <a:p>
+            <a:pPr lvl="0" indent="0" marL="0">
+              <a:buNone/>
+            </a:pPr>
+            <a:r>
+              <a:rPr/>
+              <a:t>🟦 Slide 19 – Vision</a:t>
+            </a:r>
+          </a:p>
+        </p:txBody>
+      </p:sp>
+      <p:sp>
+        <p:nvSpPr>
+          <p:cNvPr id="3" name="Content Placeholder 2"/>
+          <p:cNvSpPr>
+            <a:spLocks noGrp="1"/>
+          </p:cNvSpPr>
+          <p:nvPr>
+            <p:ph idx="1"/>
+          </p:nvPr>
+        </p:nvSpPr>
+        <p:spPr/>
+        <p:txBody>
+          <a:bodyPr/>
+          <a:lstStyle/>
+          <a:p>
+            <a:pPr lvl="0" indent="0" marL="1270000">
+              <a:buNone/>
+            </a:pPr>
+            <a:r>
+              <a:rPr sz="2000"/>
+              <a:t>GeoRace doesn’t just track your runs. We transform running into a </a:t>
+            </a:r>
+            <a:r>
+              <a:rPr sz="2000" b="1"/>
+              <a:t>social, competitive, and motivating experience</a:t>
+            </a:r>
+            <a:r>
+              <a:rPr sz="2000"/>
+              <a:t> accessible to everyone, everywhere, anytime.</a:t>
+            </a:r>
+          </a:p>
+          <a:p>
+            <a:pPr lvl="0" indent="0" marL="0">
+              <a:buNone/>
+            </a:pPr>
+            <a:r>
+              <a:rPr b="1"/>
+              <a:t>Our ambition:</a:t>
+            </a:r>
+            <a:r>
+              <a:rPr/>
+              <a:t> Become the reference for real-time competitive running and create a global community of runners passionate about challenges.</a:t>
+            </a:r>
+          </a:p>
+        </p:txBody>
+      </p:sp>
+    </p:spTree>
+  </p:cSld>
+</p:sld>
+</file>
+
+<file path=ppt/slides/slide21.xml><?xml version="1.0" encoding="utf-8"?>
+<p:sld xmlns:a="http://schemas.openxmlformats.org/drawingml/2006/main" xmlns:r="http://schemas.openxmlformats.org/officeDocument/2006/relationships" xmlns:p="http://schemas.openxmlformats.org/presentationml/2006/main">
+  <p:cSld>
+    <p:spTree>
+      <p:nvGrpSpPr>
+        <p:cNvPr id="1" name=""/>
+        <p:cNvGrpSpPr/>
+        <p:nvPr/>
+      </p:nvGrpSpPr>
+      <p:grpSpPr>
+        <a:xfrm>
+          <a:off x="0" y="0"/>
+          <a:ext cx="0" cy="0"/>
+          <a:chOff x="0" y="0"/>
+          <a:chExt cx="0" cy="0"/>
+        </a:xfrm>
+      </p:grpSpPr>
+      <p:sp>
+        <p:nvSpPr>
+          <p:cNvPr id="2" name="Title 1"/>
+          <p:cNvSpPr>
+            <a:spLocks noGrp="1"/>
+          </p:cNvSpPr>
+          <p:nvPr>
+            <p:ph type="title"/>
+          </p:nvPr>
+        </p:nvSpPr>
+        <p:spPr/>
+        <p:txBody>
+          <a:bodyPr/>
+          <a:lstStyle/>
+          <a:p>
+            <a:pPr lvl="0" indent="0" marL="0">
+              <a:buNone/>
+            </a:pPr>
+            <a:r>
+              <a:rPr/>
+              <a:t>🟦 Slide 20 – Final message</a:t>
+            </a:r>
+          </a:p>
+        </p:txBody>
+      </p:sp>
+      <p:sp>
+        <p:nvSpPr>
+          <p:cNvPr id="3" name="Content Placeholder 2"/>
+          <p:cNvSpPr>
+            <a:spLocks noGrp="1"/>
+          </p:cNvSpPr>
+          <p:nvPr>
+            <p:ph idx="1"/>
+          </p:nvPr>
+        </p:nvSpPr>
+        <p:spPr/>
+        <p:txBody>
+          <a:bodyPr/>
+          <a:lstStyle/>
+          <a:p>
+            <a:pPr lvl="0" indent="0" marL="0">
+              <a:buNone/>
+            </a:pPr>
+            <a:r>
+              <a:rPr b="1"/>
+              <a:t>GeoRace</a:t>
+            </a:r>
+          </a:p>
+          <a:p>
+            <a:pPr lvl="0" indent="0" marL="1270000">
+              <a:buNone/>
+            </a:pPr>
+            <a:r>
+              <a:rPr sz="2000"/>
+              <a:t>Every run is a duel. Every duel is an opportunity. Transform your motivation.</a:t>
+            </a:r>
+          </a:p>
+          <a:p>
+            <a:pPr lvl="0" indent="0" marL="0">
+              <a:buNone/>
+            </a:pPr>
+            <a:r>
+              <a:rPr b="1"/>
+              <a:t>Ready to take on the challenge?</a:t>
             </a:r>
           </a:p>
         </p:txBody>
@@ -4236,7 +4724,7 @@
             </a:pPr>
             <a:r>
               <a:rPr/>
-              <a:t>🟦 Slide 2 – Problème</a:t>
+              <a:t>🟦 Slide 2 – Problem</a:t>
             </a:r>
           </a:p>
         </p:txBody>
@@ -4261,44 +4749,44 @@
             </a:pPr>
             <a:r>
               <a:rPr b="1"/>
-              <a:t>Courir seul, une motivation en berne</a:t>
+              <a:t>Running alone, declining motivation</a:t>
             </a:r>
           </a:p>
           <a:p>
             <a:pPr lvl="0"/>
             <a:r>
               <a:rPr/>
-              <a:t>De nombreux coureurs se sentent démotivés seuls</a:t>
+              <a:t>Many runners feel demotivated when running alone</a:t>
             </a:r>
           </a:p>
           <a:p>
             <a:pPr lvl="0"/>
             <a:r>
               <a:rPr/>
-              <a:t>Manque de défi et d’interaction</a:t>
+              <a:t>Lack of challenge and interaction</a:t>
             </a:r>
           </a:p>
           <a:p>
             <a:pPr lvl="0"/>
             <a:r>
               <a:rPr/>
-              <a:t>Difficulté à mesurer ses progrès face à d’autres</a:t>
+              <a:t>Difficulty measuring progress against others</a:t>
             </a:r>
           </a:p>
           <a:p>
             <a:pPr lvl="0"/>
             <a:r>
               <a:rPr/>
-              <a:t>Risque d’abandon des objectifs sportifs</a:t>
-            </a:r>
-          </a:p>
-          <a:p>
-            <a:pPr lvl="0" indent="0" marL="0">
-              <a:buNone/>
-            </a:pPr>
-            <a:r>
-              <a:rPr/>
-              <a:t>➡ Résultat : monotonie, perte de motivation, arrêt de la pratique</a:t>
+              <a:t>Risk of abandoning fitness goals</a:t>
+            </a:r>
+          </a:p>
+          <a:p>
+            <a:pPr lvl="0" indent="0" marL="0">
+              <a:buNone/>
+            </a:pPr>
+            <a:r>
+              <a:rPr/>
+              <a:t>➡ Result: monotony, loss of motivation, practice abandonment</a:t>
             </a:r>
           </a:p>
         </p:txBody>
@@ -4345,7 +4833,7 @@
             </a:pPr>
             <a:r>
               <a:rPr/>
-              <a:t>🟦 Slide 3 – Concept innovant</a:t>
+              <a:t>🟦 Slide 3 – Our differentiators</a:t>
             </a:r>
           </a:p>
         </p:txBody>
@@ -4370,58 +4858,73 @@
             </a:pPr>
             <a:r>
               <a:rPr b="1"/>
-              <a:t>Duels en temps réel pour tous</a:t>
-            </a:r>
-          </a:p>
-          <a:p>
-            <a:pPr lvl="0" indent="0" marL="0">
-              <a:buNone/>
-            </a:pPr>
-            <a:r>
-              <a:rPr/>
-              <a:t>🏃 </a:t>
-            </a:r>
-            <a:r>
-              <a:rPr b="1"/>
-              <a:t>DUELS EN TEMPS RÉEL</a:t>
-            </a:r>
-            <a:r>
-              <a:rPr/>
-              <a:t> Affrontez d’autres coureurs à proximité dans des courses spontanées</a:t>
-            </a:r>
-          </a:p>
-          <a:p>
-            <a:pPr lvl="0" indent="0" marL="0">
-              <a:buNone/>
-            </a:pPr>
-            <a:r>
-              <a:rPr/>
-              <a:t>📍 </a:t>
-            </a:r>
-            <a:r>
-              <a:rPr b="1"/>
-              <a:t>POINT D’ARRIVÉE ÉQUITABLE</a:t>
-            </a:r>
-            <a:r>
-              <a:rPr/>
-              <a:t> Chaque duel se termine à un point équidistant pour tous les participants</a:t>
-            </a:r>
-          </a:p>
-          <a:p>
-            <a:pPr lvl="0" indent="0" marL="0">
-              <a:buNone/>
-            </a:pPr>
-            <a:r>
-              <a:rPr/>
-              <a:t>⚖️ </a:t>
-            </a:r>
-            <a:r>
-              <a:rPr b="1"/>
-              <a:t>COMPÉTITION JUSTE</a:t>
-            </a:r>
-            <a:r>
-              <a:rPr/>
-              <a:t> Système ELO garantit des matchs équilibrés quel que soit votre niveau</a:t>
+              <a:t>What makes GeoRace unique</a:t>
+            </a:r>
+          </a:p>
+          <a:p>
+            <a:pPr lvl="0"/>
+            <a:r>
+              <a:rPr b="1"/>
+              <a:t>Real-time duel to an equidistant finish point</a:t>
+            </a:r>
+            <a:r>
+              <a:rPr/>
+              <a:t> → guaranteed fairness between runners</a:t>
+            </a:r>
+          </a:p>
+          <a:p>
+            <a:pPr lvl="0"/>
+            <a:r>
+              <a:rPr b="1"/>
+              <a:t>ELO Matchmaking</a:t>
+            </a:r>
+            <a:r>
+              <a:rPr/>
+              <a:t> → opponents of comparable level, visible progression</a:t>
+            </a:r>
+          </a:p>
+          <a:p>
+            <a:pPr lvl="0"/>
+            <a:r>
+              <a:rPr b="1"/>
+              <a:t>Live GPS &amp; synchronized tracking</a:t>
+            </a:r>
+            <a:r>
+              <a:rPr/>
+              <a:t> → immediate competitive experience</a:t>
+            </a:r>
+          </a:p>
+          <a:p>
+            <a:pPr lvl="0"/>
+            <a:r>
+              <a:rPr b="1"/>
+              <a:t>Privacy and security</a:t>
+            </a:r>
+            <a:r>
+              <a:rPr/>
+              <a:t> → position sharing limited to active duels</a:t>
+            </a:r>
+          </a:p>
+          <a:p>
+            <a:pPr lvl="0"/>
+            <a:r>
+              <a:rPr b="1"/>
+              <a:t>Integrated anti-cheat</a:t>
+            </a:r>
+            <a:r>
+              <a:rPr/>
+              <a:t> (GPS anomaly detection, route verification)</a:t>
+            </a:r>
+          </a:p>
+          <a:p>
+            <a:pPr lvl="0"/>
+            <a:r>
+              <a:rPr b="1"/>
+              <a:t>Social features</a:t>
+            </a:r>
+            <a:r>
+              <a:rPr/>
+              <a:t> → profiles, chat, badges, local leaderboards</a:t>
             </a:r>
           </a:p>
         </p:txBody>
@@ -4468,7 +4971,7 @@
             </a:pPr>
             <a:r>
               <a:rPr/>
-              <a:t>🟦 Slide 4 – Fonctionnement d’un duel</a:t>
+              <a:t>🟦 Slide 4 – Why users will join us</a:t>
             </a:r>
           </a:p>
         </p:txBody>
@@ -4493,46 +4996,51 @@
             </a:pPr>
             <a:r>
               <a:rPr b="1"/>
-              <a:t>3 étapes simples</a:t>
-            </a:r>
-          </a:p>
-          <a:p>
-            <a:pPr lvl="0" indent="0" marL="0">
-              <a:buNone/>
-            </a:pPr>
-            <a:r>
-              <a:rPr b="1"/>
-              <a:t>01 - DÉTECTION DES COUREURS</a:t>
-            </a:r>
-            <a:r>
-              <a:rPr/>
-              <a:t> Identification automatique des coureurs actifs à proximité</a:t>
-            </a:r>
-          </a:p>
-          <a:p>
-            <a:pPr lvl="0" indent="0" marL="0">
-              <a:buNone/>
-            </a:pPr>
-            <a:r>
-              <a:rPr b="1"/>
-              <a:t>02 - POINT D’ARRIVÉE ÉQUITABLE</a:t>
-            </a:r>
-            <a:r>
-              <a:rPr/>
-              <a:t> Calcul algorithmique d’un point accessible à distance ��gale pour tous</a:t>
-            </a:r>
-          </a:p>
-          <a:p>
-            <a:pPr lvl="0" indent="0" marL="0">
-              <a:buNone/>
-            </a:pPr>
-            <a:r>
-              <a:rPr b="1"/>
-              <a:t>03 - DÉPART SIMULTANÉ</a:t>
-            </a:r>
-            <a:r>
-              <a:rPr/>
-              <a:t> Compte à rebours synchronisé après acceptation mutuelle</a:t>
+              <a:t>Reasons to switch to GeoRace</a:t>
+            </a:r>
+          </a:p>
+          <a:p>
+            <a:pPr lvl="0"/>
+            <a:r>
+              <a:rPr b="1"/>
+              <a:t>Unique and fair duel experience</a:t>
+            </a:r>
+            <a:r>
+              <a:rPr/>
+              <a:t> = more fun and challenge</a:t>
+            </a:r>
+          </a:p>
+          <a:p>
+            <a:pPr lvl="0"/>
+            <a:r>
+              <a:rPr b="1"/>
+              <a:t>Visible progression (ELO)</a:t>
+            </a:r>
+            <a:r>
+              <a:rPr/>
+              <a:t> = motivation to return</a:t>
+            </a:r>
+          </a:p>
+          <a:p>
+            <a:pPr lvl="0"/>
+            <a:r>
+              <a:rPr b="1"/>
+              <a:t>Local events &amp; tournaments</a:t>
+            </a:r>
+            <a:r>
+              <a:rPr/>
+              <a:t> = social opportunities and rewards</a:t>
+            </a:r>
+          </a:p>
+          <a:p>
+            <a:pPr lvl="0"/>
+            <a:r>
+              <a:rPr b="1"/>
+              <a:t>Easy friend transfer</a:t>
+            </a:r>
+            <a:r>
+              <a:rPr/>
+              <a:t> via invitations and immediate duels</a:t>
             </a:r>
           </a:p>
         </p:txBody>
@@ -4579,7 +5087,7 @@
             </a:pPr>
             <a:r>
               <a:rPr/>
-              <a:t>🟦 Slide 5 – Un duel GeoRace</a:t>
+              <a:t>🟦 Slide 5 – Acquisition strategy (how to steal users from competitors)</a:t>
             </a:r>
           </a:p>
         </p:txBody>
@@ -4604,85 +5112,73 @@
             </a:pPr>
             <a:r>
               <a:rPr b="1"/>
-              <a:t>Scénario typique :</a:t>
-            </a:r>
-          </a:p>
-          <a:p>
-            <a:pPr lvl="0" indent="-342900" marL="342900">
-              <a:buAutoNum type="arabicPeriod"/>
-            </a:pPr>
-            <a:r>
-              <a:rPr b="1"/>
-              <a:t>Vous commencez votre course</a:t>
-            </a:r>
-            <a:r>
-              <a:rPr/>
-              <a:t> → l’app détecte 3 coureurs dans un rayon de 800m</a:t>
-            </a:r>
-          </a:p>
-          <a:p>
-            <a:pPr lvl="0" indent="-342900" marL="342900">
-              <a:buAutoNum type="arabicPeriod"/>
-            </a:pPr>
-            <a:r>
-              <a:rPr b="1"/>
-              <a:t>Proposition de duel</a:t>
-            </a:r>
-            <a:r>
-              <a:rPr/>
-              <a:t> → notification “Paul (ELO 1420) vous défie”</a:t>
-            </a:r>
-          </a:p>
-          <a:p>
-            <a:pPr lvl="0" indent="-342900" marL="342900">
-              <a:buAutoNum type="arabicPeriod"/>
-            </a:pPr>
-            <a:r>
-              <a:rPr b="1"/>
-              <a:t>Vous acceptez</a:t>
-            </a:r>
-            <a:r>
-              <a:rPr/>
-              <a:t> → le système calcule un point d’arrivée à 1,2km pour chacun</a:t>
-            </a:r>
-          </a:p>
-          <a:p>
-            <a:pPr lvl="0" indent="-342900" marL="342900">
-              <a:buAutoNum type="arabicPeriod"/>
-            </a:pPr>
-            <a:r>
-              <a:rPr b="1"/>
-              <a:t>Départ dans 10 secondes</a:t>
-            </a:r>
-            <a:r>
-              <a:rPr/>
-              <a:t> → compte à rebours</a:t>
-            </a:r>
-          </a:p>
-          <a:p>
-            <a:pPr lvl="0" indent="-342900" marL="342900">
-              <a:buAutoNum type="arabicPeriod"/>
-            </a:pPr>
-            <a:r>
-              <a:rPr b="1"/>
-              <a:t>Course en direct</a:t>
-            </a:r>
-            <a:r>
-              <a:rPr/>
-              <a:t> → GPS vous guide, position de l’adversaire visible</a:t>
-            </a:r>
-          </a:p>
-          <a:p>
-            <a:pPr lvl="0" indent="-342900" marL="342900">
-              <a:buAutoNum type="arabicPeriod"/>
-            </a:pPr>
-            <a:r>
-              <a:rPr b="1"/>
-              <a:t>Arrivée</a:t>
-            </a:r>
-            <a:r>
-              <a:rPr/>
-              <a:t> → +25 ELO, badge “5 victoires consécutives” débloqué</a:t>
+              <a:t>Concrete tactics to attract users</a:t>
+            </a:r>
+          </a:p>
+          <a:p>
+            <a:pPr lvl="0"/>
+            <a:r>
+              <a:rPr b="1"/>
+              <a:t>Local targeting</a:t>
+            </a:r>
+            <a:r>
+              <a:rPr/>
+              <a:t>: organize micro-events and challenges in parks and campuses</a:t>
+            </a:r>
+          </a:p>
+          <a:p>
+            <a:pPr lvl="0"/>
+            <a:r>
+              <a:rPr b="1"/>
+              <a:t>Partnerships</a:t>
+            </a:r>
+            <a:r>
+              <a:rPr/>
+              <a:t> with running clubs, coaches, local influencers</a:t>
+            </a:r>
+          </a:p>
+          <a:p>
+            <a:pPr lvl="0"/>
+            <a:r>
+              <a:rPr b="1"/>
+              <a:t>Integrations &amp; entry point</a:t>
+            </a:r>
+            <a:r>
+              <a:rPr/>
+              <a:t>: simplified import from Strava/Runkeeper + friend import</a:t>
+            </a:r>
+          </a:p>
+          <a:p>
+            <a:pPr lvl="0"/>
+            <a:r>
+              <a:rPr b="1"/>
+              <a:t>Incentive programs</a:t>
+            </a:r>
+            <a:r>
+              <a:rPr/>
+              <a:t>: free duels/initial ELO bonus, rewards, exclusive badges</a:t>
+            </a:r>
+          </a:p>
+          <a:p>
+            <a:pPr lvl="0"/>
+            <a:r>
+              <a:rPr b="1"/>
+              <a:t>Social media campaigns</a:t>
+            </a:r>
+            <a:r>
+              <a:rPr/>
+              <a:t> showing live duels + user stories</a:t>
+            </a:r>
+          </a:p>
+          <a:p>
+            <a:pPr lvl="0"/>
+            <a:r>
+              <a:rPr b="1"/>
+              <a:t>Differentiating features in onboarding</a:t>
+            </a:r>
+            <a:r>
+              <a:rPr/>
+              <a:t> (30s duel demonstration)</a:t>
             </a:r>
           </a:p>
         </p:txBody>
@@ -4729,7 +5225,7 @@
             </a:pPr>
             <a:r>
               <a:rPr/>
-              <a:t>🟦 Slide 6 – Aspect social</a:t>
+              <a:t>🟦 Slide 6 – Innovative concept: Duel mode</a:t>
             </a:r>
           </a:p>
         </p:txBody>
@@ -4754,46 +5250,58 @@
             </a:pPr>
             <a:r>
               <a:rPr b="1"/>
-              <a:t>Construisez une communauté de coureurs</a:t>
-            </a:r>
-          </a:p>
-          <a:p>
-            <a:pPr lvl="0" indent="0" marL="0">
-              <a:buNone/>
-            </a:pPr>
-            <a:r>
-              <a:rPr b="1"/>
-              <a:t>01 - MATCHMAKING ÉQUILIBRÉ</a:t>
-            </a:r>
-            <a:r>
-              <a:rPr/>
-              <a:t> Connexion automatique entre coureurs de niveaux similaires grâce à l’ELO</a:t>
-            </a:r>
-          </a:p>
-          <a:p>
-            <a:pPr lvl="0" indent="0" marL="0">
-              <a:buNone/>
-            </a:pPr>
-            <a:r>
-              <a:rPr b="1"/>
-              <a:t>02 - DISCUSSION ET PARTAGE</a:t>
-            </a:r>
-            <a:r>
-              <a:rPr/>
-              <a:t> Chat en direct, ajout d’amis, profils détaillés avec statistiques</a:t>
-            </a:r>
-          </a:p>
-          <a:p>
-            <a:pPr lvl="0" indent="0" marL="0">
-              <a:buNone/>
-            </a:pPr>
-            <a:r>
-              <a:rPr b="1"/>
-              <a:t>03 - ÉVÉNEMENTS COMMUNAUTAIRES</a:t>
-            </a:r>
-            <a:r>
-              <a:rPr/>
-              <a:t> Courses organisées, défis collectifs, ligues locales par ville/quartier</a:t>
+              <a:t>Real-time duels for everyone</a:t>
+            </a:r>
+          </a:p>
+          <a:p>
+            <a:pPr lvl="0" indent="0" marL="0">
+              <a:buNone/>
+            </a:pPr>
+            <a:r>
+              <a:rPr/>
+              <a:t>🏃 </a:t>
+            </a:r>
+            <a:r>
+              <a:rPr b="1"/>
+              <a:t>REAL-TIME DUELS</a:t>
+            </a:r>
+            <a:r>
+              <a:rPr/>
+              <a:t> Face other nearby runners in spontaneous races</a:t>
+            </a:r>
+          </a:p>
+          <a:p>
+            <a:pPr lvl="0" indent="0" marL="0">
+              <a:buNone/>
+            </a:pPr>
+            <a:r>
+              <a:rPr/>
+              <a:t>📍 </a:t>
+            </a:r>
+            <a:r>
+              <a:rPr b="1"/>
+              <a:t>FAIR FINISH POINT</a:t>
+            </a:r>
+            <a:r>
+              <a:rPr/>
+              <a:t> Each duel ends at an equidistant point for all participants</a:t>
+            </a:r>
+          </a:p>
+          <a:p>
+            <a:pPr lvl="0" indent="0" marL="0">
+              <a:buNone/>
+            </a:pPr>
+            <a:r>
+              <a:rPr/>
+              <a:t>⚖️ </a:t>
+            </a:r>
+            <a:r>
+              <a:rPr b="1"/>
+              <a:t>FAIR COMPETITION</a:t>
+            </a:r>
+            <a:r>
+              <a:rPr/>
+              <a:t> ELO system ensures balanced matches regardless of your level</a:t>
             </a:r>
           </a:p>
         </p:txBody>
@@ -4840,7 +5348,7 @@
             </a:pPr>
             <a:r>
               <a:rPr/>
-              <a:t>🟦 Slide 7 – Système de classement ELO</a:t>
+              <a:t>🟦 Slide 7 – How a duel works</a:t>
             </a:r>
           </a:p>
         </p:txBody>
@@ -4865,46 +5373,46 @@
             </a:pPr>
             <a:r>
               <a:rPr b="1"/>
-              <a:t>Compétition équitable et progression motivante</a:t>
-            </a:r>
-          </a:p>
-          <a:p>
-            <a:pPr lvl="0" indent="0" marL="0">
-              <a:buNone/>
-            </a:pPr>
-            <a:r>
-              <a:rPr b="1"/>
-              <a:t>01 - MATCHS ÉQUILIBRÉS</a:t>
-            </a:r>
-            <a:r>
-              <a:rPr/>
-              <a:t> Algorithme ELO vous oppose à des coureurs de niveau proche</a:t>
-            </a:r>
-          </a:p>
-          <a:p>
-            <a:pPr lvl="0" indent="0" marL="0">
-              <a:buNone/>
-            </a:pPr>
-            <a:r>
-              <a:rPr b="1"/>
-              <a:t>02 - PROGRESSION VISIBLE</a:t>
-            </a:r>
-            <a:r>
-              <a:rPr/>
-              <a:t> Suivez votre montée dans les classements (Bronze → Argent → Or → Platine)</a:t>
-            </a:r>
-          </a:p>
-          <a:p>
-            <a:pPr lvl="0" indent="0" marL="0">
-              <a:buNone/>
-            </a:pPr>
-            <a:r>
-              <a:rPr b="1"/>
-              <a:t>03 - RÉCOMPENSES ET BADGES</a:t>
-            </a:r>
-            <a:r>
-              <a:rPr/>
-              <a:t> Débloquez des achievements à chaque niveau atteint</a:t>
+              <a:t>3 simple steps</a:t>
+            </a:r>
+          </a:p>
+          <a:p>
+            <a:pPr lvl="0" indent="0" marL="0">
+              <a:buNone/>
+            </a:pPr>
+            <a:r>
+              <a:rPr b="1"/>
+              <a:t>01 - RUNNER DETECTION</a:t>
+            </a:r>
+            <a:r>
+              <a:rPr/>
+              <a:t> Automatic identification of active runners nearby</a:t>
+            </a:r>
+          </a:p>
+          <a:p>
+            <a:pPr lvl="0" indent="0" marL="0">
+              <a:buNone/>
+            </a:pPr>
+            <a:r>
+              <a:rPr b="1"/>
+              <a:t>02 - FAIR FINISH POINT</a:t>
+            </a:r>
+            <a:r>
+              <a:rPr/>
+              <a:t> Algorithmic calculation of a point accessible at equal distance for all</a:t>
+            </a:r>
+          </a:p>
+          <a:p>
+            <a:pPr lvl="0" indent="0" marL="0">
+              <a:buNone/>
+            </a:pPr>
+            <a:r>
+              <a:rPr b="1"/>
+              <a:t>03 - SIMULTANEOUS START</a:t>
+            </a:r>
+            <a:r>
+              <a:rPr/>
+              <a:t> Synchronized countdown after mutual acceptance</a:t>
             </a:r>
           </a:p>
         </p:txBody>
@@ -4951,7 +5459,7 @@
             </a:pPr>
             <a:r>
               <a:rPr/>
-              <a:t>🟦 Slide 8 – Bénéfices de GeoRace</a:t>
+              <a:t>🟦 Slide 8 – A GeoRace duel</a:t>
             </a:r>
           </a:p>
         </p:txBody>
@@ -4976,46 +5484,85 @@
             </a:pPr>
             <a:r>
               <a:rPr b="1"/>
-              <a:t>Plus qu’une app de running</a:t>
-            </a:r>
-          </a:p>
-          <a:p>
-            <a:pPr lvl="0" indent="0" marL="0">
-              <a:buNone/>
-            </a:pPr>
-            <a:r>
-              <a:rPr b="1"/>
-              <a:t>01 - MOTIVATION ACCRUE</a:t>
-            </a:r>
-            <a:r>
-              <a:rPr/>
-              <a:t> Chaque sortie devient un défi concret et excitant</a:t>
-            </a:r>
-          </a:p>
-          <a:p>
-            <a:pPr lvl="0" indent="0" marL="0">
-              <a:buNone/>
-            </a:pPr>
-            <a:r>
-              <a:rPr b="1"/>
-              <a:t>02 - AMÉLIORATION DES PERFORMANCES</a:t>
-            </a:r>
-            <a:r>
-              <a:rPr/>
-              <a:t> La compétition pousse naturellement au dépassement de soi</a:t>
-            </a:r>
-          </a:p>
-          <a:p>
-            <a:pPr lvl="0" indent="0" marL="0">
-              <a:buNone/>
-            </a:pPr>
-            <a:r>
-              <a:rPr b="1"/>
-              <a:t>03 - BIEN-ÊTRE SOCIAL</a:t>
-            </a:r>
-            <a:r>
-              <a:rPr/>
-              <a:t> Rencontrez et interagissez avec d’autres coureurs passionnés</a:t>
+              <a:t>Typical scenario:</a:t>
+            </a:r>
+          </a:p>
+          <a:p>
+            <a:pPr lvl="0" indent="-342900" marL="342900">
+              <a:buAutoNum type="arabicPeriod"/>
+            </a:pPr>
+            <a:r>
+              <a:rPr b="1"/>
+              <a:t>You start your run</a:t>
+            </a:r>
+            <a:r>
+              <a:rPr/>
+              <a:t> → the app detects 3 runners within 800m</a:t>
+            </a:r>
+          </a:p>
+          <a:p>
+            <a:pPr lvl="0" indent="-342900" marL="342900">
+              <a:buAutoNum type="arabicPeriod"/>
+            </a:pPr>
+            <a:r>
+              <a:rPr b="1"/>
+              <a:t>Duel proposal</a:t>
+            </a:r>
+            <a:r>
+              <a:rPr/>
+              <a:t> → notification “Paul (ELO 1420) challenges you”</a:t>
+            </a:r>
+          </a:p>
+          <a:p>
+            <a:pPr lvl="0" indent="-342900" marL="342900">
+              <a:buAutoNum type="arabicPeriod"/>
+            </a:pPr>
+            <a:r>
+              <a:rPr b="1"/>
+              <a:t>You accept</a:t>
+            </a:r>
+            <a:r>
+              <a:rPr/>
+              <a:t> → the system calculates a finish point at 1.2km for each</a:t>
+            </a:r>
+          </a:p>
+          <a:p>
+            <a:pPr lvl="0" indent="-342900" marL="342900">
+              <a:buAutoNum type="arabicPeriod"/>
+            </a:pPr>
+            <a:r>
+              <a:rPr b="1"/>
+              <a:t>Start in 10 seconds</a:t>
+            </a:r>
+            <a:r>
+              <a:rPr/>
+              <a:t> → countdown</a:t>
+            </a:r>
+          </a:p>
+          <a:p>
+            <a:pPr lvl="0" indent="-342900" marL="342900">
+              <a:buAutoNum type="arabicPeriod"/>
+            </a:pPr>
+            <a:r>
+              <a:rPr b="1"/>
+              <a:t>Live race</a:t>
+            </a:r>
+            <a:r>
+              <a:rPr/>
+              <a:t> → GPS guides you, opponent’s position visible</a:t>
+            </a:r>
+          </a:p>
+          <a:p>
+            <a:pPr lvl="0" indent="-342900" marL="342900">
+              <a:buAutoNum type="arabicPeriod"/>
+            </a:pPr>
+            <a:r>
+              <a:rPr b="1"/>
+              <a:t>Finish</a:t>
+            </a:r>
+            <a:r>
+              <a:rPr/>
+              <a:t> → +25 ELO, badge “5 consecutive victories” unlocked</a:t>
             </a:r>
           </a:p>
         </p:txBody>

</xml_diff>

<commit_message>
Update presentation with new slides and add main README
Co-authored-by: TLX542 <146343079+TLX542@users.noreply.github.com>
</commit_message>
<xml_diff>
--- a/GeoRace_presentation.pptx
+++ b/GeoRace_presentation.pptx
@@ -3214,7 +3214,7 @@
             </a:pPr>
             <a:r>
               <a:rPr/>
-              <a:t>🟦 Slide 9 – Quick demo (key points for presentation)</a:t>
+              <a:t>🟦 Slide 9 – Démo rapide (points clés pour la présentation)</a:t>
             </a:r>
           </a:p>
         </p:txBody>
@@ -3239,86 +3239,86 @@
             </a:pPr>
             <a:r>
               <a:rPr b="1"/>
-              <a:t>Presentation script - Key points to emphasize</a:t>
+              <a:t>Script de présentation - Points à appuyer</a:t>
             </a:r>
           </a:p>
           <a:p>
             <a:pPr lvl="0"/>
             <a:r>
               <a:rPr b="1"/>
-              <a:t>Equidistant finish point</a:t>
-            </a:r>
-            <a:r>
-              <a:rPr/>
-              <a:t>: “Each runner covers exactly the same distance - total fairness”</a:t>
+              <a:t>Point d’arrivée équidistant</a:t>
+            </a:r>
+            <a:r>
+              <a:rPr/>
+              <a:t> : “Chaque coureur parcourt exactement la même distance - l’équité totale”</a:t>
             </a:r>
           </a:p>
           <a:p>
             <a:pPr lvl="0"/>
             <a:r>
               <a:rPr b="1"/>
-              <a:t>ELO Matchmaking</a:t>
-            </a:r>
-            <a:r>
-              <a:rPr/>
-              <a:t>: “You always face someone at your level - neither too easy nor impossible”</a:t>
+              <a:t>Matchmaking ELO</a:t>
+            </a:r>
+            <a:r>
+              <a:rPr/>
+              <a:t> : “Vous affrontez toujours quelqu’un de votre niveau - ni trop facile, ni impossible”</a:t>
             </a:r>
           </a:p>
           <a:p>
             <a:pPr lvl="0"/>
             <a:r>
               <a:rPr b="1"/>
-              <a:t>Real-time duel</a:t>
-            </a:r>
-            <a:r>
-              <a:rPr/>
-              <a:t>: “No after-the-fact comparison - it’s a real race, now”</a:t>
+              <a:t>Duel en temps réel</a:t>
+            </a:r>
+            <a:r>
+              <a:rPr/>
+              <a:t> : “Pas de comparaison après coup - c’est une vraie course, maintenant”</a:t>
             </a:r>
           </a:p>
           <a:p>
             <a:pPr lvl="0"/>
             <a:r>
               <a:rPr b="1"/>
-              <a:t>Security and privacy</a:t>
-            </a:r>
-            <a:r>
-              <a:rPr/>
-              <a:t>: “Your position is only visible during active duels”</a:t>
+              <a:t>Sécurité et confidentialité</a:t>
+            </a:r>
+            <a:r>
+              <a:rPr/>
+              <a:t> : “Votre position n’est visible que pendant les duels actifs”</a:t>
             </a:r>
           </a:p>
           <a:p>
             <a:pPr lvl="0"/>
             <a:r>
               <a:rPr b="1"/>
-              <a:t>Anti-cheat</a:t>
-            </a:r>
-            <a:r>
-              <a:rPr/>
-              <a:t>: “Automatic GPS anomaly detection - no cheaters”</a:t>
+              <a:t>Anti-triche</a:t>
+            </a:r>
+            <a:r>
+              <a:rPr/>
+              <a:t> : “Détection automatique des anomalies GPS - pas de tricheurs”</a:t>
             </a:r>
           </a:p>
           <a:p>
             <a:pPr lvl="0"/>
             <a:r>
               <a:rPr b="1"/>
-              <a:t>Social engagement</a:t>
-            </a:r>
-            <a:r>
-              <a:rPr/>
-              <a:t>: “Profiles, chat, badges, local tournaments - a real community”</a:t>
-            </a:r>
-          </a:p>
-          <a:p>
-            <a:pPr lvl="0" indent="0" marL="0">
-              <a:buNone/>
-            </a:pPr>
-            <a:r>
-              <a:rPr b="1"/>
-              <a:t>Key message</a:t>
-            </a:r>
-            <a:r>
-              <a:rPr/>
-              <a:t>: Fair real-time dueling changes everything - it’s no longer tracking, it’s competition!</a:t>
+              <a:t>Engagement social</a:t>
+            </a:r>
+            <a:r>
+              <a:rPr/>
+              <a:t> : “Profils, chat, badges, tournois locaux - une vraie communauté”</a:t>
+            </a:r>
+          </a:p>
+          <a:p>
+            <a:pPr lvl="0" indent="0" marL="0">
+              <a:buNone/>
+            </a:pPr>
+            <a:r>
+              <a:rPr b="1"/>
+              <a:t>Message clé</a:t>
+            </a:r>
+            <a:r>
+              <a:rPr/>
+              <a:t> : Le duel équitable en temps réel change tout - ce n’est plus du tracking, c’est de la compétition !</a:t>
             </a:r>
           </a:p>
         </p:txBody>
@@ -3365,7 +3365,7 @@
             </a:pPr>
             <a:r>
               <a:rPr/>
-              <a:t>🟦 Slide 10 – Social aspect</a:t>
+              <a:t>🟦 Slide 10 – Aspect social</a:t>
             </a:r>
           </a:p>
         </p:txBody>
@@ -3390,46 +3390,46 @@
             </a:pPr>
             <a:r>
               <a:rPr b="1"/>
-              <a:t>Build a runner community</a:t>
-            </a:r>
-          </a:p>
-          <a:p>
-            <a:pPr lvl="0" indent="0" marL="0">
-              <a:buNone/>
-            </a:pPr>
-            <a:r>
-              <a:rPr b="1"/>
-              <a:t>01 - BALANCED MATCHMAKING</a:t>
-            </a:r>
-            <a:r>
-              <a:rPr/>
-              <a:t> Automatic connection between runners of similar levels through ELO</a:t>
-            </a:r>
-          </a:p>
-          <a:p>
-            <a:pPr lvl="0" indent="0" marL="0">
-              <a:buNone/>
-            </a:pPr>
-            <a:r>
-              <a:rPr b="1"/>
-              <a:t>02 - DISCUSSION AND SHARING</a:t>
-            </a:r>
-            <a:r>
-              <a:rPr/>
-              <a:t> Live chat, friend adding, detailed profiles with statistics</a:t>
-            </a:r>
-          </a:p>
-          <a:p>
-            <a:pPr lvl="0" indent="0" marL="0">
-              <a:buNone/>
-            </a:pPr>
-            <a:r>
-              <a:rPr b="1"/>
-              <a:t>03 - COMMUNITY EVENTS</a:t>
-            </a:r>
-            <a:r>
-              <a:rPr/>
-              <a:t> Organized races, collective challenges, local leagues by city/neighborhood</a:t>
+              <a:t>Construisez une communauté de coureurs</a:t>
+            </a:r>
+          </a:p>
+          <a:p>
+            <a:pPr lvl="0" indent="0" marL="0">
+              <a:buNone/>
+            </a:pPr>
+            <a:r>
+              <a:rPr b="1"/>
+              <a:t>01 - MATCHMAKING ÉQUILIBRÉ</a:t>
+            </a:r>
+            <a:r>
+              <a:rPr/>
+              <a:t> Connexion automatique entre coureurs de niveaux similaires grâce à l’ELO</a:t>
+            </a:r>
+          </a:p>
+          <a:p>
+            <a:pPr lvl="0" indent="0" marL="0">
+              <a:buNone/>
+            </a:pPr>
+            <a:r>
+              <a:rPr b="1"/>
+              <a:t>02 - DISCUSSION ET PARTAGE</a:t>
+            </a:r>
+            <a:r>
+              <a:rPr/>
+              <a:t> Chat en direct, ajout d’amis, profils détaillés avec statistiques</a:t>
+            </a:r>
+          </a:p>
+          <a:p>
+            <a:pPr lvl="0" indent="0" marL="0">
+              <a:buNone/>
+            </a:pPr>
+            <a:r>
+              <a:rPr b="1"/>
+              <a:t>03 - ÉVÉNEMENTS COMMUNAUTAIRES</a:t>
+            </a:r>
+            <a:r>
+              <a:rPr/>
+              <a:t> Courses organisées, défis collectifs, ligues locales par ville/quartier</a:t>
             </a:r>
           </a:p>
         </p:txBody>
@@ -3476,7 +3476,7 @@
             </a:pPr>
             <a:r>
               <a:rPr/>
-              <a:t>🟦 Slide 11 – ELO ranking system</a:t>
+              <a:t>🟦 Slide 11 – Système de classement ELO</a:t>
             </a:r>
           </a:p>
         </p:txBody>
@@ -3501,46 +3501,46 @@
             </a:pPr>
             <a:r>
               <a:rPr b="1"/>
-              <a:t>Fair competition and motivating progression</a:t>
-            </a:r>
-          </a:p>
-          <a:p>
-            <a:pPr lvl="0" indent="0" marL="0">
-              <a:buNone/>
-            </a:pPr>
-            <a:r>
-              <a:rPr b="1"/>
-              <a:t>01 - BALANCED MATCHES</a:t>
-            </a:r>
-            <a:r>
-              <a:rPr/>
-              <a:t> ELO algorithm pairs you with runners of similar level</a:t>
-            </a:r>
-          </a:p>
-          <a:p>
-            <a:pPr lvl="0" indent="0" marL="0">
-              <a:buNone/>
-            </a:pPr>
-            <a:r>
-              <a:rPr b="1"/>
-              <a:t>02 - VISIBLE PROGRESSION</a:t>
-            </a:r>
-            <a:r>
-              <a:rPr/>
-              <a:t> Track your rise in rankings (Bronze → Silver → Gold → Platinum)</a:t>
-            </a:r>
-          </a:p>
-          <a:p>
-            <a:pPr lvl="0" indent="0" marL="0">
-              <a:buNone/>
-            </a:pPr>
-            <a:r>
-              <a:rPr b="1"/>
-              <a:t>03 - REWARDS AND BADGES</a:t>
-            </a:r>
-            <a:r>
-              <a:rPr/>
-              <a:t> Unlock achievements at each level reached</a:t>
+              <a:t>Compétition équitable et progression motivante</a:t>
+            </a:r>
+          </a:p>
+          <a:p>
+            <a:pPr lvl="0" indent="0" marL="0">
+              <a:buNone/>
+            </a:pPr>
+            <a:r>
+              <a:rPr b="1"/>
+              <a:t>01 - MATCHS ÉQUILIBRÉS</a:t>
+            </a:r>
+            <a:r>
+              <a:rPr/>
+              <a:t> Algorithme ELO vous oppose à des coureurs de niveau proche</a:t>
+            </a:r>
+          </a:p>
+          <a:p>
+            <a:pPr lvl="0" indent="0" marL="0">
+              <a:buNone/>
+            </a:pPr>
+            <a:r>
+              <a:rPr b="1"/>
+              <a:t>02 - PROGRESSION VISIBLE</a:t>
+            </a:r>
+            <a:r>
+              <a:rPr/>
+              <a:t> Suivez votre montée dans les classements (Bronze → Argent → Or → Platine)</a:t>
+            </a:r>
+          </a:p>
+          <a:p>
+            <a:pPr lvl="0" indent="0" marL="0">
+              <a:buNone/>
+            </a:pPr>
+            <a:r>
+              <a:rPr b="1"/>
+              <a:t>03 - RÉCOMPENSES ET BADGES</a:t>
+            </a:r>
+            <a:r>
+              <a:rPr/>
+              <a:t> Débloquez des achievements à chaque niveau atteint</a:t>
             </a:r>
           </a:p>
         </p:txBody>
@@ -3587,7 +3587,7 @@
             </a:pPr>
             <a:r>
               <a:rPr/>
-              <a:t>�� Slide 12 – GeoRace benefits</a:t>
+              <a:t>🟦 Slide 12 – Bénéfices de GeoRace</a:t>
             </a:r>
           </a:p>
         </p:txBody>
@@ -3612,46 +3612,46 @@
             </a:pPr>
             <a:r>
               <a:rPr b="1"/>
-              <a:t>More than a running app</a:t>
-            </a:r>
-          </a:p>
-          <a:p>
-            <a:pPr lvl="0" indent="0" marL="0">
-              <a:buNone/>
-            </a:pPr>
-            <a:r>
-              <a:rPr b="1"/>
-              <a:t>01 - INCREASED MOTIVATION</a:t>
-            </a:r>
-            <a:r>
-              <a:rPr/>
-              <a:t> Each outing becomes a concrete and exciting challenge</a:t>
-            </a:r>
-          </a:p>
-          <a:p>
-            <a:pPr lvl="0" indent="0" marL="0">
-              <a:buNone/>
-            </a:pPr>
-            <a:r>
-              <a:rPr b="1"/>
-              <a:t>02 - PERFORMANCE IMPROVEMENT</a:t>
-            </a:r>
-            <a:r>
-              <a:rPr/>
-              <a:t> Competition naturally pushes self-improvement</a:t>
-            </a:r>
-          </a:p>
-          <a:p>
-            <a:pPr lvl="0" indent="0" marL="0">
-              <a:buNone/>
-            </a:pPr>
-            <a:r>
-              <a:rPr b="1"/>
-              <a:t>03 - SOCIAL WELL-BEING</a:t>
-            </a:r>
-            <a:r>
-              <a:rPr/>
-              <a:t> Meet and interact with other passionate runners</a:t>
+              <a:t>Plus qu’une app de running</a:t>
+            </a:r>
+          </a:p>
+          <a:p>
+            <a:pPr lvl="0" indent="0" marL="0">
+              <a:buNone/>
+            </a:pPr>
+            <a:r>
+              <a:rPr b="1"/>
+              <a:t>01 - MOTIVATION ACCRUE</a:t>
+            </a:r>
+            <a:r>
+              <a:rPr/>
+              <a:t> Chaque sortie devient un défi concret et excitant</a:t>
+            </a:r>
+          </a:p>
+          <a:p>
+            <a:pPr lvl="0" indent="0" marL="0">
+              <a:buNone/>
+            </a:pPr>
+            <a:r>
+              <a:rPr b="1"/>
+              <a:t>02 - AMÉLIORATION DES PERFORMANCES</a:t>
+            </a:r>
+            <a:r>
+              <a:rPr/>
+              <a:t> La compétition pousse naturellement au dépassement de soi</a:t>
+            </a:r>
+          </a:p>
+          <a:p>
+            <a:pPr lvl="0" indent="0" marL="0">
+              <a:buNone/>
+            </a:pPr>
+            <a:r>
+              <a:rPr b="1"/>
+              <a:t>03 - BIEN-ÊTRE SOCIAL</a:t>
+            </a:r>
+            <a:r>
+              <a:rPr/>
+              <a:t> Rencontrez et interagissez avec d’autres coureurs passionnés</a:t>
             </a:r>
           </a:p>
         </p:txBody>
@@ -3698,7 +3698,7 @@
             </a:pPr>
             <a:r>
               <a:rPr/>
-              <a:t>🟦 Slide 13 – Key features</a:t>
+              <a:t>🟦 Slide 13 – Fonctionnalités clés</a:t>
             </a:r>
           </a:p>
         </p:txBody>
@@ -3723,62 +3723,62 @@
             </a:pPr>
             <a:r>
               <a:rPr b="1"/>
-              <a:t>Technology serving performance</a:t>
+              <a:t>Technologie au service de la performance</a:t>
             </a:r>
           </a:p>
           <a:p>
             <a:pPr lvl="0"/>
             <a:r>
               <a:rPr b="1"/>
-              <a:t>High-precision GPS</a:t>
-            </a:r>
-            <a:r>
-              <a:rPr/>
-              <a:t>: real-time tracking during duels</a:t>
+              <a:t>GPS haute précision</a:t>
+            </a:r>
+            <a:r>
+              <a:rPr/>
+              <a:t> : tracking en temps réel pendant les duels</a:t>
             </a:r>
           </a:p>
           <a:p>
             <a:pPr lvl="0"/>
             <a:r>
               <a:rPr b="1"/>
-              <a:t>Intelligent algorithm</a:t>
-            </a:r>
-            <a:r>
-              <a:rPr/>
-              <a:t>: calculation of accessible equidistant points</a:t>
+              <a:t>Algorithme intelligent</a:t>
+            </a:r>
+            <a:r>
+              <a:rPr/>
+              <a:t> : calcul de points équidistants accessibles</a:t>
             </a:r>
           </a:p>
           <a:p>
             <a:pPr lvl="0"/>
             <a:r>
               <a:rPr b="1"/>
-              <a:t>Security</a:t>
-            </a:r>
-            <a:r>
-              <a:rPr/>
-              <a:t>: position visible only during active duel</a:t>
+              <a:t>Sécurité</a:t>
+            </a:r>
+            <a:r>
+              <a:rPr/>
+              <a:t> : position visible uniquement en duel actif</a:t>
             </a:r>
           </a:p>
           <a:p>
             <a:pPr lvl="0"/>
             <a:r>
               <a:rPr b="1"/>
-              <a:t>Anti-cheat</a:t>
-            </a:r>
-            <a:r>
-              <a:rPr/>
-              <a:t>: abnormal speed detection and community validation</a:t>
+              <a:t>Anti-triche</a:t>
+            </a:r>
+            <a:r>
+              <a:rPr/>
+              <a:t> : détection de vitesse anormale et validation communautaire</a:t>
             </a:r>
           </a:p>
           <a:p>
             <a:pPr lvl="0"/>
             <a:r>
               <a:rPr b="1"/>
-              <a:t>Battery optimization</a:t>
-            </a:r>
-            <a:r>
-              <a:rPr/>
-              <a:t>: energy-saving mode</a:t>
+              <a:t>Optimisation batterie</a:t>
+            </a:r>
+            <a:r>
+              <a:rPr/>
+              <a:t> : mode économie d’énergie</a:t>
             </a:r>
           </a:p>
         </p:txBody>
@@ -3825,7 +3825,7 @@
             </a:pPr>
             <a:r>
               <a:rPr/>
-              <a:t>🟦 Slide 14 – Target audience</a:t>
+              <a:t>🟦 Slide 14 – Cible</a:t>
             </a:r>
           </a:p>
         </p:txBody>
@@ -3850,7 +3850,7 @@
             </a:pPr>
             <a:r>
               <a:rPr b="1"/>
-              <a:t>Who uses GeoRace?</a:t>
+              <a:t>Qui utilise GeoRace ?</a:t>
             </a:r>
           </a:p>
           <a:p>
@@ -3861,11 +3861,11 @@
             </a:r>
             <a:r>
               <a:rPr b="1"/>
-              <a:t>Regular runners</a:t>
-            </a:r>
-            <a:r>
-              <a:rPr/>
-              <a:t>: seeking to improve their performance</a:t>
+              <a:t>Coureurs réguliers</a:t>
+            </a:r>
+            <a:r>
+              <a:rPr/>
+              <a:t> : cherchent à améliorer leurs performances</a:t>
             </a:r>
           </a:p>
           <a:p>
@@ -3876,11 +3876,11 @@
             </a:r>
             <a:r>
               <a:rPr b="1"/>
-              <a:t>Occasional runners</a:t>
-            </a:r>
-            <a:r>
-              <a:rPr/>
-              <a:t>: need motivation to stay consistent</a:t>
+              <a:t>Coureurs occasionnels</a:t>
+            </a:r>
+            <a:r>
+              <a:rPr/>
+              <a:t> : ont besoin de motivation pour rester réguliers</a:t>
             </a:r>
           </a:p>
           <a:p>
@@ -3891,11 +3891,11 @@
             </a:r>
             <a:r>
               <a:rPr b="1"/>
-              <a:t>Competitive runners</a:t>
-            </a:r>
-            <a:r>
-              <a:rPr/>
-              <a:t>: want to test their level between official races</a:t>
+              <a:t>Coureurs compétitifs</a:t>
+            </a:r>
+            <a:r>
+              <a:rPr/>
+              <a:t> : veulent tester leur niveau entre les courses officielles</a:t>
             </a:r>
           </a:p>
           <a:p>
@@ -3906,11 +3906,11 @@
             </a:r>
             <a:r>
               <a:rPr b="1"/>
-              <a:t>New runners</a:t>
-            </a:r>
-            <a:r>
-              <a:rPr/>
-              <a:t>: looking for a motivating community</a:t>
+              <a:t>Nouveaux coureurs</a:t>
+            </a:r>
+            <a:r>
+              <a:rPr/>
+              <a:t> : cherchent une communauté motivante</a:t>
             </a:r>
           </a:p>
         </p:txBody>
@@ -3957,7 +3957,7 @@
             </a:pPr>
             <a:r>
               <a:rPr/>
-              <a:t>🟦 Slide 15 – Differentiation vs competitors</a:t>
+              <a:t>🟦 Slide 15 – Différenciation vs concurrents</a:t>
             </a:r>
           </a:p>
         </p:txBody>
@@ -3982,7 +3982,7 @@
             </a:pPr>
             <a:r>
               <a:rPr b="1"/>
-              <a:t>What other apps don’t do:</a:t>
+              <a:t>Ce que les autres apps ne font pas :</a:t>
             </a:r>
           </a:p>
           <a:p>
@@ -3993,7 +3993,7 @@
             </a:r>
             <a:r>
               <a:rPr/>
-              <a:t> → social network, no real-time competition</a:t>
+              <a:t> → réseau social, pas de compétition temps réel</a:t>
             </a:r>
           </a:p>
           <a:p>
@@ -4004,7 +4004,7 @@
             </a:r>
             <a:r>
               <a:rPr/>
-              <a:t> → tracking + asynchronous challenges</a:t>
+              <a:t> → tracking + défis asynchrones</a:t>
             </a:r>
           </a:p>
           <a:p>
@@ -4015,16 +4015,16 @@
             </a:r>
             <a:r>
               <a:rPr/>
-              <a:t> → basic GPS without interaction</a:t>
-            </a:r>
-          </a:p>
-          <a:p>
-            <a:pPr lvl="0" indent="0" marL="0">
-              <a:buNone/>
-            </a:pPr>
-            <a:r>
-              <a:rPr b="1"/>
-              <a:t>GeoRace combines:</a:t>
+              <a:t> → GPS basique sans interaction</a:t>
+            </a:r>
+          </a:p>
+          <a:p>
+            <a:pPr lvl="0" indent="0" marL="0">
+              <a:buNone/>
+            </a:pPr>
+            <a:r>
+              <a:rPr b="1"/>
+              <a:t>GeoRace combine :</a:t>
             </a:r>
           </a:p>
           <a:p>
@@ -4033,16 +4033,16 @@
             </a:pPr>
             <a:r>
               <a:rPr sz="2000"/>
-              <a:t>Spontaneous real-time duels + Fair finish point + ELO Matchmaking</a:t>
-            </a:r>
-          </a:p>
-          <a:p>
-            <a:pPr lvl="0" indent="0" marL="0">
-              <a:buNone/>
-            </a:pPr>
-            <a:r>
-              <a:rPr b="1"/>
-              <a:t>= Unique concept in the market</a:t>
+              <a:t>Duels spontanés en temps réel + Point d’arrivée équitable + Matchmaking ELO</a:t>
+            </a:r>
+          </a:p>
+          <a:p>
+            <a:pPr lvl="0" indent="0" marL="0">
+              <a:buNone/>
+            </a:pPr>
+            <a:r>
+              <a:rPr b="1"/>
+              <a:t>= Concept unique sur le marché</a:t>
             </a:r>
           </a:p>
         </p:txBody>
@@ -4089,7 +4089,7 @@
             </a:pPr>
             <a:r>
               <a:rPr/>
-              <a:t>🟦 Slide 16 – Business model</a:t>
+              <a:t>🟦 Slide 16 – Modèle économique</a:t>
             </a:r>
           </a:p>
         </p:txBody>
@@ -4114,46 +4114,46 @@
             </a:pPr>
             <a:r>
               <a:rPr b="1"/>
-              <a:t>Freemium with added value</a:t>
-            </a:r>
-          </a:p>
-          <a:p>
-            <a:pPr lvl="0" indent="0" marL="0">
-              <a:buNone/>
-            </a:pPr>
-            <a:r>
-              <a:rPr b="1"/>
-              <a:t>Free:</a:t>
-            </a:r>
-            <a:r>
-              <a:rPr/>
-              <a:t> * 3 duels per day * ELO ranking * Basic statistics * Community events</a:t>
-            </a:r>
-          </a:p>
-          <a:p>
-            <a:pPr lvl="0" indent="0" marL="0">
-              <a:buNone/>
-            </a:pPr>
-            <a:r>
-              <a:rPr b="1"/>
-              <a:t>Premium (€4.99/month):</a:t>
-            </a:r>
-            <a:r>
-              <a:rPr/>
-              <a:t> * Unlimited duels * Advanced statistics * Profile customization * Training mode against your records * No ads</a:t>
-            </a:r>
-          </a:p>
-          <a:p>
-            <a:pPr lvl="0" indent="0" marL="0">
-              <a:buNone/>
-            </a:pPr>
-            <a:r>
-              <a:rPr b="1"/>
-              <a:t>Additional revenues:</a:t>
-            </a:r>
-            <a:r>
-              <a:rPr/>
-              <a:t> * Brand partnerships (Nike, Adidas) * Premium events with prizes</a:t>
+              <a:t>Freemium avec valeur ajoutée</a:t>
+            </a:r>
+          </a:p>
+          <a:p>
+            <a:pPr lvl="0" indent="0" marL="0">
+              <a:buNone/>
+            </a:pPr>
+            <a:r>
+              <a:rPr b="1"/>
+              <a:t>Gratuit :</a:t>
+            </a:r>
+            <a:r>
+              <a:rPr/>
+              <a:t> * 3 duels par jour * Classement ELO * Statistiques de base * Événements communautaires</a:t>
+            </a:r>
+          </a:p>
+          <a:p>
+            <a:pPr lvl="0" indent="0" marL="0">
+              <a:buNone/>
+            </a:pPr>
+            <a:r>
+              <a:rPr b="1"/>
+              <a:t>Premium (4,99€/mois) :</a:t>
+            </a:r>
+            <a:r>
+              <a:rPr/>
+              <a:t> * Duels illimités * Statistiques avancées * Personnalisation profil * Mode entraînement contre vos records * Pas de publicités</a:t>
+            </a:r>
+          </a:p>
+          <a:p>
+            <a:pPr lvl="0" indent="0" marL="0">
+              <a:buNone/>
+            </a:pPr>
+            <a:r>
+              <a:rPr b="1"/>
+              <a:t>Revenus additionnels :</a:t>
+            </a:r>
+            <a:r>
+              <a:rPr/>
+              <a:t> * Partenariats marques (Nike, Adidas) * Événements premium avec prix</a:t>
             </a:r>
           </a:p>
         </p:txBody>
@@ -4225,58 +4225,58 @@
             </a:pPr>
             <a:r>
               <a:rPr b="1"/>
-              <a:t>Progressive deployment</a:t>
-            </a:r>
-          </a:p>
-          <a:p>
-            <a:pPr lvl="0" indent="0" marL="0">
-              <a:buNone/>
-            </a:pPr>
-            <a:r>
-              <a:rPr b="1"/>
-              <a:t>Phase 1 (6 months) - MVP</a:t>
-            </a:r>
-            <a:r>
-              <a:rPr/>
-              <a:t> * 1v1 real-time duels * ELO system * Test in 2-3 pilot cities * </a:t>
-            </a:r>
-            <a:r>
-              <a:rPr b="1"/>
-              <a:t>Goal: 500 active users</a:t>
-            </a:r>
-          </a:p>
-          <a:p>
-            <a:pPr lvl="0" indent="0" marL="0">
-              <a:buNone/>
-            </a:pPr>
-            <a:r>
-              <a:rPr b="1"/>
-              <a:t>Phase 2 (12 months) - Gamification</a:t>
-            </a:r>
-            <a:r>
-              <a:rPr/>
-              <a:t> * Badges, statistics, profiles * Community events * </a:t>
-            </a:r>
-            <a:r>
-              <a:rPr b="1"/>
-              <a:t>Goal: 5,000 users</a:t>
-            </a:r>
-          </a:p>
-          <a:p>
-            <a:pPr lvl="0" indent="0" marL="0">
-              <a:buNone/>
-            </a:pPr>
-            <a:r>
-              <a:rPr b="1"/>
-              <a:t>Phase 3 (24 months) - Scale</a:t>
-            </a:r>
-            <a:r>
-              <a:rPr/>
-              <a:t> * Premium version * Multi-player duels * National expansion * </a:t>
-            </a:r>
-            <a:r>
-              <a:rPr b="1"/>
-              <a:t>Goal: 50,000 users</a:t>
+              <a:t>Déploiement progressif</a:t>
+            </a:r>
+          </a:p>
+          <a:p>
+            <a:pPr lvl="0" indent="0" marL="0">
+              <a:buNone/>
+            </a:pPr>
+            <a:r>
+              <a:rPr b="1"/>
+              <a:t>Phase 1 (6 mois) - MVP</a:t>
+            </a:r>
+            <a:r>
+              <a:rPr/>
+              <a:t> * Duels 1v1 en temps réel * Système ELO * Test dans 2-3 villes pilotes * </a:t>
+            </a:r>
+            <a:r>
+              <a:rPr b="1"/>
+              <a:t>Objectif : 500 utilisateurs actifs</a:t>
+            </a:r>
+          </a:p>
+          <a:p>
+            <a:pPr lvl="0" indent="0" marL="0">
+              <a:buNone/>
+            </a:pPr>
+            <a:r>
+              <a:rPr b="1"/>
+              <a:t>Phase 2 (12 mois) - Gamification</a:t>
+            </a:r>
+            <a:r>
+              <a:rPr/>
+              <a:t> * Badges, statistiques, profils * Événements communautaires * </a:t>
+            </a:r>
+            <a:r>
+              <a:rPr b="1"/>
+              <a:t>Objectif : 5 000 utilisateurs</a:t>
+            </a:r>
+          </a:p>
+          <a:p>
+            <a:pPr lvl="0" indent="0" marL="0">
+              <a:buNone/>
+            </a:pPr>
+            <a:r>
+              <a:rPr b="1"/>
+              <a:t>Phase 3 (24 mois) - Scale</a:t>
+            </a:r>
+            <a:r>
+              <a:rPr/>
+              <a:t> * Version Premium * Duels multi-joueurs * Expansion nationale * </a:t>
+            </a:r>
+            <a:r>
+              <a:rPr b="1"/>
+              <a:t>Objectif : 50 000 utilisateurs</a:t>
             </a:r>
           </a:p>
         </p:txBody>
@@ -4323,7 +4323,7 @@
             </a:pPr>
             <a:r>
               <a:rPr/>
-              <a:t>🟦 Slide 18 – Challenges &amp; Solutions</a:t>
+              <a:t>🟦 Slide 18 – Défis &amp; Solutions</a:t>
             </a:r>
           </a:p>
         </p:txBody>
@@ -4348,59 +4348,59 @@
             </a:pPr>
             <a:r>
               <a:rPr b="1"/>
-              <a:t>Anticipating obstacles</a:t>
-            </a:r>
-          </a:p>
-          <a:p>
-            <a:pPr lvl="0" indent="0" marL="0">
-              <a:buNone/>
-            </a:pPr>
-            <a:r>
-              <a:rPr b="1"/>
-              <a:t>Challenge: Runner safety</a:t>
-            </a:r>
-            <a:r>
-              <a:rPr/>
-              <a:t> → Safety alerts, “cautious race” mode</a:t>
-            </a:r>
-          </a:p>
-          <a:p>
-            <a:pPr lvl="0" indent="0" marL="0">
-              <a:buNone/>
-            </a:pPr>
-            <a:r>
-              <a:rPr b="1"/>
-              <a:t>Challenge: Rural areas (few users)</a:t>
-            </a:r>
-            <a:r>
-              <a:rPr/>
-              <a:t> → Asynchronous mode against “ghost runners”</a:t>
-            </a:r>
-          </a:p>
-          <a:p>
-            <a:pPr lvl="0" indent="0" marL="0">
-              <a:buNone/>
-            </a:pPr>
-            <a:r>
-              <a:rPr b="1"/>
-              <a:t>Challenge: Cheating (bike, car)</a:t>
-            </a:r>
-            <a:r>
-              <a:rPr/>
-              <a:t> → Abnormal speed detection + community validation</a:t>
-            </a:r>
-          </a:p>
-          <a:p>
-            <a:pPr lvl="0" indent="0" marL="0">
-              <a:buNone/>
-            </a:pPr>
-            <a:r>
-              <a:rPr b="1"/>
-              <a:t>Challenge: Privacy</a:t>
-            </a:r>
-            <a:r>
-              <a:rPr/>
-              <a:t> → Position visible only during duel, user blocking</a:t>
+              <a:t>Anticiper les obstacles</a:t>
+            </a:r>
+          </a:p>
+          <a:p>
+            <a:pPr lvl="0" indent="0" marL="0">
+              <a:buNone/>
+            </a:pPr>
+            <a:r>
+              <a:rPr b="1"/>
+              <a:t>Défi : Sécurité des coureurs</a:t>
+            </a:r>
+            <a:r>
+              <a:rPr/>
+              <a:t> → Alertes de sécurité, mode “course prudente”</a:t>
+            </a:r>
+          </a:p>
+          <a:p>
+            <a:pPr lvl="0" indent="0" marL="0">
+              <a:buNone/>
+            </a:pPr>
+            <a:r>
+              <a:rPr b="1"/>
+              <a:t>Défi : Zones rurales (peu d’utilisateurs)</a:t>
+            </a:r>
+            <a:r>
+              <a:rPr/>
+              <a:t> → Mode asynchrone contre “ghost runners”</a:t>
+            </a:r>
+          </a:p>
+          <a:p>
+            <a:pPr lvl="0" indent="0" marL="0">
+              <a:buNone/>
+            </a:pPr>
+            <a:r>
+              <a:rPr b="1"/>
+              <a:t>Défi : Triche (vélo, voiture)</a:t>
+            </a:r>
+            <a:r>
+              <a:rPr/>
+              <a:t> → Détection vitesse anormale + validation communautaire</a:t>
+            </a:r>
+          </a:p>
+          <a:p>
+            <a:pPr lvl="0" indent="0" marL="0">
+              <a:buNone/>
+            </a:pPr>
+            <a:r>
+              <a:rPr b="1"/>
+              <a:t>Défi : Vie privée</a:t>
+            </a:r>
+            <a:r>
+              <a:rPr/>
+              <a:t> → Position visible uniquement en duel, blocage d’utilisateurs</a:t>
             </a:r>
           </a:p>
         </p:txBody>
@@ -4447,7 +4447,7 @@
             </a:pPr>
             <a:r>
               <a:rPr/>
-              <a:t>🟦 Slide 1 – Title</a:t>
+              <a:t>🟦 Slide 1 – Titre</a:t>
             </a:r>
           </a:p>
         </p:txBody>
@@ -4481,20 +4481,20 @@
             </a:pPr>
             <a:r>
               <a:rPr sz="2000"/>
-              <a:t>The real-time competitive running app</a:t>
-            </a:r>
-          </a:p>
-          <a:p>
-            <a:pPr lvl="0" indent="0" marL="0">
-              <a:buNone/>
-            </a:pPr>
-            <a:r>
-              <a:rPr b="1"/>
-              <a:t>Subtitle:</a:t>
-            </a:r>
-            <a:r>
-              <a:rPr/>
-              <a:t> Turn every run into an exciting duel.</a:t>
+              <a:t>L’application de course compétitive en temps réel</a:t>
+            </a:r>
+          </a:p>
+          <a:p>
+            <a:pPr lvl="0" indent="0" marL="0">
+              <a:buNone/>
+            </a:pPr>
+            <a:r>
+              <a:rPr b="1"/>
+              <a:t>Sous‑titre :</a:t>
+            </a:r>
+            <a:r>
+              <a:rPr/>
+              <a:t> Transformez chaque sortie running en duel excitant.</a:t>
             </a:r>
           </a:p>
         </p:txBody>
@@ -4566,28 +4566,28 @@
             </a:pPr>
             <a:r>
               <a:rPr sz="2000"/>
-              <a:t>GeoRace doesn’t just track your runs. We transform running into a </a:t>
+              <a:t>GeoRace ne se contente pas de tracker vos courses. Nous transformons la course à pied en une </a:t>
             </a:r>
             <a:r>
               <a:rPr sz="2000" b="1"/>
-              <a:t>social, competitive, and motivating experience</a:t>
+              <a:t>expérience sociale, compétitive et motivante</a:t>
             </a:r>
             <a:r>
               <a:rPr sz="2000"/>
-              <a:t> accessible to everyone, everywhere, anytime.</a:t>
-            </a:r>
-          </a:p>
-          <a:p>
-            <a:pPr lvl="0" indent="0" marL="0">
-              <a:buNone/>
-            </a:pPr>
-            <a:r>
-              <a:rPr b="1"/>
-              <a:t>Our ambition:</a:t>
-            </a:r>
-            <a:r>
-              <a:rPr/>
-              <a:t> Become the reference for real-time competitive running and create a global community of runners passionate about challenges.</a:t>
+              <a:t> accessible à tous, partout, à tout moment.</a:t>
+            </a:r>
+          </a:p>
+          <a:p>
+            <a:pPr lvl="0" indent="0" marL="0">
+              <a:buNone/>
+            </a:pPr>
+            <a:r>
+              <a:rPr b="1"/>
+              <a:t>Notre ambition :</a:t>
+            </a:r>
+            <a:r>
+              <a:rPr/>
+              <a:t> Devenir la référence de la course compétitive en temps réel et créer une communauté mondiale de coureurs passionnés par le défi.</a:t>
             </a:r>
           </a:p>
         </p:txBody>
@@ -4634,7 +4634,7 @@
             </a:pPr>
             <a:r>
               <a:rPr/>
-              <a:t>🟦 Slide 20 – Final message</a:t>
+              <a:t>🟦 Slide 20 – Phrase finale</a:t>
             </a:r>
           </a:p>
         </p:txBody>
@@ -4668,16 +4668,16 @@
             </a:pPr>
             <a:r>
               <a:rPr sz="2000"/>
-              <a:t>Every run is a duel. Every duel is an opportunity. Transform your motivation.</a:t>
-            </a:r>
-          </a:p>
-          <a:p>
-            <a:pPr lvl="0" indent="0" marL="0">
-              <a:buNone/>
-            </a:pPr>
-            <a:r>
-              <a:rPr b="1"/>
-              <a:t>Ready to take on the challenge?</a:t>
+              <a:t>Chaque course est un duel. Chaque duel est une opportunité. Transformez votre motivation.</a:t>
+            </a:r>
+          </a:p>
+          <a:p>
+            <a:pPr lvl="0" indent="0" marL="0">
+              <a:buNone/>
+            </a:pPr>
+            <a:r>
+              <a:rPr b="1"/>
+              <a:t>Prêt à relever le défi ?</a:t>
             </a:r>
           </a:p>
         </p:txBody>
@@ -4724,7 +4724,7 @@
             </a:pPr>
             <a:r>
               <a:rPr/>
-              <a:t>🟦 Slide 2 – Problem</a:t>
+              <a:t>🟦 Slide 2 – Problème</a:t>
             </a:r>
           </a:p>
         </p:txBody>
@@ -4749,44 +4749,44 @@
             </a:pPr>
             <a:r>
               <a:rPr b="1"/>
-              <a:t>Running alone, declining motivation</a:t>
+              <a:t>Courir seul, une motivation en berne</a:t>
             </a:r>
           </a:p>
           <a:p>
             <a:pPr lvl="0"/>
             <a:r>
               <a:rPr/>
-              <a:t>Many runners feel demotivated when running alone</a:t>
+              <a:t>De nombreux coureurs se sentent démotivés seuls</a:t>
             </a:r>
           </a:p>
           <a:p>
             <a:pPr lvl="0"/>
             <a:r>
               <a:rPr/>
-              <a:t>Lack of challenge and interaction</a:t>
+              <a:t>Manque de défi et d’interaction</a:t>
             </a:r>
           </a:p>
           <a:p>
             <a:pPr lvl="0"/>
             <a:r>
               <a:rPr/>
-              <a:t>Difficulty measuring progress against others</a:t>
+              <a:t>Difficulté à mesurer ses progrès face à d’autres</a:t>
             </a:r>
           </a:p>
           <a:p>
             <a:pPr lvl="0"/>
             <a:r>
               <a:rPr/>
-              <a:t>Risk of abandoning fitness goals</a:t>
-            </a:r>
-          </a:p>
-          <a:p>
-            <a:pPr lvl="0" indent="0" marL="0">
-              <a:buNone/>
-            </a:pPr>
-            <a:r>
-              <a:rPr/>
-              <a:t>➡ Result: monotony, loss of motivation, practice abandonment</a:t>
+              <a:t>Risque d’abandon des objectifs sportifs</a:t>
+            </a:r>
+          </a:p>
+          <a:p>
+            <a:pPr lvl="0" indent="0" marL="0">
+              <a:buNone/>
+            </a:pPr>
+            <a:r>
+              <a:rPr/>
+              <a:t>➡ Résultat : monotonie, perte de motivation, arrêt de la pratique</a:t>
             </a:r>
           </a:p>
         </p:txBody>
@@ -4833,7 +4833,7 @@
             </a:pPr>
             <a:r>
               <a:rPr/>
-              <a:t>🟦 Slide 3 – Our differentiators</a:t>
+              <a:t>🟦 Slide 3 – Nos différenciateurs</a:t>
             </a:r>
           </a:p>
         </p:txBody>
@@ -4858,73 +4858,73 @@
             </a:pPr>
             <a:r>
               <a:rPr b="1"/>
-              <a:t>What makes GeoRace unique</a:t>
+              <a:t>Ce qui rend GeoRace unique</a:t>
             </a:r>
           </a:p>
           <a:p>
             <a:pPr lvl="0"/>
             <a:r>
               <a:rPr b="1"/>
-              <a:t>Real-time duel to an equidistant finish point</a:t>
-            </a:r>
-            <a:r>
-              <a:rPr/>
-              <a:t> → guaranteed fairness between runners</a:t>
+              <a:t>Duel en temps réel vers un point d’arrivée équidistant</a:t>
+            </a:r>
+            <a:r>
+              <a:rPr/>
+              <a:t> → équité garantie entre coureurs</a:t>
             </a:r>
           </a:p>
           <a:p>
             <a:pPr lvl="0"/>
             <a:r>
               <a:rPr b="1"/>
-              <a:t>ELO Matchmaking</a:t>
-            </a:r>
-            <a:r>
-              <a:rPr/>
-              <a:t> → opponents of comparable level, visible progression</a:t>
+              <a:t>Matchmaking ELO</a:t>
+            </a:r>
+            <a:r>
+              <a:rPr/>
+              <a:t> → adversaires de niveau comparable, progression visible</a:t>
             </a:r>
           </a:p>
           <a:p>
             <a:pPr lvl="0"/>
             <a:r>
               <a:rPr b="1"/>
-              <a:t>Live GPS &amp; synchronized tracking</a:t>
-            </a:r>
-            <a:r>
-              <a:rPr/>
-              <a:t> → immediate competitive experience</a:t>
+              <a:t>GPS en direct &amp; suivi synchronisé</a:t>
+            </a:r>
+            <a:r>
+              <a:rPr/>
+              <a:t> → expérience compétitive immédiate</a:t>
             </a:r>
           </a:p>
           <a:p>
             <a:pPr lvl="0"/>
             <a:r>
               <a:rPr b="1"/>
-              <a:t>Privacy and security</a:t>
-            </a:r>
-            <a:r>
-              <a:rPr/>
-              <a:t> → position sharing limited to active duels</a:t>
+              <a:t>Confidentialité et sécurité</a:t>
+            </a:r>
+            <a:r>
+              <a:rPr/>
+              <a:t> → partage de position limité aux duels actifs</a:t>
             </a:r>
           </a:p>
           <a:p>
             <a:pPr lvl="0"/>
             <a:r>
               <a:rPr b="1"/>
-              <a:t>Integrated anti-cheat</a:t>
-            </a:r>
-            <a:r>
-              <a:rPr/>
-              <a:t> (GPS anomaly detection, route verification)</a:t>
+              <a:t>Anti‑triche intégré</a:t>
+            </a:r>
+            <a:r>
+              <a:rPr/>
+              <a:t> (détection d’anomalies GPS, vérifications de parcours)</a:t>
             </a:r>
           </a:p>
           <a:p>
             <a:pPr lvl="0"/>
             <a:r>
               <a:rPr b="1"/>
-              <a:t>Social features</a:t>
-            </a:r>
-            <a:r>
-              <a:rPr/>
-              <a:t> → profiles, chat, badges, local leaderboards</a:t>
+              <a:t>Fonctions sociales</a:t>
+            </a:r>
+            <a:r>
+              <a:rPr/>
+              <a:t> → profils, chat, badges, classements locaux</a:t>
             </a:r>
           </a:p>
         </p:txBody>
@@ -4971,7 +4971,7 @@
             </a:pPr>
             <a:r>
               <a:rPr/>
-              <a:t>🟦 Slide 4 – Why users will join us</a:t>
+              <a:t>🟦 Slide 4 – Pourquoi les utilisateurs nous rejoindront</a:t>
             </a:r>
           </a:p>
         </p:txBody>
@@ -4996,51 +4996,51 @@
             </a:pPr>
             <a:r>
               <a:rPr b="1"/>
-              <a:t>Reasons to switch to GeoRace</a:t>
+              <a:t>Les raisons de passer à GeoRace</a:t>
             </a:r>
           </a:p>
           <a:p>
             <a:pPr lvl="0"/>
             <a:r>
               <a:rPr b="1"/>
-              <a:t>Unique and fair duel experience</a:t>
-            </a:r>
-            <a:r>
-              <a:rPr/>
-              <a:t> = more fun and challenge</a:t>
+              <a:t>Expérience de duel unique et équitable</a:t>
+            </a:r>
+            <a:r>
+              <a:rPr/>
+              <a:t> = plus de fun et de challenge</a:t>
             </a:r>
           </a:p>
           <a:p>
             <a:pPr lvl="0"/>
             <a:r>
               <a:rPr b="1"/>
-              <a:t>Visible progression (ELO)</a:t>
-            </a:r>
-            <a:r>
-              <a:rPr/>
-              <a:t> = motivation to return</a:t>
+              <a:t>Progression visible (ELO)</a:t>
+            </a:r>
+            <a:r>
+              <a:rPr/>
+              <a:t> = motivation à revenir</a:t>
             </a:r>
           </a:p>
           <a:p>
             <a:pPr lvl="0"/>
             <a:r>
               <a:rPr b="1"/>
-              <a:t>Local events &amp; tournaments</a:t>
-            </a:r>
-            <a:r>
-              <a:rPr/>
-              <a:t> = social opportunities and rewards</a:t>
+              <a:t>Événements locaux &amp; tournois</a:t>
+            </a:r>
+            <a:r>
+              <a:rPr/>
+              <a:t> = opportunités sociales et récompenses</a:t>
             </a:r>
           </a:p>
           <a:p>
             <a:pPr lvl="0"/>
             <a:r>
               <a:rPr b="1"/>
-              <a:t>Easy friend transfer</a:t>
-            </a:r>
-            <a:r>
-              <a:rPr/>
-              <a:t> via invitations and immediate duels</a:t>
+              <a:t>Transfert facile des amis</a:t>
+            </a:r>
+            <a:r>
+              <a:rPr/>
+              <a:t> via invitations et duels immédiats</a:t>
             </a:r>
           </a:p>
         </p:txBody>
@@ -5087,7 +5087,7 @@
             </a:pPr>
             <a:r>
               <a:rPr/>
-              <a:t>🟦 Slide 5 – Acquisition strategy (how to steal users from competitors)</a:t>
+              <a:t>🟦 Slide 5 – Stratégie d’acquisition (comment voler des utilisateurs aux concurrents)</a:t>
             </a:r>
           </a:p>
         </p:txBody>
@@ -5112,73 +5112,73 @@
             </a:pPr>
             <a:r>
               <a:rPr b="1"/>
-              <a:t>Concrete tactics to attract users</a:t>
+              <a:t>Tactiques concrètes pour attirer les utilisateurs</a:t>
             </a:r>
           </a:p>
           <a:p>
             <a:pPr lvl="0"/>
             <a:r>
               <a:rPr b="1"/>
-              <a:t>Local targeting</a:t>
-            </a:r>
-            <a:r>
-              <a:rPr/>
-              <a:t>: organize micro-events and challenges in parks and campuses</a:t>
+              <a:t>Ciblage local</a:t>
+            </a:r>
+            <a:r>
+              <a:rPr/>
+              <a:t> : organiser micro‑événements et challenges dans les parcs et campus</a:t>
             </a:r>
           </a:p>
           <a:p>
             <a:pPr lvl="0"/>
             <a:r>
               <a:rPr b="1"/>
-              <a:t>Partnerships</a:t>
-            </a:r>
-            <a:r>
-              <a:rPr/>
-              <a:t> with running clubs, coaches, local influencers</a:t>
+              <a:t>Partenariats</a:t>
+            </a:r>
+            <a:r>
+              <a:rPr/>
+              <a:t> avec clubs de course, coachs, influenceurs locaux</a:t>
             </a:r>
           </a:p>
           <a:p>
             <a:pPr lvl="0"/>
             <a:r>
               <a:rPr b="1"/>
-              <a:t>Integrations &amp; entry point</a:t>
-            </a:r>
-            <a:r>
-              <a:rPr/>
-              <a:t>: simplified import from Strava/Runkeeper + friend import</a:t>
+              <a:t>Intégrations &amp; porte d’entrée</a:t>
+            </a:r>
+            <a:r>
+              <a:rPr/>
+              <a:t> : import simplifié depuis Strava/Runkeeper + import d’amis</a:t>
             </a:r>
           </a:p>
           <a:p>
             <a:pPr lvl="0"/>
             <a:r>
               <a:rPr b="1"/>
-              <a:t>Incentive programs</a:t>
-            </a:r>
-            <a:r>
-              <a:rPr/>
-              <a:t>: free duels/initial ELO bonus, rewards, exclusive badges</a:t>
+              <a:t>Programmes d’incitation</a:t>
+            </a:r>
+            <a:r>
+              <a:rPr/>
+              <a:t> : duels gratuits/bonus initial ELO, récompenses, badges exclusifs</a:t>
             </a:r>
           </a:p>
           <a:p>
             <a:pPr lvl="0"/>
             <a:r>
               <a:rPr b="1"/>
-              <a:t>Social media campaigns</a:t>
-            </a:r>
-            <a:r>
-              <a:rPr/>
-              <a:t> showing live duels + user stories</a:t>
+              <a:t>Campagnes social media</a:t>
+            </a:r>
+            <a:r>
+              <a:rPr/>
+              <a:t> montrant duels en direct + récits d’utilisateurs</a:t>
             </a:r>
           </a:p>
           <a:p>
             <a:pPr lvl="0"/>
             <a:r>
               <a:rPr b="1"/>
-              <a:t>Differentiating features in onboarding</a:t>
-            </a:r>
-            <a:r>
-              <a:rPr/>
-              <a:t> (30s duel demonstration)</a:t>
+              <a:t>Fonctionnalités différenciantes en onboarding</a:t>
+            </a:r>
+            <a:r>
+              <a:rPr/>
+              <a:t> (démonstration duel en 30s)</a:t>
             </a:r>
           </a:p>
         </p:txBody>
@@ -5225,7 +5225,7 @@
             </a:pPr>
             <a:r>
               <a:rPr/>
-              <a:t>🟦 Slide 6 – Innovative concept: Duel mode</a:t>
+              <a:t>🟦 Slide 6 – Concept innovant : Le mode duel</a:t>
             </a:r>
           </a:p>
         </p:txBody>
@@ -5250,7 +5250,7 @@
             </a:pPr>
             <a:r>
               <a:rPr b="1"/>
-              <a:t>Real-time duels for everyone</a:t>
+              <a:t>Duels en temps réel pour tous</a:t>
             </a:r>
           </a:p>
           <a:p>
@@ -5263,11 +5263,11 @@
             </a:r>
             <a:r>
               <a:rPr b="1"/>
-              <a:t>REAL-TIME DUELS</a:t>
-            </a:r>
-            <a:r>
-              <a:rPr/>
-              <a:t> Face other nearby runners in spontaneous races</a:t>
+              <a:t>DUELS EN TEMPS RÉEL</a:t>
+            </a:r>
+            <a:r>
+              <a:rPr/>
+              <a:t> Affrontez d’autres coureurs à proximité dans des courses spontanées</a:t>
             </a:r>
           </a:p>
           <a:p>
@@ -5280,11 +5280,11 @@
             </a:r>
             <a:r>
               <a:rPr b="1"/>
-              <a:t>FAIR FINISH POINT</a:t>
-            </a:r>
-            <a:r>
-              <a:rPr/>
-              <a:t> Each duel ends at an equidistant point for all participants</a:t>
+              <a:t>POINT D’ARRIVÉE ÉQUITABLE</a:t>
+            </a:r>
+            <a:r>
+              <a:rPr/>
+              <a:t> Chaque duel se termine à un point équidistant pour tous les participants</a:t>
             </a:r>
           </a:p>
           <a:p>
@@ -5297,11 +5297,11 @@
             </a:r>
             <a:r>
               <a:rPr b="1"/>
-              <a:t>FAIR COMPETITION</a:t>
-            </a:r>
-            <a:r>
-              <a:rPr/>
-              <a:t> ELO system ensures balanced matches regardless of your level</a:t>
+              <a:t>COMPÉTITION JUSTE</a:t>
+            </a:r>
+            <a:r>
+              <a:rPr/>
+              <a:t> Système ELO garantit des matchs équilibrés quel que soit votre niveau</a:t>
             </a:r>
           </a:p>
         </p:txBody>
@@ -5348,7 +5348,7 @@
             </a:pPr>
             <a:r>
               <a:rPr/>
-              <a:t>🟦 Slide 7 – How a duel works</a:t>
+              <a:t>🟦 Slide 7 – Fonctionnement d’un duel</a:t>
             </a:r>
           </a:p>
         </p:txBody>
@@ -5373,46 +5373,46 @@
             </a:pPr>
             <a:r>
               <a:rPr b="1"/>
-              <a:t>3 simple steps</a:t>
-            </a:r>
-          </a:p>
-          <a:p>
-            <a:pPr lvl="0" indent="0" marL="0">
-              <a:buNone/>
-            </a:pPr>
-            <a:r>
-              <a:rPr b="1"/>
-              <a:t>01 - RUNNER DETECTION</a:t>
-            </a:r>
-            <a:r>
-              <a:rPr/>
-              <a:t> Automatic identification of active runners nearby</a:t>
-            </a:r>
-          </a:p>
-          <a:p>
-            <a:pPr lvl="0" indent="0" marL="0">
-              <a:buNone/>
-            </a:pPr>
-            <a:r>
-              <a:rPr b="1"/>
-              <a:t>02 - FAIR FINISH POINT</a:t>
-            </a:r>
-            <a:r>
-              <a:rPr/>
-              <a:t> Algorithmic calculation of a point accessible at equal distance for all</a:t>
-            </a:r>
-          </a:p>
-          <a:p>
-            <a:pPr lvl="0" indent="0" marL="0">
-              <a:buNone/>
-            </a:pPr>
-            <a:r>
-              <a:rPr b="1"/>
-              <a:t>03 - SIMULTANEOUS START</a:t>
-            </a:r>
-            <a:r>
-              <a:rPr/>
-              <a:t> Synchronized countdown after mutual acceptance</a:t>
+              <a:t>3 étapes simples</a:t>
+            </a:r>
+          </a:p>
+          <a:p>
+            <a:pPr lvl="0" indent="0" marL="0">
+              <a:buNone/>
+            </a:pPr>
+            <a:r>
+              <a:rPr b="1"/>
+              <a:t>01 - DÉTECTION DES COUREURS</a:t>
+            </a:r>
+            <a:r>
+              <a:rPr/>
+              <a:t> Identification automatique des coureurs actifs à proximité</a:t>
+            </a:r>
+          </a:p>
+          <a:p>
+            <a:pPr lvl="0" indent="0" marL="0">
+              <a:buNone/>
+            </a:pPr>
+            <a:r>
+              <a:rPr b="1"/>
+              <a:t>02 - POINT D’ARRIVÉE ÉQUITABLE</a:t>
+            </a:r>
+            <a:r>
+              <a:rPr/>
+              <a:t> Calcul algorithmique d’un point accessible à distance égale pour tous</a:t>
+            </a:r>
+          </a:p>
+          <a:p>
+            <a:pPr lvl="0" indent="0" marL="0">
+              <a:buNone/>
+            </a:pPr>
+            <a:r>
+              <a:rPr b="1"/>
+              <a:t>03 - DÉPART SIMULTANÉ</a:t>
+            </a:r>
+            <a:r>
+              <a:rPr/>
+              <a:t> Compte à rebours synchronisé après acceptation mutuelle</a:t>
             </a:r>
           </a:p>
         </p:txBody>
@@ -5459,7 +5459,7 @@
             </a:pPr>
             <a:r>
               <a:rPr/>
-              <a:t>🟦 Slide 8 – A GeoRace duel</a:t>
+              <a:t>🟦 Slide 8 – Un duel GeoRace</a:t>
             </a:r>
           </a:p>
         </p:txBody>
@@ -5484,7 +5484,7 @@
             </a:pPr>
             <a:r>
               <a:rPr b="1"/>
-              <a:t>Typical scenario:</a:t>
+              <a:t>Scénario typique :</a:t>
             </a:r>
           </a:p>
           <a:p>
@@ -5493,11 +5493,11 @@
             </a:pPr>
             <a:r>
               <a:rPr b="1"/>
-              <a:t>You start your run</a:t>
-            </a:r>
-            <a:r>
-              <a:rPr/>
-              <a:t> → the app detects 3 runners within 800m</a:t>
+              <a:t>Vous commencez votre course</a:t>
+            </a:r>
+            <a:r>
+              <a:rPr/>
+              <a:t> → l’app détecte 3 coureurs dans un rayon de 800m</a:t>
             </a:r>
           </a:p>
           <a:p>
@@ -5506,11 +5506,11 @@
             </a:pPr>
             <a:r>
               <a:rPr b="1"/>
-              <a:t>Duel proposal</a:t>
-            </a:r>
-            <a:r>
-              <a:rPr/>
-              <a:t> → notification “Paul (ELO 1420) challenges you”</a:t>
+              <a:t>Proposition de duel</a:t>
+            </a:r>
+            <a:r>
+              <a:rPr/>
+              <a:t> → notification “Paul (ELO 1420) vous défie”</a:t>
             </a:r>
           </a:p>
           <a:p>
@@ -5519,11 +5519,11 @@
             </a:pPr>
             <a:r>
               <a:rPr b="1"/>
-              <a:t>You accept</a:t>
-            </a:r>
-            <a:r>
-              <a:rPr/>
-              <a:t> → the system calculates a finish point at 1.2km for each</a:t>
+              <a:t>Vous acceptez</a:t>
+            </a:r>
+            <a:r>
+              <a:rPr/>
+              <a:t> → le système calcule un point d’arrivée à 1,2km pour chacun</a:t>
             </a:r>
           </a:p>
           <a:p>
@@ -5532,11 +5532,11 @@
             </a:pPr>
             <a:r>
               <a:rPr b="1"/>
-              <a:t>Start in 10 seconds</a:t>
-            </a:r>
-            <a:r>
-              <a:rPr/>
-              <a:t> → countdown</a:t>
+              <a:t>Départ dans 10 secondes</a:t>
+            </a:r>
+            <a:r>
+              <a:rPr/>
+              <a:t> → compte à rebours</a:t>
             </a:r>
           </a:p>
           <a:p>
@@ -5545,11 +5545,11 @@
             </a:pPr>
             <a:r>
               <a:rPr b="1"/>
-              <a:t>Live race</a:t>
-            </a:r>
-            <a:r>
-              <a:rPr/>
-              <a:t> → GPS guides you, opponent’s position visible</a:t>
+              <a:t>Course en direct</a:t>
+            </a:r>
+            <a:r>
+              <a:rPr/>
+              <a:t> → GPS vous guide, position de l’adversaire visible</a:t>
             </a:r>
           </a:p>
           <a:p>
@@ -5558,11 +5558,11 @@
             </a:pPr>
             <a:r>
               <a:rPr b="1"/>
-              <a:t>Finish</a:t>
-            </a:r>
-            <a:r>
-              <a:rPr/>
-              <a:t> → +25 ELO, badge “5 consecutive victories” unlocked</a:t>
+              <a:t>Arrivée</a:t>
+            </a:r>
+            <a:r>
+              <a:rPr/>
+              <a:t> → +25 ELO, badge “5 victoires consécutives” débloqué</a:t>
             </a:r>
           </a:p>
         </p:txBody>

</xml_diff>

<commit_message>
Final PR overview and documentation complete
Co-authored-by: TLX542 <146343079+TLX542@users.noreply.github.com>
</commit_message>
<xml_diff>
--- a/GeoRace_presentation.pptx
+++ b/GeoRace_presentation.pptx
@@ -3214,7 +3214,7 @@
             </a:pPr>
             <a:r>
               <a:rPr/>
-              <a:t>🟦 Slide 9 – Démo rapide (points clés pour la présentation)</a:t>
+              <a:t>🟦 Slide 9 – Quick demo (key points for presentation)</a:t>
             </a:r>
           </a:p>
         </p:txBody>
@@ -3239,86 +3239,86 @@
             </a:pPr>
             <a:r>
               <a:rPr b="1"/>
-              <a:t>Script de présentation - Points à appuyer</a:t>
+              <a:t>Presentation script - Key points to emphasize</a:t>
             </a:r>
           </a:p>
           <a:p>
             <a:pPr lvl="0"/>
             <a:r>
               <a:rPr b="1"/>
-              <a:t>Point d’arrivée équidistant</a:t>
-            </a:r>
-            <a:r>
-              <a:rPr/>
-              <a:t> : “Chaque coureur parcourt exactement la même distance - l’équité totale”</a:t>
+              <a:t>Equidistant finish point</a:t>
+            </a:r>
+            <a:r>
+              <a:rPr/>
+              <a:t>: “Each runner covers exactly the same distance - total fairness”</a:t>
             </a:r>
           </a:p>
           <a:p>
             <a:pPr lvl="0"/>
             <a:r>
               <a:rPr b="1"/>
-              <a:t>Matchmaking ELO</a:t>
-            </a:r>
-            <a:r>
-              <a:rPr/>
-              <a:t> : “Vous affrontez toujours quelqu’un de votre niveau - ni trop facile, ni impossible”</a:t>
+              <a:t>ELO Matchmaking</a:t>
+            </a:r>
+            <a:r>
+              <a:rPr/>
+              <a:t>: “You always face someone at your level - neither too easy nor impossible”</a:t>
             </a:r>
           </a:p>
           <a:p>
             <a:pPr lvl="0"/>
             <a:r>
               <a:rPr b="1"/>
-              <a:t>Duel en temps réel</a:t>
-            </a:r>
-            <a:r>
-              <a:rPr/>
-              <a:t> : “Pas de comparaison après coup - c’est une vraie course, maintenant”</a:t>
+              <a:t>Real-time duel</a:t>
+            </a:r>
+            <a:r>
+              <a:rPr/>
+              <a:t>: “No after-the-fact comparison - it’s a real race, now”</a:t>
             </a:r>
           </a:p>
           <a:p>
             <a:pPr lvl="0"/>
             <a:r>
               <a:rPr b="1"/>
-              <a:t>Sécurité et confidentialité</a:t>
-            </a:r>
-            <a:r>
-              <a:rPr/>
-              <a:t> : “Votre position n’est visible que pendant les duels actifs”</a:t>
+              <a:t>Security and privacy</a:t>
+            </a:r>
+            <a:r>
+              <a:rPr/>
+              <a:t>: “Your position is only visible during active duels”</a:t>
             </a:r>
           </a:p>
           <a:p>
             <a:pPr lvl="0"/>
             <a:r>
               <a:rPr b="1"/>
-              <a:t>Anti-triche</a:t>
-            </a:r>
-            <a:r>
-              <a:rPr/>
-              <a:t> : “Détection automatique des anomalies GPS - pas de tricheurs”</a:t>
+              <a:t>Anti-cheat</a:t>
+            </a:r>
+            <a:r>
+              <a:rPr/>
+              <a:t>: “Automatic GPS anomaly detection - no cheaters”</a:t>
             </a:r>
           </a:p>
           <a:p>
             <a:pPr lvl="0"/>
             <a:r>
               <a:rPr b="1"/>
-              <a:t>Engagement social</a:t>
-            </a:r>
-            <a:r>
-              <a:rPr/>
-              <a:t> : “Profils, chat, badges, tournois locaux - une vraie communauté”</a:t>
-            </a:r>
-          </a:p>
-          <a:p>
-            <a:pPr lvl="0" indent="0" marL="0">
-              <a:buNone/>
-            </a:pPr>
-            <a:r>
-              <a:rPr b="1"/>
-              <a:t>Message clé</a:t>
-            </a:r>
-            <a:r>
-              <a:rPr/>
-              <a:t> : Le duel équitable en temps réel change tout - ce n’est plus du tracking, c’est de la compétition !</a:t>
+              <a:t>Social engagement</a:t>
+            </a:r>
+            <a:r>
+              <a:rPr/>
+              <a:t>: “Profiles, chat, badges, local tournaments - a real community”</a:t>
+            </a:r>
+          </a:p>
+          <a:p>
+            <a:pPr lvl="0" indent="0" marL="0">
+              <a:buNone/>
+            </a:pPr>
+            <a:r>
+              <a:rPr b="1"/>
+              <a:t>Key message</a:t>
+            </a:r>
+            <a:r>
+              <a:rPr/>
+              <a:t>: Fair real-time dueling changes everything - it’s no longer tracking, it’s competition!</a:t>
             </a:r>
           </a:p>
         </p:txBody>
@@ -3365,7 +3365,7 @@
             </a:pPr>
             <a:r>
               <a:rPr/>
-              <a:t>🟦 Slide 10 – Aspect social</a:t>
+              <a:t>🟦 Slide 10 – Social aspect</a:t>
             </a:r>
           </a:p>
         </p:txBody>
@@ -3390,46 +3390,46 @@
             </a:pPr>
             <a:r>
               <a:rPr b="1"/>
-              <a:t>Construisez une communauté de coureurs</a:t>
-            </a:r>
-          </a:p>
-          <a:p>
-            <a:pPr lvl="0" indent="0" marL="0">
-              <a:buNone/>
-            </a:pPr>
-            <a:r>
-              <a:rPr b="1"/>
-              <a:t>01 - MATCHMAKING ÉQUILIBRÉ</a:t>
-            </a:r>
-            <a:r>
-              <a:rPr/>
-              <a:t> Connexion automatique entre coureurs de niveaux similaires grâce à l’ELO</a:t>
-            </a:r>
-          </a:p>
-          <a:p>
-            <a:pPr lvl="0" indent="0" marL="0">
-              <a:buNone/>
-            </a:pPr>
-            <a:r>
-              <a:rPr b="1"/>
-              <a:t>02 - DISCUSSION ET PARTAGE</a:t>
-            </a:r>
-            <a:r>
-              <a:rPr/>
-              <a:t> Chat en direct, ajout d’amis, profils détaillés avec statistiques</a:t>
-            </a:r>
-          </a:p>
-          <a:p>
-            <a:pPr lvl="0" indent="0" marL="0">
-              <a:buNone/>
-            </a:pPr>
-            <a:r>
-              <a:rPr b="1"/>
-              <a:t>03 - ÉVÉNEMENTS COMMUNAUTAIRES</a:t>
-            </a:r>
-            <a:r>
-              <a:rPr/>
-              <a:t> Courses organisées, défis collectifs, ligues locales par ville/quartier</a:t>
+              <a:t>Build a runner community</a:t>
+            </a:r>
+          </a:p>
+          <a:p>
+            <a:pPr lvl="0" indent="0" marL="0">
+              <a:buNone/>
+            </a:pPr>
+            <a:r>
+              <a:rPr b="1"/>
+              <a:t>01 - BALANCED MATCHMAKING</a:t>
+            </a:r>
+            <a:r>
+              <a:rPr/>
+              <a:t> Automatic connection between runners of similar levels through ELO</a:t>
+            </a:r>
+          </a:p>
+          <a:p>
+            <a:pPr lvl="0" indent="0" marL="0">
+              <a:buNone/>
+            </a:pPr>
+            <a:r>
+              <a:rPr b="1"/>
+              <a:t>02 - DISCUSSION AND SHARING</a:t>
+            </a:r>
+            <a:r>
+              <a:rPr/>
+              <a:t> Live chat, friend adding, detailed profiles with statistics</a:t>
+            </a:r>
+          </a:p>
+          <a:p>
+            <a:pPr lvl="0" indent="0" marL="0">
+              <a:buNone/>
+            </a:pPr>
+            <a:r>
+              <a:rPr b="1"/>
+              <a:t>03 - COMMUNITY EVENTS</a:t>
+            </a:r>
+            <a:r>
+              <a:rPr/>
+              <a:t> Organized races, collective challenges, local leagues by city/neighborhood</a:t>
             </a:r>
           </a:p>
         </p:txBody>
@@ -3476,7 +3476,7 @@
             </a:pPr>
             <a:r>
               <a:rPr/>
-              <a:t>🟦 Slide 11 – Système de classement ELO</a:t>
+              <a:t>🟦 Slide 11 – ELO ranking system</a:t>
             </a:r>
           </a:p>
         </p:txBody>
@@ -3501,46 +3501,46 @@
             </a:pPr>
             <a:r>
               <a:rPr b="1"/>
-              <a:t>Compétition équitable et progression motivante</a:t>
-            </a:r>
-          </a:p>
-          <a:p>
-            <a:pPr lvl="0" indent="0" marL="0">
-              <a:buNone/>
-            </a:pPr>
-            <a:r>
-              <a:rPr b="1"/>
-              <a:t>01 - MATCHS ÉQUILIBRÉS</a:t>
-            </a:r>
-            <a:r>
-              <a:rPr/>
-              <a:t> Algorithme ELO vous oppose à des coureurs de niveau proche</a:t>
-            </a:r>
-          </a:p>
-          <a:p>
-            <a:pPr lvl="0" indent="0" marL="0">
-              <a:buNone/>
-            </a:pPr>
-            <a:r>
-              <a:rPr b="1"/>
-              <a:t>02 - PROGRESSION VISIBLE</a:t>
-            </a:r>
-            <a:r>
-              <a:rPr/>
-              <a:t> Suivez votre montée dans les classements (Bronze → Argent → Or → Platine)</a:t>
-            </a:r>
-          </a:p>
-          <a:p>
-            <a:pPr lvl="0" indent="0" marL="0">
-              <a:buNone/>
-            </a:pPr>
-            <a:r>
-              <a:rPr b="1"/>
-              <a:t>03 - RÉCOMPENSES ET BADGES</a:t>
-            </a:r>
-            <a:r>
-              <a:rPr/>
-              <a:t> Débloquez des achievements à chaque niveau atteint</a:t>
+              <a:t>Fair competition and motivating progression</a:t>
+            </a:r>
+          </a:p>
+          <a:p>
+            <a:pPr lvl="0" indent="0" marL="0">
+              <a:buNone/>
+            </a:pPr>
+            <a:r>
+              <a:rPr b="1"/>
+              <a:t>01 - BALANCED MATCHES</a:t>
+            </a:r>
+            <a:r>
+              <a:rPr/>
+              <a:t> ELO algorithm pairs you with runners of similar level</a:t>
+            </a:r>
+          </a:p>
+          <a:p>
+            <a:pPr lvl="0" indent="0" marL="0">
+              <a:buNone/>
+            </a:pPr>
+            <a:r>
+              <a:rPr b="1"/>
+              <a:t>02 - VISIBLE PROGRESSION</a:t>
+            </a:r>
+            <a:r>
+              <a:rPr/>
+              <a:t> Track your rise in rankings (Bronze → Silver → Gold → Platinum)</a:t>
+            </a:r>
+          </a:p>
+          <a:p>
+            <a:pPr lvl="0" indent="0" marL="0">
+              <a:buNone/>
+            </a:pPr>
+            <a:r>
+              <a:rPr b="1"/>
+              <a:t>03 - REWARDS AND BADGES</a:t>
+            </a:r>
+            <a:r>
+              <a:rPr/>
+              <a:t> Unlock achievements at each level reached</a:t>
             </a:r>
           </a:p>
         </p:txBody>
@@ -3587,7 +3587,7 @@
             </a:pPr>
             <a:r>
               <a:rPr/>
-              <a:t>🟦 Slide 12 – Bénéfices de GeoRace</a:t>
+              <a:t>�� Slide 12 – GeoRace benefits</a:t>
             </a:r>
           </a:p>
         </p:txBody>
@@ -3612,46 +3612,46 @@
             </a:pPr>
             <a:r>
               <a:rPr b="1"/>
-              <a:t>Plus qu’une app de running</a:t>
-            </a:r>
-          </a:p>
-          <a:p>
-            <a:pPr lvl="0" indent="0" marL="0">
-              <a:buNone/>
-            </a:pPr>
-            <a:r>
-              <a:rPr b="1"/>
-              <a:t>01 - MOTIVATION ACCRUE</a:t>
-            </a:r>
-            <a:r>
-              <a:rPr/>
-              <a:t> Chaque sortie devient un défi concret et excitant</a:t>
-            </a:r>
-          </a:p>
-          <a:p>
-            <a:pPr lvl="0" indent="0" marL="0">
-              <a:buNone/>
-            </a:pPr>
-            <a:r>
-              <a:rPr b="1"/>
-              <a:t>02 - AMÉLIORATION DES PERFORMANCES</a:t>
-            </a:r>
-            <a:r>
-              <a:rPr/>
-              <a:t> La compétition pousse naturellement au dépassement de soi</a:t>
-            </a:r>
-          </a:p>
-          <a:p>
-            <a:pPr lvl="0" indent="0" marL="0">
-              <a:buNone/>
-            </a:pPr>
-            <a:r>
-              <a:rPr b="1"/>
-              <a:t>03 - BIEN-ÊTRE SOCIAL</a:t>
-            </a:r>
-            <a:r>
-              <a:rPr/>
-              <a:t> Rencontrez et interagissez avec d’autres coureurs passionnés</a:t>
+              <a:t>More than a running app</a:t>
+            </a:r>
+          </a:p>
+          <a:p>
+            <a:pPr lvl="0" indent="0" marL="0">
+              <a:buNone/>
+            </a:pPr>
+            <a:r>
+              <a:rPr b="1"/>
+              <a:t>01 - INCREASED MOTIVATION</a:t>
+            </a:r>
+            <a:r>
+              <a:rPr/>
+              <a:t> Each outing becomes a concrete and exciting challenge</a:t>
+            </a:r>
+          </a:p>
+          <a:p>
+            <a:pPr lvl="0" indent="0" marL="0">
+              <a:buNone/>
+            </a:pPr>
+            <a:r>
+              <a:rPr b="1"/>
+              <a:t>02 - PERFORMANCE IMPROVEMENT</a:t>
+            </a:r>
+            <a:r>
+              <a:rPr/>
+              <a:t> Competition naturally pushes self-improvement</a:t>
+            </a:r>
+          </a:p>
+          <a:p>
+            <a:pPr lvl="0" indent="0" marL="0">
+              <a:buNone/>
+            </a:pPr>
+            <a:r>
+              <a:rPr b="1"/>
+              <a:t>03 - SOCIAL WELL-BEING</a:t>
+            </a:r>
+            <a:r>
+              <a:rPr/>
+              <a:t> Meet and interact with other passionate runners</a:t>
             </a:r>
           </a:p>
         </p:txBody>
@@ -3698,7 +3698,7 @@
             </a:pPr>
             <a:r>
               <a:rPr/>
-              <a:t>🟦 Slide 13 – Fonctionnalités clés</a:t>
+              <a:t>🟦 Slide 13 – Key features</a:t>
             </a:r>
           </a:p>
         </p:txBody>
@@ -3723,62 +3723,62 @@
             </a:pPr>
             <a:r>
               <a:rPr b="1"/>
-              <a:t>Technologie au service de la performance</a:t>
+              <a:t>Technology serving performance</a:t>
             </a:r>
           </a:p>
           <a:p>
             <a:pPr lvl="0"/>
             <a:r>
               <a:rPr b="1"/>
-              <a:t>GPS haute précision</a:t>
-            </a:r>
-            <a:r>
-              <a:rPr/>
-              <a:t> : tracking en temps réel pendant les duels</a:t>
+              <a:t>High-precision GPS</a:t>
+            </a:r>
+            <a:r>
+              <a:rPr/>
+              <a:t>: real-time tracking during duels</a:t>
             </a:r>
           </a:p>
           <a:p>
             <a:pPr lvl="0"/>
             <a:r>
               <a:rPr b="1"/>
-              <a:t>Algorithme intelligent</a:t>
-            </a:r>
-            <a:r>
-              <a:rPr/>
-              <a:t> : calcul de points équidistants accessibles</a:t>
+              <a:t>Intelligent algorithm</a:t>
+            </a:r>
+            <a:r>
+              <a:rPr/>
+              <a:t>: calculation of accessible equidistant points</a:t>
             </a:r>
           </a:p>
           <a:p>
             <a:pPr lvl="0"/>
             <a:r>
               <a:rPr b="1"/>
-              <a:t>Sécurité</a:t>
-            </a:r>
-            <a:r>
-              <a:rPr/>
-              <a:t> : position visible uniquement en duel actif</a:t>
+              <a:t>Security</a:t>
+            </a:r>
+            <a:r>
+              <a:rPr/>
+              <a:t>: position visible only during active duel</a:t>
             </a:r>
           </a:p>
           <a:p>
             <a:pPr lvl="0"/>
             <a:r>
               <a:rPr b="1"/>
-              <a:t>Anti-triche</a:t>
-            </a:r>
-            <a:r>
-              <a:rPr/>
-              <a:t> : détection de vitesse anormale et validation communautaire</a:t>
+              <a:t>Anti-cheat</a:t>
+            </a:r>
+            <a:r>
+              <a:rPr/>
+              <a:t>: abnormal speed detection and community validation</a:t>
             </a:r>
           </a:p>
           <a:p>
             <a:pPr lvl="0"/>
             <a:r>
               <a:rPr b="1"/>
-              <a:t>Optimisation batterie</a:t>
-            </a:r>
-            <a:r>
-              <a:rPr/>
-              <a:t> : mode économie d’énergie</a:t>
+              <a:t>Battery optimization</a:t>
+            </a:r>
+            <a:r>
+              <a:rPr/>
+              <a:t>: energy-saving mode</a:t>
             </a:r>
           </a:p>
         </p:txBody>
@@ -3825,7 +3825,7 @@
             </a:pPr>
             <a:r>
               <a:rPr/>
-              <a:t>🟦 Slide 14 – Cible</a:t>
+              <a:t>🟦 Slide 14 – Target audience</a:t>
             </a:r>
           </a:p>
         </p:txBody>
@@ -3850,7 +3850,7 @@
             </a:pPr>
             <a:r>
               <a:rPr b="1"/>
-              <a:t>Qui utilise GeoRace ?</a:t>
+              <a:t>Who uses GeoRace?</a:t>
             </a:r>
           </a:p>
           <a:p>
@@ -3861,11 +3861,11 @@
             </a:r>
             <a:r>
               <a:rPr b="1"/>
-              <a:t>Coureurs réguliers</a:t>
-            </a:r>
-            <a:r>
-              <a:rPr/>
-              <a:t> : cherchent à améliorer leurs performances</a:t>
+              <a:t>Regular runners</a:t>
+            </a:r>
+            <a:r>
+              <a:rPr/>
+              <a:t>: seeking to improve their performance</a:t>
             </a:r>
           </a:p>
           <a:p>
@@ -3876,11 +3876,11 @@
             </a:r>
             <a:r>
               <a:rPr b="1"/>
-              <a:t>Coureurs occasionnels</a:t>
-            </a:r>
-            <a:r>
-              <a:rPr/>
-              <a:t> : ont besoin de motivation pour rester réguliers</a:t>
+              <a:t>Occasional runners</a:t>
+            </a:r>
+            <a:r>
+              <a:rPr/>
+              <a:t>: need motivation to stay consistent</a:t>
             </a:r>
           </a:p>
           <a:p>
@@ -3891,11 +3891,11 @@
             </a:r>
             <a:r>
               <a:rPr b="1"/>
-              <a:t>Coureurs compétitifs</a:t>
-            </a:r>
-            <a:r>
-              <a:rPr/>
-              <a:t> : veulent tester leur niveau entre les courses officielles</a:t>
+              <a:t>Competitive runners</a:t>
+            </a:r>
+            <a:r>
+              <a:rPr/>
+              <a:t>: want to test their level between official races</a:t>
             </a:r>
           </a:p>
           <a:p>
@@ -3906,11 +3906,11 @@
             </a:r>
             <a:r>
               <a:rPr b="1"/>
-              <a:t>Nouveaux coureurs</a:t>
-            </a:r>
-            <a:r>
-              <a:rPr/>
-              <a:t> : cherchent une communauté motivante</a:t>
+              <a:t>New runners</a:t>
+            </a:r>
+            <a:r>
+              <a:rPr/>
+              <a:t>: looking for a motivating community</a:t>
             </a:r>
           </a:p>
         </p:txBody>
@@ -3957,7 +3957,7 @@
             </a:pPr>
             <a:r>
               <a:rPr/>
-              <a:t>🟦 Slide 15 – Différenciation vs concurrents</a:t>
+              <a:t>🟦 Slide 15 – Differentiation vs competitors</a:t>
             </a:r>
           </a:p>
         </p:txBody>
@@ -3982,7 +3982,7 @@
             </a:pPr>
             <a:r>
               <a:rPr b="1"/>
-              <a:t>Ce que les autres apps ne font pas :</a:t>
+              <a:t>What other apps don’t do:</a:t>
             </a:r>
           </a:p>
           <a:p>
@@ -3993,7 +3993,7 @@
             </a:r>
             <a:r>
               <a:rPr/>
-              <a:t> → réseau social, pas de compétition temps réel</a:t>
+              <a:t> → social network, no real-time competition</a:t>
             </a:r>
           </a:p>
           <a:p>
@@ -4004,7 +4004,7 @@
             </a:r>
             <a:r>
               <a:rPr/>
-              <a:t> → tracking + défis asynchrones</a:t>
+              <a:t> → tracking + asynchronous challenges</a:t>
             </a:r>
           </a:p>
           <a:p>
@@ -4015,16 +4015,16 @@
             </a:r>
             <a:r>
               <a:rPr/>
-              <a:t> → GPS basique sans interaction</a:t>
-            </a:r>
-          </a:p>
-          <a:p>
-            <a:pPr lvl="0" indent="0" marL="0">
-              <a:buNone/>
-            </a:pPr>
-            <a:r>
-              <a:rPr b="1"/>
-              <a:t>GeoRace combine :</a:t>
+              <a:t> → basic GPS without interaction</a:t>
+            </a:r>
+          </a:p>
+          <a:p>
+            <a:pPr lvl="0" indent="0" marL="0">
+              <a:buNone/>
+            </a:pPr>
+            <a:r>
+              <a:rPr b="1"/>
+              <a:t>GeoRace combines:</a:t>
             </a:r>
           </a:p>
           <a:p>
@@ -4033,16 +4033,16 @@
             </a:pPr>
             <a:r>
               <a:rPr sz="2000"/>
-              <a:t>Duels spontanés en temps réel + Point d’arrivée équitable + Matchmaking ELO</a:t>
-            </a:r>
-          </a:p>
-          <a:p>
-            <a:pPr lvl="0" indent="0" marL="0">
-              <a:buNone/>
-            </a:pPr>
-            <a:r>
-              <a:rPr b="1"/>
-              <a:t>= Concept unique sur le marché</a:t>
+              <a:t>Spontaneous real-time duels + Fair finish point + ELO Matchmaking</a:t>
+            </a:r>
+          </a:p>
+          <a:p>
+            <a:pPr lvl="0" indent="0" marL="0">
+              <a:buNone/>
+            </a:pPr>
+            <a:r>
+              <a:rPr b="1"/>
+              <a:t>= Unique concept in the market</a:t>
             </a:r>
           </a:p>
         </p:txBody>
@@ -4089,7 +4089,7 @@
             </a:pPr>
             <a:r>
               <a:rPr/>
-              <a:t>🟦 Slide 16 – Modèle économique</a:t>
+              <a:t>🟦 Slide 16 – Business model</a:t>
             </a:r>
           </a:p>
         </p:txBody>
@@ -4114,46 +4114,46 @@
             </a:pPr>
             <a:r>
               <a:rPr b="1"/>
-              <a:t>Freemium avec valeur ajoutée</a:t>
-            </a:r>
-          </a:p>
-          <a:p>
-            <a:pPr lvl="0" indent="0" marL="0">
-              <a:buNone/>
-            </a:pPr>
-            <a:r>
-              <a:rPr b="1"/>
-              <a:t>Gratuit :</a:t>
-            </a:r>
-            <a:r>
-              <a:rPr/>
-              <a:t> * 3 duels par jour * Classement ELO * Statistiques de base * Événements communautaires</a:t>
-            </a:r>
-          </a:p>
-          <a:p>
-            <a:pPr lvl="0" indent="0" marL="0">
-              <a:buNone/>
-            </a:pPr>
-            <a:r>
-              <a:rPr b="1"/>
-              <a:t>Premium (4,99€/mois) :</a:t>
-            </a:r>
-            <a:r>
-              <a:rPr/>
-              <a:t> * Duels illimités * Statistiques avancées * Personnalisation profil * Mode entraînement contre vos records * Pas de publicités</a:t>
-            </a:r>
-          </a:p>
-          <a:p>
-            <a:pPr lvl="0" indent="0" marL="0">
-              <a:buNone/>
-            </a:pPr>
-            <a:r>
-              <a:rPr b="1"/>
-              <a:t>Revenus additionnels :</a:t>
-            </a:r>
-            <a:r>
-              <a:rPr/>
-              <a:t> * Partenariats marques (Nike, Adidas) * Événements premium avec prix</a:t>
+              <a:t>Freemium with added value</a:t>
+            </a:r>
+          </a:p>
+          <a:p>
+            <a:pPr lvl="0" indent="0" marL="0">
+              <a:buNone/>
+            </a:pPr>
+            <a:r>
+              <a:rPr b="1"/>
+              <a:t>Free:</a:t>
+            </a:r>
+            <a:r>
+              <a:rPr/>
+              <a:t> * 3 duels per day * ELO ranking * Basic statistics * Community events</a:t>
+            </a:r>
+          </a:p>
+          <a:p>
+            <a:pPr lvl="0" indent="0" marL="0">
+              <a:buNone/>
+            </a:pPr>
+            <a:r>
+              <a:rPr b="1"/>
+              <a:t>Premium (€4.99/month):</a:t>
+            </a:r>
+            <a:r>
+              <a:rPr/>
+              <a:t> * Unlimited duels * Advanced statistics * Profile customization * Training mode against your records * No ads</a:t>
+            </a:r>
+          </a:p>
+          <a:p>
+            <a:pPr lvl="0" indent="0" marL="0">
+              <a:buNone/>
+            </a:pPr>
+            <a:r>
+              <a:rPr b="1"/>
+              <a:t>Additional revenues:</a:t>
+            </a:r>
+            <a:r>
+              <a:rPr/>
+              <a:t> * Brand partnerships (Nike, Adidas) * Premium events with prizes</a:t>
             </a:r>
           </a:p>
         </p:txBody>
@@ -4225,58 +4225,58 @@
             </a:pPr>
             <a:r>
               <a:rPr b="1"/>
-              <a:t>Déploiement progressif</a:t>
-            </a:r>
-          </a:p>
-          <a:p>
-            <a:pPr lvl="0" indent="0" marL="0">
-              <a:buNone/>
-            </a:pPr>
-            <a:r>
-              <a:rPr b="1"/>
-              <a:t>Phase 1 (6 mois) - MVP</a:t>
-            </a:r>
-            <a:r>
-              <a:rPr/>
-              <a:t> * Duels 1v1 en temps réel * Système ELO * Test dans 2-3 villes pilotes * </a:t>
-            </a:r>
-            <a:r>
-              <a:rPr b="1"/>
-              <a:t>Objectif : 500 utilisateurs actifs</a:t>
-            </a:r>
-          </a:p>
-          <a:p>
-            <a:pPr lvl="0" indent="0" marL="0">
-              <a:buNone/>
-            </a:pPr>
-            <a:r>
-              <a:rPr b="1"/>
-              <a:t>Phase 2 (12 mois) - Gamification</a:t>
-            </a:r>
-            <a:r>
-              <a:rPr/>
-              <a:t> * Badges, statistiques, profils * Événements communautaires * </a:t>
-            </a:r>
-            <a:r>
-              <a:rPr b="1"/>
-              <a:t>Objectif : 5 000 utilisateurs</a:t>
-            </a:r>
-          </a:p>
-          <a:p>
-            <a:pPr lvl="0" indent="0" marL="0">
-              <a:buNone/>
-            </a:pPr>
-            <a:r>
-              <a:rPr b="1"/>
-              <a:t>Phase 3 (24 mois) - Scale</a:t>
-            </a:r>
-            <a:r>
-              <a:rPr/>
-              <a:t> * Version Premium * Duels multi-joueurs * Expansion nationale * </a:t>
-            </a:r>
-            <a:r>
-              <a:rPr b="1"/>
-              <a:t>Objectif : 50 000 utilisateurs</a:t>
+              <a:t>Progressive deployment</a:t>
+            </a:r>
+          </a:p>
+          <a:p>
+            <a:pPr lvl="0" indent="0" marL="0">
+              <a:buNone/>
+            </a:pPr>
+            <a:r>
+              <a:rPr b="1"/>
+              <a:t>Phase 1 (6 months) - MVP</a:t>
+            </a:r>
+            <a:r>
+              <a:rPr/>
+              <a:t> * 1v1 real-time duels * ELO system * Test in 2-3 pilot cities * </a:t>
+            </a:r>
+            <a:r>
+              <a:rPr b="1"/>
+              <a:t>Goal: 500 active users</a:t>
+            </a:r>
+          </a:p>
+          <a:p>
+            <a:pPr lvl="0" indent="0" marL="0">
+              <a:buNone/>
+            </a:pPr>
+            <a:r>
+              <a:rPr b="1"/>
+              <a:t>Phase 2 (12 months) - Gamification</a:t>
+            </a:r>
+            <a:r>
+              <a:rPr/>
+              <a:t> * Badges, statistics, profiles * Community events * </a:t>
+            </a:r>
+            <a:r>
+              <a:rPr b="1"/>
+              <a:t>Goal: 5,000 users</a:t>
+            </a:r>
+          </a:p>
+          <a:p>
+            <a:pPr lvl="0" indent="0" marL="0">
+              <a:buNone/>
+            </a:pPr>
+            <a:r>
+              <a:rPr b="1"/>
+              <a:t>Phase 3 (24 months) - Scale</a:t>
+            </a:r>
+            <a:r>
+              <a:rPr/>
+              <a:t> * Premium version * Multi-player duels * National expansion * </a:t>
+            </a:r>
+            <a:r>
+              <a:rPr b="1"/>
+              <a:t>Goal: 50,000 users</a:t>
             </a:r>
           </a:p>
         </p:txBody>
@@ -4323,7 +4323,7 @@
             </a:pPr>
             <a:r>
               <a:rPr/>
-              <a:t>🟦 Slide 18 – Défis &amp; Solutions</a:t>
+              <a:t>🟦 Slide 18 – Challenges &amp; Solutions</a:t>
             </a:r>
           </a:p>
         </p:txBody>
@@ -4348,59 +4348,59 @@
             </a:pPr>
             <a:r>
               <a:rPr b="1"/>
-              <a:t>Anticiper les obstacles</a:t>
-            </a:r>
-          </a:p>
-          <a:p>
-            <a:pPr lvl="0" indent="0" marL="0">
-              <a:buNone/>
-            </a:pPr>
-            <a:r>
-              <a:rPr b="1"/>
-              <a:t>Défi : Sécurité des coureurs</a:t>
-            </a:r>
-            <a:r>
-              <a:rPr/>
-              <a:t> → Alertes de sécurité, mode “course prudente”</a:t>
-            </a:r>
-          </a:p>
-          <a:p>
-            <a:pPr lvl="0" indent="0" marL="0">
-              <a:buNone/>
-            </a:pPr>
-            <a:r>
-              <a:rPr b="1"/>
-              <a:t>Défi : Zones rurales (peu d’utilisateurs)</a:t>
-            </a:r>
-            <a:r>
-              <a:rPr/>
-              <a:t> → Mode asynchrone contre “ghost runners”</a:t>
-            </a:r>
-          </a:p>
-          <a:p>
-            <a:pPr lvl="0" indent="0" marL="0">
-              <a:buNone/>
-            </a:pPr>
-            <a:r>
-              <a:rPr b="1"/>
-              <a:t>Défi : Triche (vélo, voiture)</a:t>
-            </a:r>
-            <a:r>
-              <a:rPr/>
-              <a:t> → Détection vitesse anormale + validation communautaire</a:t>
-            </a:r>
-          </a:p>
-          <a:p>
-            <a:pPr lvl="0" indent="0" marL="0">
-              <a:buNone/>
-            </a:pPr>
-            <a:r>
-              <a:rPr b="1"/>
-              <a:t>Défi : Vie privée</a:t>
-            </a:r>
-            <a:r>
-              <a:rPr/>
-              <a:t> → Position visible uniquement en duel, blocage d’utilisateurs</a:t>
+              <a:t>Anticipating obstacles</a:t>
+            </a:r>
+          </a:p>
+          <a:p>
+            <a:pPr lvl="0" indent="0" marL="0">
+              <a:buNone/>
+            </a:pPr>
+            <a:r>
+              <a:rPr b="1"/>
+              <a:t>Challenge: Runner safety</a:t>
+            </a:r>
+            <a:r>
+              <a:rPr/>
+              <a:t> → Safety alerts, “cautious race” mode</a:t>
+            </a:r>
+          </a:p>
+          <a:p>
+            <a:pPr lvl="0" indent="0" marL="0">
+              <a:buNone/>
+            </a:pPr>
+            <a:r>
+              <a:rPr b="1"/>
+              <a:t>Challenge: Rural areas (few users)</a:t>
+            </a:r>
+            <a:r>
+              <a:rPr/>
+              <a:t> → Asynchronous mode against “ghost runners”</a:t>
+            </a:r>
+          </a:p>
+          <a:p>
+            <a:pPr lvl="0" indent="0" marL="0">
+              <a:buNone/>
+            </a:pPr>
+            <a:r>
+              <a:rPr b="1"/>
+              <a:t>Challenge: Cheating (bike, car)</a:t>
+            </a:r>
+            <a:r>
+              <a:rPr/>
+              <a:t> → Abnormal speed detection + community validation</a:t>
+            </a:r>
+          </a:p>
+          <a:p>
+            <a:pPr lvl="0" indent="0" marL="0">
+              <a:buNone/>
+            </a:pPr>
+            <a:r>
+              <a:rPr b="1"/>
+              <a:t>Challenge: Privacy</a:t>
+            </a:r>
+            <a:r>
+              <a:rPr/>
+              <a:t> → Position visible only during duel, user blocking</a:t>
             </a:r>
           </a:p>
         </p:txBody>
@@ -4447,7 +4447,7 @@
             </a:pPr>
             <a:r>
               <a:rPr/>
-              <a:t>🟦 Slide 1 – Titre</a:t>
+              <a:t>🟦 Slide 1 – Title</a:t>
             </a:r>
           </a:p>
         </p:txBody>
@@ -4481,20 +4481,20 @@
             </a:pPr>
             <a:r>
               <a:rPr sz="2000"/>
-              <a:t>L’application de course compétitive en temps réel</a:t>
-            </a:r>
-          </a:p>
-          <a:p>
-            <a:pPr lvl="0" indent="0" marL="0">
-              <a:buNone/>
-            </a:pPr>
-            <a:r>
-              <a:rPr b="1"/>
-              <a:t>Sous‑titre :</a:t>
-            </a:r>
-            <a:r>
-              <a:rPr/>
-              <a:t> Transformez chaque sortie running en duel excitant.</a:t>
+              <a:t>The real-time competitive running app</a:t>
+            </a:r>
+          </a:p>
+          <a:p>
+            <a:pPr lvl="0" indent="0" marL="0">
+              <a:buNone/>
+            </a:pPr>
+            <a:r>
+              <a:rPr b="1"/>
+              <a:t>Subtitle:</a:t>
+            </a:r>
+            <a:r>
+              <a:rPr/>
+              <a:t> Turn every run into an exciting duel.</a:t>
             </a:r>
           </a:p>
         </p:txBody>
@@ -4566,28 +4566,28 @@
             </a:pPr>
             <a:r>
               <a:rPr sz="2000"/>
-              <a:t>GeoRace ne se contente pas de tracker vos courses. Nous transformons la course à pied en une </a:t>
+              <a:t>GeoRace doesn’t just track your runs. We transform running into a </a:t>
             </a:r>
             <a:r>
               <a:rPr sz="2000" b="1"/>
-              <a:t>expérience sociale, compétitive et motivante</a:t>
+              <a:t>social, competitive, and motivating experience</a:t>
             </a:r>
             <a:r>
               <a:rPr sz="2000"/>
-              <a:t> accessible à tous, partout, à tout moment.</a:t>
-            </a:r>
-          </a:p>
-          <a:p>
-            <a:pPr lvl="0" indent="0" marL="0">
-              <a:buNone/>
-            </a:pPr>
-            <a:r>
-              <a:rPr b="1"/>
-              <a:t>Notre ambition :</a:t>
-            </a:r>
-            <a:r>
-              <a:rPr/>
-              <a:t> Devenir la référence de la course compétitive en temps réel et créer une communauté mondiale de coureurs passionnés par le défi.</a:t>
+              <a:t> accessible to everyone, everywhere, anytime.</a:t>
+            </a:r>
+          </a:p>
+          <a:p>
+            <a:pPr lvl="0" indent="0" marL="0">
+              <a:buNone/>
+            </a:pPr>
+            <a:r>
+              <a:rPr b="1"/>
+              <a:t>Our ambition:</a:t>
+            </a:r>
+            <a:r>
+              <a:rPr/>
+              <a:t> Become the reference for real-time competitive running and create a global community of runners passionate about challenges.</a:t>
             </a:r>
           </a:p>
         </p:txBody>
@@ -4634,7 +4634,7 @@
             </a:pPr>
             <a:r>
               <a:rPr/>
-              <a:t>🟦 Slide 20 – Phrase finale</a:t>
+              <a:t>🟦 Slide 20 – Final message</a:t>
             </a:r>
           </a:p>
         </p:txBody>
@@ -4668,16 +4668,16 @@
             </a:pPr>
             <a:r>
               <a:rPr sz="2000"/>
-              <a:t>Chaque course est un duel. Chaque duel est une opportunité. Transformez votre motivation.</a:t>
-            </a:r>
-          </a:p>
-          <a:p>
-            <a:pPr lvl="0" indent="0" marL="0">
-              <a:buNone/>
-            </a:pPr>
-            <a:r>
-              <a:rPr b="1"/>
-              <a:t>Prêt à relever le défi ?</a:t>
+              <a:t>Every run is a duel. Every duel is an opportunity. Transform your motivation.</a:t>
+            </a:r>
+          </a:p>
+          <a:p>
+            <a:pPr lvl="0" indent="0" marL="0">
+              <a:buNone/>
+            </a:pPr>
+            <a:r>
+              <a:rPr b="1"/>
+              <a:t>Ready to take on the challenge?</a:t>
             </a:r>
           </a:p>
         </p:txBody>
@@ -4724,7 +4724,7 @@
             </a:pPr>
             <a:r>
               <a:rPr/>
-              <a:t>🟦 Slide 2 – Problème</a:t>
+              <a:t>🟦 Slide 2 – Problem</a:t>
             </a:r>
           </a:p>
         </p:txBody>
@@ -4749,44 +4749,44 @@
             </a:pPr>
             <a:r>
               <a:rPr b="1"/>
-              <a:t>Courir seul, une motivation en berne</a:t>
+              <a:t>Running alone, declining motivation</a:t>
             </a:r>
           </a:p>
           <a:p>
             <a:pPr lvl="0"/>
             <a:r>
               <a:rPr/>
-              <a:t>De nombreux coureurs se sentent démotivés seuls</a:t>
+              <a:t>Many runners feel demotivated when running alone</a:t>
             </a:r>
           </a:p>
           <a:p>
             <a:pPr lvl="0"/>
             <a:r>
               <a:rPr/>
-              <a:t>Manque de défi et d’interaction</a:t>
+              <a:t>Lack of challenge and interaction</a:t>
             </a:r>
           </a:p>
           <a:p>
             <a:pPr lvl="0"/>
             <a:r>
               <a:rPr/>
-              <a:t>Difficulté à mesurer ses progrès face à d’autres</a:t>
+              <a:t>Difficulty measuring progress against others</a:t>
             </a:r>
           </a:p>
           <a:p>
             <a:pPr lvl="0"/>
             <a:r>
               <a:rPr/>
-              <a:t>Risque d’abandon des objectifs sportifs</a:t>
-            </a:r>
-          </a:p>
-          <a:p>
-            <a:pPr lvl="0" indent="0" marL="0">
-              <a:buNone/>
-            </a:pPr>
-            <a:r>
-              <a:rPr/>
-              <a:t>➡ Résultat : monotonie, perte de motivation, arrêt de la pratique</a:t>
+              <a:t>Risk of abandoning fitness goals</a:t>
+            </a:r>
+          </a:p>
+          <a:p>
+            <a:pPr lvl="0" indent="0" marL="0">
+              <a:buNone/>
+            </a:pPr>
+            <a:r>
+              <a:rPr/>
+              <a:t>➡ Result: monotony, loss of motivation, practice abandonment</a:t>
             </a:r>
           </a:p>
         </p:txBody>
@@ -4833,7 +4833,7 @@
             </a:pPr>
             <a:r>
               <a:rPr/>
-              <a:t>🟦 Slide 3 – Nos différenciateurs</a:t>
+              <a:t>🟦 Slide 3 – Our differentiators</a:t>
             </a:r>
           </a:p>
         </p:txBody>
@@ -4858,73 +4858,73 @@
             </a:pPr>
             <a:r>
               <a:rPr b="1"/>
-              <a:t>Ce qui rend GeoRace unique</a:t>
+              <a:t>What makes GeoRace unique</a:t>
             </a:r>
           </a:p>
           <a:p>
             <a:pPr lvl="0"/>
             <a:r>
               <a:rPr b="1"/>
-              <a:t>Duel en temps réel vers un point d’arrivée équidistant</a:t>
-            </a:r>
-            <a:r>
-              <a:rPr/>
-              <a:t> → équité garantie entre coureurs</a:t>
+              <a:t>Real-time duel to an equidistant finish point</a:t>
+            </a:r>
+            <a:r>
+              <a:rPr/>
+              <a:t> → guaranteed fairness between runners</a:t>
             </a:r>
           </a:p>
           <a:p>
             <a:pPr lvl="0"/>
             <a:r>
               <a:rPr b="1"/>
-              <a:t>Matchmaking ELO</a:t>
-            </a:r>
-            <a:r>
-              <a:rPr/>
-              <a:t> → adversaires de niveau comparable, progression visible</a:t>
+              <a:t>ELO Matchmaking</a:t>
+            </a:r>
+            <a:r>
+              <a:rPr/>
+              <a:t> → opponents of comparable level, visible progression</a:t>
             </a:r>
           </a:p>
           <a:p>
             <a:pPr lvl="0"/>
             <a:r>
               <a:rPr b="1"/>
-              <a:t>GPS en direct &amp; suivi synchronisé</a:t>
-            </a:r>
-            <a:r>
-              <a:rPr/>
-              <a:t> → expérience compétitive immédiate</a:t>
+              <a:t>Live GPS &amp; synchronized tracking</a:t>
+            </a:r>
+            <a:r>
+              <a:rPr/>
+              <a:t> → immediate competitive experience</a:t>
             </a:r>
           </a:p>
           <a:p>
             <a:pPr lvl="0"/>
             <a:r>
               <a:rPr b="1"/>
-              <a:t>Confidentialité et sécurité</a:t>
-            </a:r>
-            <a:r>
-              <a:rPr/>
-              <a:t> → partage de position limité aux duels actifs</a:t>
+              <a:t>Privacy and security</a:t>
+            </a:r>
+            <a:r>
+              <a:rPr/>
+              <a:t> → position sharing limited to active duels</a:t>
             </a:r>
           </a:p>
           <a:p>
             <a:pPr lvl="0"/>
             <a:r>
               <a:rPr b="1"/>
-              <a:t>Anti‑triche intégré</a:t>
-            </a:r>
-            <a:r>
-              <a:rPr/>
-              <a:t> (détection d’anomalies GPS, vérifications de parcours)</a:t>
+              <a:t>Integrated anti-cheat</a:t>
+            </a:r>
+            <a:r>
+              <a:rPr/>
+              <a:t> (GPS anomaly detection, route verification)</a:t>
             </a:r>
           </a:p>
           <a:p>
             <a:pPr lvl="0"/>
             <a:r>
               <a:rPr b="1"/>
-              <a:t>Fonctions sociales</a:t>
-            </a:r>
-            <a:r>
-              <a:rPr/>
-              <a:t> → profils, chat, badges, classements locaux</a:t>
+              <a:t>Social features</a:t>
+            </a:r>
+            <a:r>
+              <a:rPr/>
+              <a:t> → profiles, chat, badges, local leaderboards</a:t>
             </a:r>
           </a:p>
         </p:txBody>
@@ -4971,7 +4971,7 @@
             </a:pPr>
             <a:r>
               <a:rPr/>
-              <a:t>🟦 Slide 4 – Pourquoi les utilisateurs nous rejoindront</a:t>
+              <a:t>🟦 Slide 4 – Why users will join us</a:t>
             </a:r>
           </a:p>
         </p:txBody>
@@ -4996,51 +4996,51 @@
             </a:pPr>
             <a:r>
               <a:rPr b="1"/>
-              <a:t>Les raisons de passer à GeoRace</a:t>
+              <a:t>Reasons to switch to GeoRace</a:t>
             </a:r>
           </a:p>
           <a:p>
             <a:pPr lvl="0"/>
             <a:r>
               <a:rPr b="1"/>
-              <a:t>Expérience de duel unique et équitable</a:t>
-            </a:r>
-            <a:r>
-              <a:rPr/>
-              <a:t> = plus de fun et de challenge</a:t>
+              <a:t>Unique and fair duel experience</a:t>
+            </a:r>
+            <a:r>
+              <a:rPr/>
+              <a:t> = more fun and challenge</a:t>
             </a:r>
           </a:p>
           <a:p>
             <a:pPr lvl="0"/>
             <a:r>
               <a:rPr b="1"/>
-              <a:t>Progression visible (ELO)</a:t>
-            </a:r>
-            <a:r>
-              <a:rPr/>
-              <a:t> = motivation à revenir</a:t>
+              <a:t>Visible progression (ELO)</a:t>
+            </a:r>
+            <a:r>
+              <a:rPr/>
+              <a:t> = motivation to return</a:t>
             </a:r>
           </a:p>
           <a:p>
             <a:pPr lvl="0"/>
             <a:r>
               <a:rPr b="1"/>
-              <a:t>Événements locaux &amp; tournois</a:t>
-            </a:r>
-            <a:r>
-              <a:rPr/>
-              <a:t> = opportunités sociales et récompenses</a:t>
+              <a:t>Local events &amp; tournaments</a:t>
+            </a:r>
+            <a:r>
+              <a:rPr/>
+              <a:t> = social opportunities and rewards</a:t>
             </a:r>
           </a:p>
           <a:p>
             <a:pPr lvl="0"/>
             <a:r>
               <a:rPr b="1"/>
-              <a:t>Transfert facile des amis</a:t>
-            </a:r>
-            <a:r>
-              <a:rPr/>
-              <a:t> via invitations et duels immédiats</a:t>
+              <a:t>Easy friend transfer</a:t>
+            </a:r>
+            <a:r>
+              <a:rPr/>
+              <a:t> via invitations and immediate duels</a:t>
             </a:r>
           </a:p>
         </p:txBody>
@@ -5087,7 +5087,7 @@
             </a:pPr>
             <a:r>
               <a:rPr/>
-              <a:t>🟦 Slide 5 – Stratégie d’acquisition (comment voler des utilisateurs aux concurrents)</a:t>
+              <a:t>🟦 Slide 5 – Acquisition strategy (how to steal users from competitors)</a:t>
             </a:r>
           </a:p>
         </p:txBody>
@@ -5112,73 +5112,73 @@
             </a:pPr>
             <a:r>
               <a:rPr b="1"/>
-              <a:t>Tactiques concrètes pour attirer les utilisateurs</a:t>
+              <a:t>Concrete tactics to attract users</a:t>
             </a:r>
           </a:p>
           <a:p>
             <a:pPr lvl="0"/>
             <a:r>
               <a:rPr b="1"/>
-              <a:t>Ciblage local</a:t>
-            </a:r>
-            <a:r>
-              <a:rPr/>
-              <a:t> : organiser micro‑événements et challenges dans les parcs et campus</a:t>
+              <a:t>Local targeting</a:t>
+            </a:r>
+            <a:r>
+              <a:rPr/>
+              <a:t>: organize micro-events and challenges in parks and campuses</a:t>
             </a:r>
           </a:p>
           <a:p>
             <a:pPr lvl="0"/>
             <a:r>
               <a:rPr b="1"/>
-              <a:t>Partenariats</a:t>
-            </a:r>
-            <a:r>
-              <a:rPr/>
-              <a:t> avec clubs de course, coachs, influenceurs locaux</a:t>
+              <a:t>Partnerships</a:t>
+            </a:r>
+            <a:r>
+              <a:rPr/>
+              <a:t> with running clubs, coaches, local influencers</a:t>
             </a:r>
           </a:p>
           <a:p>
             <a:pPr lvl="0"/>
             <a:r>
               <a:rPr b="1"/>
-              <a:t>Intégrations &amp; porte d’entrée</a:t>
-            </a:r>
-            <a:r>
-              <a:rPr/>
-              <a:t> : import simplifié depuis Strava/Runkeeper + import d’amis</a:t>
+              <a:t>Integrations &amp; entry point</a:t>
+            </a:r>
+            <a:r>
+              <a:rPr/>
+              <a:t>: simplified import from Strava/Runkeeper + friend import</a:t>
             </a:r>
           </a:p>
           <a:p>
             <a:pPr lvl="0"/>
             <a:r>
               <a:rPr b="1"/>
-              <a:t>Programmes d’incitation</a:t>
-            </a:r>
-            <a:r>
-              <a:rPr/>
-              <a:t> : duels gratuits/bonus initial ELO, récompenses, badges exclusifs</a:t>
+              <a:t>Incentive programs</a:t>
+            </a:r>
+            <a:r>
+              <a:rPr/>
+              <a:t>: free duels/initial ELO bonus, rewards, exclusive badges</a:t>
             </a:r>
           </a:p>
           <a:p>
             <a:pPr lvl="0"/>
             <a:r>
               <a:rPr b="1"/>
-              <a:t>Campagnes social media</a:t>
-            </a:r>
-            <a:r>
-              <a:rPr/>
-              <a:t> montrant duels en direct + récits d’utilisateurs</a:t>
+              <a:t>Social media campaigns</a:t>
+            </a:r>
+            <a:r>
+              <a:rPr/>
+              <a:t> showing live duels + user stories</a:t>
             </a:r>
           </a:p>
           <a:p>
             <a:pPr lvl="0"/>
             <a:r>
               <a:rPr b="1"/>
-              <a:t>Fonctionnalités différenciantes en onboarding</a:t>
-            </a:r>
-            <a:r>
-              <a:rPr/>
-              <a:t> (démonstration duel en 30s)</a:t>
+              <a:t>Differentiating features in onboarding</a:t>
+            </a:r>
+            <a:r>
+              <a:rPr/>
+              <a:t> (30s duel demonstration)</a:t>
             </a:r>
           </a:p>
         </p:txBody>
@@ -5225,7 +5225,7 @@
             </a:pPr>
             <a:r>
               <a:rPr/>
-              <a:t>🟦 Slide 6 – Concept innovant : Le mode duel</a:t>
+              <a:t>🟦 Slide 6 – Innovative concept: Duel mode</a:t>
             </a:r>
           </a:p>
         </p:txBody>
@@ -5250,7 +5250,7 @@
             </a:pPr>
             <a:r>
               <a:rPr b="1"/>
-              <a:t>Duels en temps réel pour tous</a:t>
+              <a:t>Real-time duels for everyone</a:t>
             </a:r>
           </a:p>
           <a:p>
@@ -5263,11 +5263,11 @@
             </a:r>
             <a:r>
               <a:rPr b="1"/>
-              <a:t>DUELS EN TEMPS RÉEL</a:t>
-            </a:r>
-            <a:r>
-              <a:rPr/>
-              <a:t> Affrontez d’autres coureurs à proximité dans des courses spontanées</a:t>
+              <a:t>REAL-TIME DUELS</a:t>
+            </a:r>
+            <a:r>
+              <a:rPr/>
+              <a:t> Face other nearby runners in spontaneous races</a:t>
             </a:r>
           </a:p>
           <a:p>
@@ -5280,11 +5280,11 @@
             </a:r>
             <a:r>
               <a:rPr b="1"/>
-              <a:t>POINT D’ARRIVÉE ÉQUITABLE</a:t>
-            </a:r>
-            <a:r>
-              <a:rPr/>
-              <a:t> Chaque duel se termine à un point équidistant pour tous les participants</a:t>
+              <a:t>FAIR FINISH POINT</a:t>
+            </a:r>
+            <a:r>
+              <a:rPr/>
+              <a:t> Each duel ends at an equidistant point for all participants</a:t>
             </a:r>
           </a:p>
           <a:p>
@@ -5297,11 +5297,11 @@
             </a:r>
             <a:r>
               <a:rPr b="1"/>
-              <a:t>COMPÉTITION JUSTE</a:t>
-            </a:r>
-            <a:r>
-              <a:rPr/>
-              <a:t> Système ELO garantit des matchs équilibrés quel que soit votre niveau</a:t>
+              <a:t>FAIR COMPETITION</a:t>
+            </a:r>
+            <a:r>
+              <a:rPr/>
+              <a:t> ELO system ensures balanced matches regardless of your level</a:t>
             </a:r>
           </a:p>
         </p:txBody>
@@ -5348,7 +5348,7 @@
             </a:pPr>
             <a:r>
               <a:rPr/>
-              <a:t>🟦 Slide 7 – Fonctionnement d’un duel</a:t>
+              <a:t>🟦 Slide 7 – How a duel works</a:t>
             </a:r>
           </a:p>
         </p:txBody>
@@ -5373,46 +5373,46 @@
             </a:pPr>
             <a:r>
               <a:rPr b="1"/>
-              <a:t>3 étapes simples</a:t>
-            </a:r>
-          </a:p>
-          <a:p>
-            <a:pPr lvl="0" indent="0" marL="0">
-              <a:buNone/>
-            </a:pPr>
-            <a:r>
-              <a:rPr b="1"/>
-              <a:t>01 - DÉTECTION DES COUREURS</a:t>
-            </a:r>
-            <a:r>
-              <a:rPr/>
-              <a:t> Identification automatique des coureurs actifs à proximité</a:t>
-            </a:r>
-          </a:p>
-          <a:p>
-            <a:pPr lvl="0" indent="0" marL="0">
-              <a:buNone/>
-            </a:pPr>
-            <a:r>
-              <a:rPr b="1"/>
-              <a:t>02 - POINT D’ARRIVÉE ÉQUITABLE</a:t>
-            </a:r>
-            <a:r>
-              <a:rPr/>
-              <a:t> Calcul algorithmique d’un point accessible à distance égale pour tous</a:t>
-            </a:r>
-          </a:p>
-          <a:p>
-            <a:pPr lvl="0" indent="0" marL="0">
-              <a:buNone/>
-            </a:pPr>
-            <a:r>
-              <a:rPr b="1"/>
-              <a:t>03 - DÉPART SIMULTANÉ</a:t>
-            </a:r>
-            <a:r>
-              <a:rPr/>
-              <a:t> Compte à rebours synchronisé après acceptation mutuelle</a:t>
+              <a:t>3 simple steps</a:t>
+            </a:r>
+          </a:p>
+          <a:p>
+            <a:pPr lvl="0" indent="0" marL="0">
+              <a:buNone/>
+            </a:pPr>
+            <a:r>
+              <a:rPr b="1"/>
+              <a:t>01 - RUNNER DETECTION</a:t>
+            </a:r>
+            <a:r>
+              <a:rPr/>
+              <a:t> Automatic identification of active runners nearby</a:t>
+            </a:r>
+          </a:p>
+          <a:p>
+            <a:pPr lvl="0" indent="0" marL="0">
+              <a:buNone/>
+            </a:pPr>
+            <a:r>
+              <a:rPr b="1"/>
+              <a:t>02 - FAIR FINISH POINT</a:t>
+            </a:r>
+            <a:r>
+              <a:rPr/>
+              <a:t> Algorithmic calculation of a point accessible at equal distance for all</a:t>
+            </a:r>
+          </a:p>
+          <a:p>
+            <a:pPr lvl="0" indent="0" marL="0">
+              <a:buNone/>
+            </a:pPr>
+            <a:r>
+              <a:rPr b="1"/>
+              <a:t>03 - SIMULTANEOUS START</a:t>
+            </a:r>
+            <a:r>
+              <a:rPr/>
+              <a:t> Synchronized countdown after mutual acceptance</a:t>
             </a:r>
           </a:p>
         </p:txBody>
@@ -5459,7 +5459,7 @@
             </a:pPr>
             <a:r>
               <a:rPr/>
-              <a:t>🟦 Slide 8 – Un duel GeoRace</a:t>
+              <a:t>🟦 Slide 8 – A GeoRace duel</a:t>
             </a:r>
           </a:p>
         </p:txBody>
@@ -5484,7 +5484,7 @@
             </a:pPr>
             <a:r>
               <a:rPr b="1"/>
-              <a:t>Scénario typique :</a:t>
+              <a:t>Typical scenario:</a:t>
             </a:r>
           </a:p>
           <a:p>
@@ -5493,11 +5493,11 @@
             </a:pPr>
             <a:r>
               <a:rPr b="1"/>
-              <a:t>Vous commencez votre course</a:t>
-            </a:r>
-            <a:r>
-              <a:rPr/>
-              <a:t> → l’app détecte 3 coureurs dans un rayon de 800m</a:t>
+              <a:t>You start your run</a:t>
+            </a:r>
+            <a:r>
+              <a:rPr/>
+              <a:t> → the app detects 3 runners within 800m</a:t>
             </a:r>
           </a:p>
           <a:p>
@@ -5506,11 +5506,11 @@
             </a:pPr>
             <a:r>
               <a:rPr b="1"/>
-              <a:t>Proposition de duel</a:t>
-            </a:r>
-            <a:r>
-              <a:rPr/>
-              <a:t> → notification “Paul (ELO 1420) vous défie”</a:t>
+              <a:t>Duel proposal</a:t>
+            </a:r>
+            <a:r>
+              <a:rPr/>
+              <a:t> → notification “Paul (ELO 1420) challenges you”</a:t>
             </a:r>
           </a:p>
           <a:p>
@@ -5519,11 +5519,11 @@
             </a:pPr>
             <a:r>
               <a:rPr b="1"/>
-              <a:t>Vous acceptez</a:t>
-            </a:r>
-            <a:r>
-              <a:rPr/>
-              <a:t> → le système calcule un point d’arrivée à 1,2km pour chacun</a:t>
+              <a:t>You accept</a:t>
+            </a:r>
+            <a:r>
+              <a:rPr/>
+              <a:t> → the system calculates a finish point at 1.2km for each</a:t>
             </a:r>
           </a:p>
           <a:p>
@@ -5532,11 +5532,11 @@
             </a:pPr>
             <a:r>
               <a:rPr b="1"/>
-              <a:t>Départ dans 10 secondes</a:t>
-            </a:r>
-            <a:r>
-              <a:rPr/>
-              <a:t> → compte à rebours</a:t>
+              <a:t>Start in 10 seconds</a:t>
+            </a:r>
+            <a:r>
+              <a:rPr/>
+              <a:t> → countdown</a:t>
             </a:r>
           </a:p>
           <a:p>
@@ -5545,11 +5545,11 @@
             </a:pPr>
             <a:r>
               <a:rPr b="1"/>
-              <a:t>Course en direct</a:t>
-            </a:r>
-            <a:r>
-              <a:rPr/>
-              <a:t> → GPS vous guide, position de l’adversaire visible</a:t>
+              <a:t>Live race</a:t>
+            </a:r>
+            <a:r>
+              <a:rPr/>
+              <a:t> → GPS guides you, opponent’s position visible</a:t>
             </a:r>
           </a:p>
           <a:p>
@@ -5558,11 +5558,11 @@
             </a:pPr>
             <a:r>
               <a:rPr b="1"/>
-              <a:t>Arrivée</a:t>
-            </a:r>
-            <a:r>
-              <a:rPr/>
-              <a:t> → +25 ELO, badge “5 victoires consécutives” débloqué</a:t>
+              <a:t>Finish</a:t>
+            </a:r>
+            <a:r>
+              <a:rPr/>
+              <a:t> → +25 ELO, badge “5 consecutive victories” unlocked</a:t>
             </a:r>
           </a:p>
         </p:txBody>

</xml_diff>

<commit_message>
Modify build scripts to output files locally without zipping; add Windows portability and pitch slides
Co-authored-by: TLX542 <146343079+TLX542@users.noreply.github.com>
</commit_message>
<xml_diff>
--- a/GeoRace_presentation.pptx
+++ b/GeoRace_presentation.pptx
@@ -29,6 +29,10 @@
     <p:sldId id="277" r:id="rId23"/>
     <p:sldId id="278" r:id="rId24"/>
     <p:sldId id="279" r:id="rId25"/>
+    <p:sldId id="280" r:id="rId30"/>
+    <p:sldId id="281" r:id="rId31"/>
+    <p:sldId id="282" r:id="rId32"/>
+    <p:sldId id="283" r:id="rId33"/>
   </p:sldIdLst>
   <p:sldSz cx="9144000" cy="5143500" type="screen16x9"/>
   <p:notesSz cx="6858000" cy="9144000"/>
@@ -5713,6 +5717,330 @@
 </p:sld>
 </file>
 
+<file path=ppt/slides/slide25.xml><?xml version="1.0" encoding="utf-8"?>
+<p:sld xmlns:a="http://schemas.openxmlformats.org/drawingml/2006/main" xmlns:p="http://schemas.openxmlformats.org/presentationml/2006/main" xmlns:r="http://schemas.openxmlformats.org/officeDocument/2006/relationships">
+  <p:cSld>
+    <p:spTree>
+      <p:nvGrpSpPr>
+        <p:cNvPr id="1" name=""/>
+        <p:cNvGrpSpPr/>
+        <p:nvPr/>
+      </p:nvGrpSpPr>
+      <p:grpSpPr/>
+      <p:sp>
+        <p:nvSpPr>
+          <p:cNvPr id="2" name="Title 1"/>
+          <p:cNvSpPr>
+            <a:spLocks noGrp="1"/>
+          </p:cNvSpPr>
+          <p:nvPr>
+            <p:ph type="title"/>
+          </p:nvPr>
+        </p:nvSpPr>
+        <p:spPr/>
+        <p:txBody>
+          <a:bodyPr/>
+          <a:lstStyle/>
+          <a:p>
+            <a:r>
+              <a:t>Différenciateurs clés</a:t>
+            </a:r>
+          </a:p>
+        </p:txBody>
+      </p:sp>
+      <p:sp>
+        <p:nvSpPr>
+          <p:cNvPr id="3" name="Content Placeholder 2"/>
+          <p:cNvSpPr>
+            <a:spLocks noGrp="1"/>
+          </p:cNvSpPr>
+          <p:nvPr>
+            <p:ph idx="1"/>
+          </p:nvPr>
+        </p:nvSpPr>
+        <p:spPr/>
+        <p:txBody>
+          <a:bodyPr/>
+          <a:lstStyle/>
+          <a:p/>
+          <a:p>
+            <a:pPr/>
+            <a:r>
+              <a:t>Mode Duel en temps réel: appariement local instantané vers une arrivée équidistante pour garantir l'équité</a:t>
+            </a:r>
+          </a:p>
+          <a:p>
+            <a:pPr/>
+            <a:r>
+              <a:t>Matchmaking ELO: adversaires de niveau comparable et progression visible</a:t>
+            </a:r>
+          </a:p>
+          <a:p>
+            <a:pPr/>
+            <a:r>
+              <a:t>Confidentialité &amp; sécurité: position partagée uniquement pendant le duel, anti‑triche GPS</a:t>
+            </a:r>
+          </a:p>
+          <a:p>
+            <a:pPr/>
+            <a:r>
+              <a:t>Expérience sociale: profils, chat, badges, et défis locaux</a:t>
+            </a:r>
+          </a:p>
+        </p:txBody>
+      </p:sp>
+    </p:spTree>
+  </p:cSld>
+  <p:clrMapOvr>
+    <a:masterClrMapping/>
+  </p:clrMapOvr>
+</p:sld>
+</file>
+
+<file path=ppt/slides/slide26.xml><?xml version="1.0" encoding="utf-8"?>
+<p:sld xmlns:a="http://schemas.openxmlformats.org/drawingml/2006/main" xmlns:p="http://schemas.openxmlformats.org/presentationml/2006/main" xmlns:r="http://schemas.openxmlformats.org/officeDocument/2006/relationships">
+  <p:cSld>
+    <p:spTree>
+      <p:nvGrpSpPr>
+        <p:cNvPr id="1" name=""/>
+        <p:cNvGrpSpPr/>
+        <p:nvPr/>
+      </p:nvGrpSpPr>
+      <p:grpSpPr/>
+      <p:sp>
+        <p:nvSpPr>
+          <p:cNvPr id="2" name="Title 1"/>
+          <p:cNvSpPr>
+            <a:spLocks noGrp="1"/>
+          </p:cNvSpPr>
+          <p:nvPr>
+            <p:ph type="title"/>
+          </p:nvPr>
+        </p:nvSpPr>
+        <p:spPr/>
+        <p:txBody>
+          <a:bodyPr/>
+          <a:lstStyle/>
+          <a:p>
+            <a:r>
+              <a:t>Pourquoi les utilisateurs vont basculer</a:t>
+            </a:r>
+          </a:p>
+        </p:txBody>
+      </p:sp>
+      <p:sp>
+        <p:nvSpPr>
+          <p:cNvPr id="3" name="Content Placeholder 2"/>
+          <p:cNvSpPr>
+            <a:spLocks noGrp="1"/>
+          </p:cNvSpPr>
+          <p:nvPr>
+            <p:ph idx="1"/>
+          </p:nvPr>
+        </p:nvSpPr>
+        <p:spPr/>
+        <p:txBody>
+          <a:bodyPr/>
+          <a:lstStyle/>
+          <a:p/>
+          <a:p>
+            <a:pPr/>
+            <a:r>
+              <a:t>Concurrence immédiate et sociale, pas seulement des classements passifs</a:t>
+            </a:r>
+          </a:p>
+          <a:p>
+            <a:pPr/>
+            <a:r>
+              <a:t>Démarrage sans friction: duels instantanés avec coureurs proches</a:t>
+            </a:r>
+          </a:p>
+          <a:p>
+            <a:pPr/>
+            <a:r>
+              <a:t>Sentiment d'équité et progression mesurable (ELO)</a:t>
+            </a:r>
+          </a:p>
+        </p:txBody>
+      </p:sp>
+    </p:spTree>
+  </p:cSld>
+  <p:clrMapOvr>
+    <a:masterClrMapping/>
+  </p:clrMapOvr>
+</p:sld>
+</file>
+
+<file path=ppt/slides/slide27.xml><?xml version="1.0" encoding="utf-8"?>
+<p:sld xmlns:a="http://schemas.openxmlformats.org/drawingml/2006/main" xmlns:p="http://schemas.openxmlformats.org/presentationml/2006/main" xmlns:r="http://schemas.openxmlformats.org/officeDocument/2006/relationships">
+  <p:cSld>
+    <p:spTree>
+      <p:nvGrpSpPr>
+        <p:cNvPr id="1" name=""/>
+        <p:cNvGrpSpPr/>
+        <p:nvPr/>
+      </p:nvGrpSpPr>
+      <p:grpSpPr/>
+      <p:sp>
+        <p:nvSpPr>
+          <p:cNvPr id="2" name="Title 1"/>
+          <p:cNvSpPr>
+            <a:spLocks noGrp="1"/>
+          </p:cNvSpPr>
+          <p:nvPr>
+            <p:ph type="title"/>
+          </p:nvPr>
+        </p:nvSpPr>
+        <p:spPr/>
+        <p:txBody>
+          <a:bodyPr/>
+          <a:lstStyle/>
+          <a:p>
+            <a:r>
+              <a:t>Stratégies d'acquisition</a:t>
+            </a:r>
+          </a:p>
+        </p:txBody>
+      </p:sp>
+      <p:sp>
+        <p:nvSpPr>
+          <p:cNvPr id="3" name="Content Placeholder 2"/>
+          <p:cNvSpPr>
+            <a:spLocks noGrp="1"/>
+          </p:cNvSpPr>
+          <p:nvPr>
+            <p:ph idx="1"/>
+          </p:nvPr>
+        </p:nvSpPr>
+        <p:spPr/>
+        <p:txBody>
+          <a:bodyPr/>
+          <a:lstStyle/>
+          <a:p/>
+          <a:p>
+            <a:pPr>
+              <a:defRPr b="1"/>
+            </a:pPr>
+            <a:r>
+              <a:t>Reprendre des utilisateurs d'apps concurrentes:</a:t>
+            </a:r>
+          </a:p>
+          <a:p>
+            <a:pPr lvl="1"/>
+            <a:r>
+              <a:t>Partenariats locaux (clubs de running, parkrun) et événements "Duel GeoRace"</a:t>
+            </a:r>
+          </a:p>
+          <a:p>
+            <a:pPr lvl="1"/>
+            <a:r>
+              <a:t>Campagnes influenceurs: défis en direct et contenu partageable</a:t>
+            </a:r>
+          </a:p>
+          <a:p>
+            <a:pPr lvl="1"/>
+            <a:r>
+              <a:t>Offres de parrainage pour duels: crédits ou badges pour inviter</a:t>
+            </a:r>
+          </a:p>
+          <a:p>
+            <a:pPr lvl="1"/>
+            <a:r>
+              <a:t>Notifications géolocalisées: proposer un duel quand des coureurs compatibles sont proches</a:t>
+            </a:r>
+          </a:p>
+        </p:txBody>
+      </p:sp>
+    </p:spTree>
+  </p:cSld>
+  <p:clrMapOvr>
+    <a:masterClrMapping/>
+  </p:clrMapOvr>
+</p:sld>
+</file>
+
+<file path=ppt/slides/slide28.xml><?xml version="1.0" encoding="utf-8"?>
+<p:sld xmlns:a="http://schemas.openxmlformats.org/drawingml/2006/main" xmlns:p="http://schemas.openxmlformats.org/presentationml/2006/main" xmlns:r="http://schemas.openxmlformats.org/officeDocument/2006/relationships">
+  <p:cSld>
+    <p:spTree>
+      <p:nvGrpSpPr>
+        <p:cNvPr id="1" name=""/>
+        <p:cNvGrpSpPr/>
+        <p:nvPr/>
+      </p:nvGrpSpPr>
+      <p:grpSpPr/>
+      <p:sp>
+        <p:nvSpPr>
+          <p:cNvPr id="2" name="Title 1"/>
+          <p:cNvSpPr>
+            <a:spLocks noGrp="1"/>
+          </p:cNvSpPr>
+          <p:nvPr>
+            <p:ph type="title"/>
+          </p:nvPr>
+        </p:nvSpPr>
+        <p:spPr/>
+        <p:txBody>
+          <a:bodyPr/>
+          <a:lstStyle/>
+          <a:p>
+            <a:r>
+              <a:t>Convaincre les utilisateurs d'essayer GeoRace</a:t>
+            </a:r>
+          </a:p>
+        </p:txBody>
+      </p:sp>
+      <p:sp>
+        <p:nvSpPr>
+          <p:cNvPr id="3" name="Content Placeholder 2"/>
+          <p:cNvSpPr>
+            <a:spLocks noGrp="1"/>
+          </p:cNvSpPr>
+          <p:nvPr>
+            <p:ph idx="1"/>
+          </p:nvPr>
+        </p:nvSpPr>
+        <p:spPr/>
+        <p:txBody>
+          <a:bodyPr/>
+          <a:lstStyle/>
+          <a:p/>
+          <a:p>
+            <a:pPr>
+              <a:defRPr b="1" sz="1600"/>
+            </a:pPr>
+            <a:r>
+              <a:t>Message principal: "Transformez chaque course en compétition instantanée"</a:t>
+            </a:r>
+          </a:p>
+          <a:p>
+            <a:pPr lvl="1"/>
+            <a:r>
+              <a:t>Défiez des coureurs près de chez vous en temps réel</a:t>
+            </a:r>
+          </a:p>
+          <a:p>
+            <a:pPr lvl="1"/>
+            <a:r>
+              <a:t>Courses équitables avec arrivée équidistante garantie</a:t>
+            </a:r>
+          </a:p>
+          <a:p>
+            <a:pPr lvl="1"/>
+            <a:r>
+              <a:t>Progressez avec le système ELO et montez dans les classements</a:t>
+            </a:r>
+          </a:p>
+        </p:txBody>
+      </p:sp>
+    </p:spTree>
+  </p:cSld>
+  <p:clrMapOvr>
+    <a:masterClrMapping/>
+  </p:clrMapOvr>
+</p:sld>
+</file>
+
 <file path=ppt/slides/slide3.xml><?xml version="1.0" encoding="utf-8"?>
 <p:sld xmlns:a="http://schemas.openxmlformats.org/drawingml/2006/main" xmlns:r="http://schemas.openxmlformats.org/officeDocument/2006/relationships" xmlns:p="http://schemas.openxmlformats.org/presentationml/2006/main">
   <p:cSld>
@@ -7010,265 +7338,4 @@
   </a:objectDefaults>
   <a:extraClrSchemeLst/>
 </a:theme>
-</file>
-
-<file path=ppt/theme/theme2.xml><?xml version="1.0" encoding="utf-8"?>
-<a:theme xmlns:a="http://schemas.openxmlformats.org/drawingml/2006/main" name="Office Theme">
-  <a:themeElements>
-    <a:clrScheme name="Office">
-      <a:dk1>
-        <a:sysClr val="windowText" lastClr="000000"/>
-      </a:dk1>
-      <a:lt1>
-        <a:sysClr val="window" lastClr="FFFFFF"/>
-      </a:lt1>
-      <a:dk2>
-        <a:srgbClr val="44546A"/>
-      </a:dk2>
-      <a:lt2>
-        <a:srgbClr val="E7E6E6"/>
-      </a:lt2>
-      <a:accent1>
-        <a:srgbClr val="5B9BD5"/>
-      </a:accent1>
-      <a:accent2>
-        <a:srgbClr val="ED7D31"/>
-      </a:accent2>
-      <a:accent3>
-        <a:srgbClr val="A5A5A5"/>
-      </a:accent3>
-      <a:accent4>
-        <a:srgbClr val="FFC000"/>
-      </a:accent4>
-      <a:accent5>
-        <a:srgbClr val="4472C4"/>
-      </a:accent5>
-      <a:accent6>
-        <a:srgbClr val="70AD47"/>
-      </a:accent6>
-      <a:hlink>
-        <a:srgbClr val="0563C1"/>
-      </a:hlink>
-      <a:folHlink>
-        <a:srgbClr val="954F72"/>
-      </a:folHlink>
-    </a:clrScheme>
-    <a:fontScheme name="Office">
-      <a:majorFont>
-        <a:latin typeface="Calibri Light" panose="020F0302020204030204"/>
-        <a:ea typeface=""/>
-        <a:cs typeface=""/>
-        <a:font script="Jpan" typeface="ＭＳ Ｐゴシック"/>
-        <a:font script="Hang" typeface="맑은 고딕"/>
-        <a:font script="Hans" typeface="宋体"/>
-        <a:font script="Hant" typeface="新細明體"/>
-        <a:font script="Arab" typeface="Times New Roman"/>
-        <a:font script="Hebr" typeface="Times New Roman"/>
-        <a:font script="Thai" typeface="Angsana New"/>
-        <a:font script="Ethi" typeface="Nyala"/>
-        <a:font script="Beng" typeface="Vrinda"/>
-        <a:font script="Gujr" typeface="Shruti"/>
-        <a:font script="Khmr" typeface="MoolBoran"/>
-        <a:font script="Knda" typeface="Tunga"/>
-        <a:font script="Guru" typeface="Raavi"/>
-        <a:font script="Cans" typeface="Euphemia"/>
-        <a:font script="Cher" typeface="Plantagenet Cherokee"/>
-        <a:font script="Yiii" typeface="Microsoft Yi Baiti"/>
-        <a:font script="Tibt" typeface="Microsoft Himalaya"/>
-        <a:font script="Thaa" typeface="MV Boli"/>
-        <a:font script="Deva" typeface="Mangal"/>
-        <a:font script="Telu" typeface="Gautami"/>
-        <a:font script="Taml" typeface="Latha"/>
-        <a:font script="Syrc" typeface="Estrangelo Edessa"/>
-        <a:font script="Orya" typeface="Kalinga"/>
-        <a:font script="Mlym" typeface="Kartika"/>
-        <a:font script="Laoo" typeface="DokChampa"/>
-        <a:font script="Sinh" typeface="Iskoola Pota"/>
-        <a:font script="Mong" typeface="Mongolian Baiti"/>
-        <a:font script="Viet" typeface="Times New Roman"/>
-        <a:font script="Uigh" typeface="Microsoft Uighur"/>
-        <a:font script="Geor" typeface="Sylfaen"/>
-      </a:majorFont>
-      <a:minorFont>
-        <a:latin typeface="Calibri" panose="020F0502020204030204"/>
-        <a:ea typeface=""/>
-        <a:cs typeface=""/>
-        <a:font script="Jpan" typeface="ＭＳ Ｐゴシック"/>
-        <a:font script="Hang" typeface="맑은 고딕"/>
-        <a:font script="Hans" typeface="宋体"/>
-        <a:font script="Hant" typeface="新細明體"/>
-        <a:font script="Arab" typeface="Arial"/>
-        <a:font script="Hebr" typeface="Arial"/>
-        <a:font script="Thai" typeface="Cordia New"/>
-        <a:font script="Ethi" typeface="Nyala"/>
-        <a:font script="Beng" typeface="Vrinda"/>
-        <a:font script="Gujr" typeface="Shruti"/>
-        <a:font script="Khmr" typeface="DaunPenh"/>
-        <a:font script="Knda" typeface="Tunga"/>
-        <a:font script="Guru" typeface="Raavi"/>
-        <a:font script="Cans" typeface="Euphemia"/>
-        <a:font script="Cher" typeface="Plantagenet Cherokee"/>
-        <a:font script="Yiii" typeface="Microsoft Yi Baiti"/>
-        <a:font script="Tibt" typeface="Microsoft Himalaya"/>
-        <a:font script="Thaa" typeface="MV Boli"/>
-        <a:font script="Deva" typeface="Mangal"/>
-        <a:font script="Telu" typeface="Gautami"/>
-        <a:font script="Taml" typeface="Latha"/>
-        <a:font script="Syrc" typeface="Estrangelo Edessa"/>
-        <a:font script="Orya" typeface="Kalinga"/>
-        <a:font script="Mlym" typeface="Kartika"/>
-        <a:font script="Laoo" typeface="DokChampa"/>
-        <a:font script="Sinh" typeface="Iskoola Pota"/>
-        <a:font script="Mong" typeface="Mongolian Baiti"/>
-        <a:font script="Viet" typeface="Arial"/>
-        <a:font script="Uigh" typeface="Microsoft Uighur"/>
-        <a:font script="Geor" typeface="Sylfaen"/>
-      </a:minorFont>
-    </a:fontScheme>
-    <a:fmtScheme name="Office">
-      <a:fillStyleLst>
-        <a:solidFill>
-          <a:schemeClr val="phClr"/>
-        </a:solidFill>
-        <a:gradFill rotWithShape="1">
-          <a:gsLst>
-            <a:gs pos="0">
-              <a:schemeClr val="phClr">
-                <a:lumMod val="110000"/>
-                <a:satMod val="105000"/>
-                <a:tint val="67000"/>
-              </a:schemeClr>
-            </a:gs>
-            <a:gs pos="50000">
-              <a:schemeClr val="phClr">
-                <a:lumMod val="105000"/>
-                <a:satMod val="103000"/>
-                <a:tint val="73000"/>
-              </a:schemeClr>
-            </a:gs>
-            <a:gs pos="100000">
-              <a:schemeClr val="phClr">
-                <a:lumMod val="105000"/>
-                <a:satMod val="109000"/>
-                <a:tint val="81000"/>
-              </a:schemeClr>
-            </a:gs>
-          </a:gsLst>
-          <a:lin ang="5400000" scaled="0"/>
-        </a:gradFill>
-        <a:gradFill rotWithShape="1">
-          <a:gsLst>
-            <a:gs pos="0">
-              <a:schemeClr val="phClr">
-                <a:satMod val="103000"/>
-                <a:lumMod val="102000"/>
-                <a:tint val="94000"/>
-              </a:schemeClr>
-            </a:gs>
-            <a:gs pos="50000">
-              <a:schemeClr val="phClr">
-                <a:satMod val="110000"/>
-                <a:lumMod val="100000"/>
-                <a:shade val="100000"/>
-              </a:schemeClr>
-            </a:gs>
-            <a:gs pos="100000">
-              <a:schemeClr val="phClr">
-                <a:lumMod val="99000"/>
-                <a:satMod val="120000"/>
-                <a:shade val="78000"/>
-              </a:schemeClr>
-            </a:gs>
-          </a:gsLst>
-          <a:lin ang="5400000" scaled="0"/>
-        </a:gradFill>
-      </a:fillStyleLst>
-      <a:lnStyleLst>
-        <a:ln w="6350" cap="flat" cmpd="sng" algn="ctr">
-          <a:solidFill>
-            <a:schemeClr val="phClr"/>
-          </a:solidFill>
-          <a:prstDash val="solid"/>
-          <a:miter lim="800000"/>
-        </a:ln>
-        <a:ln w="12700" cap="flat" cmpd="sng" algn="ctr">
-          <a:solidFill>
-            <a:schemeClr val="phClr"/>
-          </a:solidFill>
-          <a:prstDash val="solid"/>
-          <a:miter lim="800000"/>
-        </a:ln>
-        <a:ln w="19050" cap="flat" cmpd="sng" algn="ctr">
-          <a:solidFill>
-            <a:schemeClr val="phClr"/>
-          </a:solidFill>
-          <a:prstDash val="solid"/>
-          <a:miter lim="800000"/>
-        </a:ln>
-      </a:lnStyleLst>
-      <a:effectStyleLst>
-        <a:effectStyle>
-          <a:effectLst/>
-        </a:effectStyle>
-        <a:effectStyle>
-          <a:effectLst/>
-        </a:effectStyle>
-        <a:effectStyle>
-          <a:effectLst>
-            <a:outerShdw blurRad="57150" dist="19050" dir="5400000" algn="ctr" rotWithShape="0">
-              <a:srgbClr val="000000">
-                <a:alpha val="63000"/>
-              </a:srgbClr>
-            </a:outerShdw>
-          </a:effectLst>
-        </a:effectStyle>
-      </a:effectStyleLst>
-      <a:bgFillStyleLst>
-        <a:solidFill>
-          <a:schemeClr val="phClr"/>
-        </a:solidFill>
-        <a:solidFill>
-          <a:schemeClr val="phClr">
-            <a:tint val="95000"/>
-            <a:satMod val="170000"/>
-          </a:schemeClr>
-        </a:solidFill>
-        <a:gradFill rotWithShape="1">
-          <a:gsLst>
-            <a:gs pos="0">
-              <a:schemeClr val="phClr">
-                <a:tint val="93000"/>
-                <a:satMod val="150000"/>
-                <a:shade val="98000"/>
-                <a:lumMod val="102000"/>
-              </a:schemeClr>
-            </a:gs>
-            <a:gs pos="50000">
-              <a:schemeClr val="phClr">
-                <a:tint val="98000"/>
-                <a:satMod val="130000"/>
-                <a:shade val="90000"/>
-                <a:lumMod val="103000"/>
-              </a:schemeClr>
-            </a:gs>
-            <a:gs pos="100000">
-              <a:schemeClr val="phClr">
-                <a:shade val="63000"/>
-                <a:satMod val="120000"/>
-              </a:schemeClr>
-            </a:gs>
-          </a:gsLst>
-          <a:lin ang="5400000" scaled="0"/>
-        </a:gradFill>
-      </a:bgFillStyleLst>
-    </a:fmtScheme>
-  </a:themeElements>
-  <a:objectDefaults/>
-  <a:extraClrSchemeLst/>
-  <a:extLst>
-    <a:ext uri="{05A4C25C-085E-4340-85A3-A5531E510DB2}">
-      <thm15:themeFamily xmlns:thm15="http://schemas.microsoft.com/office/thememl/2012/main" name="Office Theme" id="{62F939B6-93AF-4DB8-9C6B-D6C7DFDC589F}" vid="{4A3C46E8-61CC-4603-A589-7422A47A8E4A}"/>
-    </a:ext>
-  </a:extLst>
-</a:theme>
 </file>
</xml_diff>

<commit_message>
Add improved presentation builder and update slides for jury feedback
Co-authored-by: TLX542 <146343079+TLX542@users.noreply.github.com>
</commit_message>
<xml_diff>
--- a/GeoRace_presentation.pptx
+++ b/GeoRace_presentation.pptx
@@ -22,6 +22,10 @@
     <p:sldId id="270" r:id="rId16"/>
     <p:sldId id="271" r:id="rId17"/>
     <p:sldId id="272" r:id="rId18"/>
+    <p:sldId id="273" r:id="rId19"/>
+    <p:sldId id="274" r:id="rId20"/>
+    <p:sldId id="275" r:id="rId21"/>
+    <p:sldId id="276" r:id="rId22"/>
   </p:sldIdLst>
   <p:sldSz cx="9144000" cy="5143500" type="screen16x9"/>
   <p:notesSz cx="6858000" cy="9144000"/>
@@ -3210,7 +3214,7 @@
             </a:pPr>
             <a:r>
               <a:rPr/>
-              <a:t>🟦 Slide 9 – Fonctionnalités clés</a:t>
+              <a:t>🟦 Slide 9 - Ce que Strava ne peut PAS copier</a:t>
             </a:r>
           </a:p>
         </p:txBody>
@@ -3235,62 +3239,60 @@
             </a:pPr>
             <a:r>
               <a:rPr b="1"/>
-              <a:t>Technologie au service de la performance</a:t>
-            </a:r>
-          </a:p>
-          <a:p>
-            <a:pPr lvl="0"/>
-            <a:r>
-              <a:rPr b="1"/>
-              <a:t>GPS haute précision</a:t>
-            </a:r>
-            <a:r>
-              <a:rPr/>
-              <a:t> : tracking en temps réel pendant les duels</a:t>
-            </a:r>
-          </a:p>
-          <a:p>
-            <a:pPr lvl="0"/>
-            <a:r>
-              <a:rPr b="1"/>
-              <a:t>Algorithme intelligent</a:t>
-            </a:r>
-            <a:r>
-              <a:rPr/>
-              <a:t> : calcul de points équidistants accessibles</a:t>
-            </a:r>
-          </a:p>
-          <a:p>
-            <a:pPr lvl="0"/>
-            <a:r>
-              <a:rPr b="1"/>
-              <a:t>Sécurité</a:t>
-            </a:r>
-            <a:r>
-              <a:rPr/>
-              <a:t> : position visible uniquement en duel actif</a:t>
-            </a:r>
-          </a:p>
-          <a:p>
-            <a:pPr lvl="0"/>
-            <a:r>
-              <a:rPr b="1"/>
-              <a:t>Anti-triche</a:t>
-            </a:r>
-            <a:r>
-              <a:rPr/>
-              <a:t> : détection de vitesse anormale et validation communautaire</a:t>
-            </a:r>
-          </a:p>
-          <a:p>
-            <a:pPr lvl="0"/>
-            <a:r>
-              <a:rPr b="1"/>
-              <a:t>Optimisation batterie</a:t>
-            </a:r>
-            <a:r>
-              <a:rPr/>
-              <a:t> : mode économie d’énergie</a:t>
+              <a:t>Nos barrières à l’entrée</a:t>
+            </a:r>
+          </a:p>
+          <a:p>
+            <a:pPr lvl="0" indent="0" marL="0">
+              <a:buNone/>
+            </a:pPr>
+            <a:r>
+              <a:rPr b="1"/>
+              <a:t>1. ALGORITHME DE POINT ÉQUIDISTANT</a:t>
+            </a:r>
+            <a:r>
+              <a:rPr/>
+              <a:t> - Complexité technique : calcul géospatial en temps réel - Brevet déposable : méthode unique de matching géographique équitable</a:t>
+            </a:r>
+          </a:p>
+          <a:p>
+            <a:pPr lvl="0" indent="0" marL="0">
+              <a:buNone/>
+            </a:pPr>
+            <a:r>
+              <a:rPr b="1"/>
+              <a:t>2. INFRASTRUCTURE TEMPS RÉEL</a:t>
+            </a:r>
+            <a:r>
+              <a:rPr/>
+              <a:t> - WebSocket à faible latence pour positions live - Serveurs optimisés pour synchronisation GPS (&lt;500ms)</a:t>
+            </a:r>
+          </a:p>
+          <a:p>
+            <a:pPr lvl="0" indent="0" marL="0">
+              <a:buNone/>
+            </a:pPr>
+            <a:r>
+              <a:rPr b="1"/>
+              <a:t>3. COMMUNAUTÉ DE COMPÉTITEURS</a:t>
+            </a:r>
+            <a:r>
+              <a:rPr/>
+              <a:t> - Effet réseau : plus il y a de coureurs, plus de duels disponibles - Base ELO : impossible à transférer vers un concurrent</a:t>
+            </a:r>
+          </a:p>
+          <a:p>
+            <a:pPr lvl="0" indent="0" marL="0">
+              <a:buNone/>
+            </a:pPr>
+            <a:r>
+              <a:rPr b="1"/>
+              <a:t>Strava excelle dans le tracking passif.</a:t>
+            </a:r>
+            <a:br/>
+            <a:r>
+              <a:rPr b="1"/>
+              <a:t>Nous excellons dans la compétition active.</a:t>
             </a:r>
           </a:p>
         </p:txBody>
@@ -3337,7 +3339,7 @@
             </a:pPr>
             <a:r>
               <a:rPr/>
-              <a:t>🟦 Slide 10 – Cible</a:t>
+              <a:t>🟦 Slide 10 - Stratégie d’acquisition : Convertir les utilisateurs actifs sur d’autres apps</a:t>
             </a:r>
           </a:p>
         </p:txBody>
@@ -3362,67 +3364,111 @@
             </a:pPr>
             <a:r>
               <a:rPr b="1"/>
-              <a:t>Qui utilise GeoRace ?</a:t>
-            </a:r>
-          </a:p>
-          <a:p>
-            <a:pPr lvl="0"/>
-            <a:r>
-              <a:rPr/>
-              <a:t>🏃‍♂️ </a:t>
-            </a:r>
-            <a:r>
-              <a:rPr b="1"/>
-              <a:t>Coureurs réguliers</a:t>
-            </a:r>
-            <a:r>
-              <a:rPr/>
-              <a:t> : cherchent à améliorer leurs performances</a:t>
-            </a:r>
-          </a:p>
-          <a:p>
-            <a:pPr lvl="0"/>
-            <a:r>
-              <a:rPr/>
-              <a:t>👟 </a:t>
-            </a:r>
-            <a:r>
-              <a:rPr b="1"/>
-              <a:t>Coureurs occasionnels</a:t>
-            </a:r>
-            <a:r>
-              <a:rPr/>
-              <a:t> : ont besoin de motivation pour rester réguliers</a:t>
-            </a:r>
-          </a:p>
-          <a:p>
-            <a:pPr lvl="0"/>
-            <a:r>
-              <a:rPr/>
-              <a:t>🏅 </a:t>
-            </a:r>
-            <a:r>
-              <a:rPr b="1"/>
-              <a:t>Coureurs compétitifs</a:t>
-            </a:r>
-            <a:r>
-              <a:rPr/>
-              <a:t> : veulent tester leur niveau entre les courses officielles</a:t>
-            </a:r>
-          </a:p>
-          <a:p>
-            <a:pPr lvl="0"/>
-            <a:r>
-              <a:rPr/>
-              <a:t>👥 </a:t>
-            </a:r>
-            <a:r>
-              <a:rPr b="1"/>
-              <a:t>Nouveaux coureurs</a:t>
-            </a:r>
-            <a:r>
-              <a:rPr/>
-              <a:t> : cherchent une communauté motivante</a:t>
+              <a:t>TACTIQUES CONCRÈTES POUR ATTIRER LES UTILISATEURS DE STRAVA/NIKE RUN CLUB</a:t>
+            </a:r>
+          </a:p>
+          <a:p>
+            <a:pPr lvl="0" indent="0" marL="0">
+              <a:buNone/>
+            </a:pPr>
+            <a:r>
+              <a:rPr b="1"/>
+              <a:t>1️⃣ CAMPAGNES DE MIGRATION PAR DUEL CHALLENGES LOCAUX</a:t>
+            </a:r>
+            <a:r>
+              <a:rPr/>
+              <a:t> - Événements “Duel Challenge” dans les parcs populaires (Bois de Boulogne, Parc de la Tête d’Or) - Invitations ciblées aux membres de clubs de running via partenariats - Premier duel gratuit et récompensé : bonus +100 ELO de démarrage</a:t>
+            </a:r>
+          </a:p>
+          <a:p>
+            <a:pPr lvl="0" indent="0" marL="0">
+              <a:buNone/>
+            </a:pPr>
+            <a:r>
+              <a:rPr b="1"/>
+              <a:t>2️⃣ INVITATIONS POUSSÉES PAR NOTIFICATIONS/IN-APP</a:t>
+            </a:r>
+            <a:r>
+              <a:rPr/>
+              <a:t> - Feature “Défier un ami Strava” : invitation directe depuis GeoRace - Notifications push personnalisées : “3 coureurs Strava près de chez vous attendent un duel” - Bonus de parrainage : invitez 3 amis → accès Premium gratuit 1 mois</a:t>
+            </a:r>
+          </a:p>
+          <a:p>
+            <a:pPr lvl="0" indent="0" marL="0">
+              <a:buNone/>
+            </a:pPr>
+            <a:r>
+              <a:rPr b="1"/>
+              <a:t>3️⃣ CAMPAGNE D’INFLUENCE (GROUP RUNS)</a:t>
+            </a:r>
+            <a:r>
+              <a:rPr/>
+              <a:t> - Partenariats avec influenceurs running (YouTube, Instagram, TikTok) - Organisation de “GeoRace Group Runs” avec streamers locaux - Challenges viraux : “Défiez votre running crew et filmez le résultat”</a:t>
+            </a:r>
+          </a:p>
+          <a:p>
+            <a:pPr lvl="0" indent="0" marL="0">
+              <a:buNone/>
+            </a:pPr>
+            <a:r>
+              <a:rPr b="1"/>
+              <a:t>4️⃣ PARTENARIATS LOCAUX (CLUBS, MAGASINS RUNNING)</a:t>
+            </a:r>
+            <a:r>
+              <a:rPr/>
+              <a:t> - Accords avec magasins spécialisés (Décathlon, Running Conseil) - Sponsoring de clubs de running : essai gratuit Premium pour tous les membres - Bornes QR Code dans les lieux de passage des coureurs</a:t>
+            </a:r>
+          </a:p>
+          <a:p>
+            <a:pPr lvl="0" indent="0" marL="0">
+              <a:buNone/>
+            </a:pPr>
+            <a:r>
+              <a:rPr b="1"/>
+              <a:t>5️⃣ FONCTIONNALITÉS D’ONBOARDING SOCIAL</a:t>
+            </a:r>
+            <a:r>
+              <a:rPr/>
+              <a:t> - Import facile des résultats Strava/Nike Run Club (API) - Transfert de vos records personnels pour comparaison - “Retrouvez vos amis Strava déjà sur GeoRace” (graph social)</a:t>
+            </a:r>
+          </a:p>
+          <a:p>
+            <a:pPr lvl="0" indent="0" marL="0">
+              <a:buNone/>
+            </a:pPr>
+            <a:r>
+              <a:rPr b="1"/>
+              <a:t>6️⃣ OFFRES DE PARRAINAGE ET RÉCOMPENSES</a:t>
+            </a:r>
+            <a:r>
+              <a:rPr/>
+              <a:t> - Programme ambassadeur : gagnez du Premium en recrutant - Challenges mensuels : “Amenez le plus de nouveaux coureurs = prix Nike” - Badges exclusifs pour les early adopters</a:t>
+            </a:r>
+          </a:p>
+          <a:p>
+            <a:pPr lvl="0" indent="0" marL="0">
+              <a:buNone/>
+            </a:pPr>
+            <a:r>
+              <a:rPr b="1"/>
+              <a:t>7️⃣ VISIBILITÉ SUR STORES ET ASO (APP STORE OPTIMIZATION)</a:t>
+            </a:r>
+            <a:r>
+              <a:rPr/>
+              <a:t> - Mots-clés ciblés : “duel running”, “compétition course”, “course en temps réel” - Screenshots montrant la différence avec Strava - Témoignages : “J’ai quitté Strava pour GeoRace et je ne regrette rien”</a:t>
+            </a:r>
+          </a:p>
+          <a:p>
+            <a:pPr lvl="0" indent="0" marL="0">
+              <a:buNone/>
+            </a:pPr>
+            <a:r>
+              <a:rPr b="1"/>
+              <a:t>OBJECTIF 6 MOIS :</a:t>
+            </a:r>
+            <a:r>
+              <a:rPr/>
+              <a:t> 10 000 utilisateurs actifs, 60% provenant de Strava/Nike Run Club</a:t>
             </a:r>
           </a:p>
         </p:txBody>
@@ -3469,7 +3515,7 @@
             </a:pPr>
             <a:r>
               <a:rPr/>
-              <a:t>🟦 Slide 11 – Différenciation</a:t>
+              <a:t>🟦 Slide 11 - Le système ELO : matchmaking intelligent</a:t>
             </a:r>
           </a:p>
         </p:txBody>
@@ -3494,67 +3540,68 @@
             </a:pPr>
             <a:r>
               <a:rPr b="1"/>
-              <a:t>Ce que les autres apps ne font pas :</a:t>
-            </a:r>
-          </a:p>
-          <a:p>
-            <a:pPr lvl="0"/>
-            <a:r>
-              <a:rPr b="1"/>
-              <a:t>Strava</a:t>
-            </a:r>
-            <a:r>
-              <a:rPr/>
-              <a:t> → réseau social, pas de compétition temps réel</a:t>
-            </a:r>
-          </a:p>
-          <a:p>
-            <a:pPr lvl="0"/>
-            <a:r>
-              <a:rPr b="1"/>
-              <a:t>Nike Run Club</a:t>
-            </a:r>
-            <a:r>
-              <a:rPr/>
-              <a:t> → tracking + défis asynchrones</a:t>
-            </a:r>
-          </a:p>
-          <a:p>
-            <a:pPr lvl="0"/>
-            <a:r>
-              <a:rPr b="1"/>
-              <a:t>Runkeeper</a:t>
-            </a:r>
-            <a:r>
-              <a:rPr/>
-              <a:t> → GPS basique sans interaction</a:t>
-            </a:r>
-          </a:p>
-          <a:p>
-            <a:pPr lvl="0" indent="0" marL="0">
-              <a:buNone/>
-            </a:pPr>
-            <a:r>
-              <a:rPr b="1"/>
-              <a:t>GeoRace combine :</a:t>
-            </a:r>
-          </a:p>
-          <a:p>
-            <a:pPr lvl="0" indent="0" marL="1270000">
-              <a:buNone/>
-            </a:pPr>
-            <a:r>
-              <a:rPr sz="2000"/>
-              <a:t>Duels spontanés en temps réel + Point d’arrivée équitable + Matchmaking ELO</a:t>
-            </a:r>
-          </a:p>
-          <a:p>
-            <a:pPr lvl="0" indent="0" marL="0">
-              <a:buNone/>
-            </a:pPr>
-            <a:r>
-              <a:rPr b="1"/>
-              <a:t>= Concept unique sur le marché</a:t>
+              <a:t>Pourquoi le duel reste motivant même après 100 courses</a:t>
+            </a:r>
+          </a:p>
+          <a:p>
+            <a:pPr lvl="0" indent="0" marL="0">
+              <a:buNone/>
+            </a:pPr>
+            <a:r>
+              <a:rPr b="1"/>
+              <a:t>Problème :</a:t>
+            </a:r>
+            <a:r>
+              <a:rPr/>
+              <a:t> Si on oppose débutants vs experts → frustration des deux côtés</a:t>
+            </a:r>
+          </a:p>
+          <a:p>
+            <a:pPr lvl="0" indent="0" marL="0">
+              <a:buNone/>
+            </a:pPr>
+            <a:r>
+              <a:rPr b="1"/>
+              <a:t>Solution ELO :</a:t>
+            </a:r>
+            <a:r>
+              <a:rPr/>
+              <a:t> - Chaque victoire/défaite ajuste votre score - Algorithme vous oppose à des coureurs de ±100 ELO - Progression visible : Bronze (0-1000) → Platine (2000+)</a:t>
+            </a:r>
+          </a:p>
+          <a:p>
+            <a:pPr lvl="0" indent="0" marL="0">
+              <a:buNone/>
+            </a:pPr>
+            <a:r>
+              <a:rPr b="1"/>
+              <a:t>Exemple concret :</a:t>
+            </a:r>
+            <a:r>
+              <a:rPr/>
+              <a:t> - Emma (ELO 1420) bat Lucas (ELO 1450) → +28 points (victoire difficile) - Emma bat Sophie (ELO 1200) → +8 points (victoire facile)</a:t>
+            </a:r>
+          </a:p>
+          <a:p>
+            <a:pPr lvl="0" indent="0" marL="0">
+              <a:buNone/>
+            </a:pPr>
+            <a:r>
+              <a:rPr b="1"/>
+              <a:t>Résultat :</a:t>
+            </a:r>
+            <a:r>
+              <a:rPr/>
+              <a:t> Chaque duel est challengeant mais faisable → motivation maximale</a:t>
+            </a:r>
+          </a:p>
+          <a:p>
+            <a:pPr lvl="0" indent="0" marL="0">
+              <a:buNone/>
+            </a:pPr>
+            <a:r>
+              <a:rPr b="1"/>
+              <a:t>Strava ne propose rien de tel.</a:t>
             </a:r>
           </a:p>
         </p:txBody>
@@ -3601,7 +3648,7 @@
             </a:pPr>
             <a:r>
               <a:rPr/>
-              <a:t>🟦 Slide 12 – Modèle économique</a:t>
+              <a:t>🟦 Slide 12 - Aspect social : plus fort que Nike Run Club</a:t>
             </a:r>
           </a:p>
         </p:txBody>
@@ -3626,46 +3673,69 @@
             </a:pPr>
             <a:r>
               <a:rPr b="1"/>
-              <a:t>Freemium avec valeur ajoutée</a:t>
-            </a:r>
-          </a:p>
-          <a:p>
-            <a:pPr lvl="0" indent="0" marL="0">
-              <a:buNone/>
-            </a:pPr>
-            <a:r>
-              <a:rPr b="1"/>
-              <a:t>Gratuit :</a:t>
-            </a:r>
-            <a:r>
-              <a:rPr/>
-              <a:t> * 3 duels par jour * Classement ELO * Statistiques de base * Événements communautaires</a:t>
-            </a:r>
-          </a:p>
-          <a:p>
-            <a:pPr lvl="0" indent="0" marL="0">
-              <a:buNone/>
-            </a:pPr>
-            <a:r>
-              <a:rPr b="1"/>
-              <a:t>Premium (4,99€/mois) :</a:t>
-            </a:r>
-            <a:r>
-              <a:rPr/>
-              <a:t> * Duels illimités * Statistiques avancées * Personnalisation profil * Mode entraînement contre vos records * Pas de publicités</a:t>
-            </a:r>
-          </a:p>
-          <a:p>
-            <a:pPr lvl="0" indent="0" marL="0">
-              <a:buNone/>
-            </a:pPr>
-            <a:r>
-              <a:rPr b="1"/>
-              <a:t>Revenus additionnels :</a:t>
-            </a:r>
-            <a:r>
-              <a:rPr/>
-              <a:t> * Partenariats marques (Nike, Adidas) * Événements premium avec prix</a:t>
+              <a:t>Créer une vraie communauté de compétiteurs</a:t>
+            </a:r>
+          </a:p>
+          <a:p>
+            <a:pPr lvl="0" indent="0" marL="0">
+              <a:buNone/>
+            </a:pPr>
+            <a:r>
+              <a:rPr b="1"/>
+              <a:t>FONCTIONNALITÉS SOCIALES :</a:t>
+            </a:r>
+          </a:p>
+          <a:p>
+            <a:pPr lvl="0" indent="0" marL="0">
+              <a:buNone/>
+            </a:pPr>
+            <a:r>
+              <a:rPr b="1"/>
+              <a:t>01 - PROFILS DE COMPÉTITEURS</a:t>
+            </a:r>
+            <a:r>
+              <a:rPr/>
+              <a:t> - Statistiques détaillées : ratio victoires/défaites, progression ELO, parcours favoris - Historique des duels : “Vous avez battu Paul 3 fois, il vous a battu 2 fois”</a:t>
+            </a:r>
+          </a:p>
+          <a:p>
+            <a:pPr lvl="0" indent="0" marL="0">
+              <a:buNone/>
+            </a:pPr>
+            <a:r>
+              <a:rPr b="1"/>
+              <a:t>02 - LIGUES LOCALES</a:t>
+            </a:r>
+            <a:r>
+              <a:rPr/>
+              <a:t> - Classement par ville/quartier : “Top 10 de Paris 15e” - Tournois hebdomadaires : “Gagnez 3 duels ce week-end pour le badge”</a:t>
+            </a:r>
+          </a:p>
+          <a:p>
+            <a:pPr lvl="0" indent="0" marL="0">
+              <a:buNone/>
+            </a:pPr>
+            <a:r>
+              <a:rPr b="1"/>
+              <a:t>03 - DÉFIS ENTRE AMIS</a:t>
+            </a:r>
+            <a:r>
+              <a:rPr/>
+              <a:t> - “Emma défie Paul : course de 2km, RDV Parc Montsouris dans 20min” - Smack talk via chat intégré avant/après la course</a:t>
+            </a:r>
+          </a:p>
+          <a:p>
+            <a:pPr lvl="0" indent="0" marL="0">
+              <a:buNone/>
+            </a:pPr>
+            <a:r>
+              <a:rPr b="1"/>
+              <a:t>Nike Run Club = réseau passif</a:t>
+            </a:r>
+            <a:br/>
+            <a:r>
+              <a:rPr b="1"/>
+              <a:t>GeoRace = compétition active</a:t>
             </a:r>
           </a:p>
         </p:txBody>
@@ -3712,7 +3782,7 @@
             </a:pPr>
             <a:r>
               <a:rPr/>
-              <a:t>🟦 Slide 13 – Roadmap</a:t>
+              <a:t>🟦 Slide 13 - Sécurité et anti-triche</a:t>
             </a:r>
           </a:p>
         </p:txBody>
@@ -3737,58 +3807,46 @@
             </a:pPr>
             <a:r>
               <a:rPr b="1"/>
-              <a:t>Déploiement progressif</a:t>
-            </a:r>
-          </a:p>
-          <a:p>
-            <a:pPr lvl="0" indent="0" marL="0">
-              <a:buNone/>
-            </a:pPr>
-            <a:r>
-              <a:rPr b="1"/>
-              <a:t>Phase 1 (6 mois) - MVP</a:t>
-            </a:r>
-            <a:r>
-              <a:rPr/>
-              <a:t> * Duels 1v1 en temps réel * Système ELO * Test dans 2-3 villes pilotes * </a:t>
-            </a:r>
-            <a:r>
-              <a:rPr b="1"/>
-              <a:t>Objectif : 500 utilisateurs actifs</a:t>
-            </a:r>
-          </a:p>
-          <a:p>
-            <a:pPr lvl="0" indent="0" marL="0">
-              <a:buNone/>
-            </a:pPr>
-            <a:r>
-              <a:rPr b="1"/>
-              <a:t>Phase 2 (12 mois) - Gamification</a:t>
-            </a:r>
-            <a:r>
-              <a:rPr/>
-              <a:t> * Badges, statistiques, profils * Événements communautaires * </a:t>
-            </a:r>
-            <a:r>
-              <a:rPr b="1"/>
-              <a:t>Objectif : 5 000 utilisateurs</a:t>
-            </a:r>
-          </a:p>
-          <a:p>
-            <a:pPr lvl="0" indent="0" marL="0">
-              <a:buNone/>
-            </a:pPr>
-            <a:r>
-              <a:rPr b="1"/>
-              <a:t>Phase 3 (24 mois) - Scale</a:t>
-            </a:r>
-            <a:r>
-              <a:rPr/>
-              <a:t> * Version Premium * Duels multi-joueurs * Expansion nationale * </a:t>
-            </a:r>
-            <a:r>
-              <a:rPr b="1"/>
-              <a:t>Objectif : 50 000 utilisateurs</a:t>
+              <a:t>Réponses aux objections principales</a:t>
+            </a:r>
+          </a:p>
+          <a:p>
+            <a:pPr lvl="0" indent="0" marL="0">
+              <a:buNone/>
+            </a:pPr>
+            <a:r>
+              <a:rPr b="1"/>
+              <a:t>OBJECTION 1 : “On peut tricher en vélo/voiture”</a:t>
+            </a:r>
+            <a:r>
+              <a:rPr/>
+              <a:t> ✅ Détection de vitesse anormale (&gt;18 km/h sur longue durée) ✅ Analyse des patterns GPS (accélération impossible) ✅ Signalement communautaire + vérification manuelle ✅ Bannissement permanent des tricheurs</a:t>
+            </a:r>
+          </a:p>
+          <a:p>
+            <a:pPr lvl="0" indent="0" marL="0">
+              <a:buNone/>
+            </a:pPr>
+            <a:r>
+              <a:rPr b="1"/>
+              <a:t>OBJECTION 2 : “Risque de stalking via GPS”</a:t>
+            </a:r>
+            <a:r>
+              <a:rPr/>
+              <a:t> ✅ Position visible UNIQUEMENT pendant les duels actifs ✅ Mode anonyme : pseudonyme, pas de vraie identité ✅ Blocage d’utilisateurs ✅ Zone de confort : accepter duels uniquement dans un périmètre défini</a:t>
+            </a:r>
+          </a:p>
+          <a:p>
+            <a:pPr lvl="0" indent="0" marL="0">
+              <a:buNone/>
+            </a:pPr>
+            <a:r>
+              <a:rPr b="1"/>
+              <a:t>OBJECTION 3 : “Sur-effort dangereux”</a:t>
+            </a:r>
+            <a:r>
+              <a:rPr/>
+              <a:t> ✅ Alertes de sécurité si rythme cardiaque trop élevé (intégration montres) ✅ Mode “course prudente” qui limite la vitesse</a:t>
             </a:r>
           </a:p>
         </p:txBody>
@@ -3835,7 +3893,7 @@
             </a:pPr>
             <a:r>
               <a:rPr/>
-              <a:t>🟦 Slide 14 – Défis &amp; Solutions</a:t>
+              <a:t>🟦 Slide 14 - Modèle économique : freemium optimisé</a:t>
             </a:r>
           </a:p>
         </p:txBody>
@@ -3860,59 +3918,67 @@
             </a:pPr>
             <a:r>
               <a:rPr b="1"/>
-              <a:t>Anticiper les obstacles</a:t>
-            </a:r>
-          </a:p>
-          <a:p>
-            <a:pPr lvl="0" indent="0" marL="0">
-              <a:buNone/>
-            </a:pPr>
-            <a:r>
-              <a:rPr b="1"/>
-              <a:t>Défi : Sécurité des coureurs</a:t>
-            </a:r>
-            <a:r>
-              <a:rPr/>
-              <a:t> → Alertes de sécurité, mode “course prudente”</a:t>
-            </a:r>
-          </a:p>
-          <a:p>
-            <a:pPr lvl="0" indent="0" marL="0">
-              <a:buNone/>
-            </a:pPr>
-            <a:r>
-              <a:rPr b="1"/>
-              <a:t>Défi : Zones rurales (peu d’utilisateurs)</a:t>
-            </a:r>
-            <a:r>
-              <a:rPr/>
-              <a:t> → Mode asynchrone contre “ghost runners”</a:t>
-            </a:r>
-          </a:p>
-          <a:p>
-            <a:pPr lvl="0" indent="0" marL="0">
-              <a:buNone/>
-            </a:pPr>
-            <a:r>
-              <a:rPr b="1"/>
-              <a:t>Défi : Triche (vélo, voiture)</a:t>
-            </a:r>
-            <a:r>
-              <a:rPr/>
-              <a:t> → Détection vitesse anormale + validation communautaire</a:t>
-            </a:r>
-          </a:p>
-          <a:p>
-            <a:pPr lvl="0" indent="0" marL="0">
-              <a:buNone/>
-            </a:pPr>
-            <a:r>
-              <a:rPr b="1"/>
-              <a:t>Défi : Vie privée</a:t>
-            </a:r>
-            <a:r>
-              <a:rPr/>
-              <a:t> → Position visible uniquement en duel, blocage d’utilisateurs</a:t>
+              <a:t>Convertir la motivation en revenus</a:t>
+            </a:r>
+          </a:p>
+          <a:p>
+            <a:pPr lvl="0" indent="0" marL="0">
+              <a:buNone/>
+            </a:pPr>
+            <a:r>
+              <a:rPr b="1"/>
+              <a:t>GRATUIT (acquisition) :</a:t>
+            </a:r>
+            <a:r>
+              <a:rPr/>
+              <a:t> - 3 duels/jour - ELO et classements - Statistiques de base - Événements communautaires</a:t>
+            </a:r>
+          </a:p>
+          <a:p>
+            <a:pPr lvl="0" indent="0" marL="0">
+              <a:buNone/>
+            </a:pPr>
+            <a:r>
+              <a:rPr b="1"/>
+              <a:t>PREMIUM 4,99€/mois (conversion 10-15%) :</a:t>
+            </a:r>
+            <a:r>
+              <a:rPr/>
+              <a:t> - </a:t>
+            </a:r>
+            <a:r>
+              <a:rPr b="1"/>
+              <a:t>Duels illimités</a:t>
+            </a:r>
+            <a:r>
+              <a:rPr/>
+              <a:t> ← valeur principale - Statistiques avancées (zones de vitesse, analyse progression ELO) - Mode entraînement vs vos records passés - Personnalisation (avatars, badges exclusifs) - 0 publicité</a:t>
+            </a:r>
+          </a:p>
+          <a:p>
+            <a:pPr lvl="0" indent="0" marL="0">
+              <a:buNone/>
+            </a:pPr>
+            <a:r>
+              <a:rPr b="1"/>
+              <a:t>REVENUS ADDITIONNELS :</a:t>
+            </a:r>
+            <a:r>
+              <a:rPr/>
+              <a:t> - Partenariats Nike/Adidas (sponsoring tournois) - Événements premium 5-10€ (courses organisées avec prix)</a:t>
+            </a:r>
+          </a:p>
+          <a:p>
+            <a:pPr lvl="0" indent="0" marL="0">
+              <a:buNone/>
+            </a:pPr>
+            <a:r>
+              <a:rPr b="1"/>
+              <a:t>LTV estimée :</a:t>
+            </a:r>
+            <a:r>
+              <a:rPr/>
+              <a:t> 60€/utilisateur sur 12 mois (vs 12€ pour Strava)</a:t>
             </a:r>
           </a:p>
         </p:txBody>
@@ -3959,7 +4025,7 @@
             </a:pPr>
             <a:r>
               <a:rPr/>
-              <a:t>🟦 Slide 15 – Vision</a:t>
+              <a:t>🟦 Slide 15 - Métriques de succès (objectifs 6 mois)</a:t>
             </a:r>
           </a:p>
         </p:txBody>
@@ -3979,33 +4045,51 @@
           <a:bodyPr/>
           <a:lstStyle/>
           <a:p>
-            <a:pPr lvl="0" indent="0" marL="1270000">
-              <a:buNone/>
-            </a:pPr>
-            <a:r>
-              <a:rPr sz="2000"/>
-              <a:t>GeoRace ne se contente pas de tracker vos courses. Nous transformons la course à pied en une </a:t>
-            </a:r>
-            <a:r>
-              <a:rPr sz="2000" b="1"/>
-              <a:t>expérience sociale, compétitive et motivante</a:t>
-            </a:r>
-            <a:r>
-              <a:rPr sz="2000"/>
-              <a:t> accessible à tous, partout, à tout moment.</a:t>
-            </a:r>
-          </a:p>
-          <a:p>
-            <a:pPr lvl="0" indent="0" marL="0">
-              <a:buNone/>
-            </a:pPr>
-            <a:r>
-              <a:rPr b="1"/>
-              <a:t>Notre ambition :</a:t>
-            </a:r>
-            <a:r>
-              <a:rPr/>
-              <a:t> Devenir la référence de la course compétitive en temps réel et créer une communauté mondiale de coureurs passionnés par le défi.</a:t>
+            <a:pPr lvl="0" indent="0" marL="0">
+              <a:buNone/>
+            </a:pPr>
+            <a:r>
+              <a:rPr b="1"/>
+              <a:t>Comment mesurer la traction</a:t>
+            </a:r>
+          </a:p>
+          <a:p>
+            <a:pPr lvl="0" indent="0" marL="0">
+              <a:buNone/>
+            </a:pPr>
+            <a:r>
+              <a:rPr b="1"/>
+              <a:t>ENGAGEMENT (prouve que le concept marche) :</a:t>
+            </a:r>
+            <a:r>
+              <a:rPr/>
+              <a:t> - ✅ Taux de rétention J7 : &gt;40% (vs 25% apps fitness standard) - ✅ Duels/semaine/utilisateur : 6-8 (preuve d’addiction) - ✅ Taux d’acceptation duels : &gt;60% (les gens veulent compétitionner)</a:t>
+            </a:r>
+          </a:p>
+          <a:p>
+            <a:pPr lvl="0" indent="0" marL="0">
+              <a:buNone/>
+            </a:pPr>
+            <a:r>
+              <a:rPr b="1"/>
+              <a:t>CROISSANCE (viralité naturelle) :</a:t>
+            </a:r>
+            <a:r>
+              <a:rPr/>
+              <a:t> - ✅ Coefficient K : &gt;1,2 (chaque utilisateur amène 1,2 nouveau) - ✅ Croissance mensuelle : +20% nouveaux utilisateurs - ✅ 500 utilisateurs actifs dans 3 villes pilotes</a:t>
+            </a:r>
+          </a:p>
+          <a:p>
+            <a:pPr lvl="0" indent="0" marL="0">
+              <a:buNone/>
+            </a:pPr>
+            <a:r>
+              <a:rPr b="1"/>
+              <a:t>MONÉTISATION :</a:t>
+            </a:r>
+            <a:r>
+              <a:rPr/>
+              <a:t> - ✅ Conversion Premium : 10-12% (vs 5% moyenne marché) - ✅ LTV/CAC : &gt;3 (rentabilité prouvée)</a:t>
             </a:r>
           </a:p>
         </p:txBody>
@@ -4052,7 +4136,7 @@
             </a:pPr>
             <a:r>
               <a:rPr/>
-              <a:t>🟦 Slide 16 – Phrase finale</a:t>
+              <a:t>🟦 Slide 16 - Roadmap : lancement en 3 phases</a:t>
             </a:r>
           </a:p>
         </p:txBody>
@@ -4077,25 +4161,291 @@
             </a:pPr>
             <a:r>
               <a:rPr b="1"/>
-              <a:t>GeoRace</a:t>
-            </a:r>
-          </a:p>
+              <a:t>Phase 1 (Mois 1-6) : MVP + Proof of Concept</a:t>
+            </a:r>
+            <a:r>
+              <a:rPr/>
+              <a:t> - App iOS/Android (React Native) - Duels 1v1, ELO, point équidistant - Lancement Paris + Lyon - </a:t>
+            </a:r>
+            <a:r>
+              <a:rPr b="1"/>
+              <a:t>500 utilisateurs actifs, 40% rétention J7</a:t>
+            </a:r>
+          </a:p>
+          <a:p>
+            <a:pPr lvl="0" indent="0" marL="0">
+              <a:buNone/>
+            </a:pPr>
+            <a:r>
+              <a:rPr b="1"/>
+              <a:t>Phase 2 (Mois 7-12) : Gamification et viralité</a:t>
+            </a:r>
+            <a:r>
+              <a:rPr/>
+              <a:t> - Badges, profils, ligues locales - Événements hebdomadaires - Feature “Défier un ami” - </a:t>
+            </a:r>
+            <a:r>
+              <a:rPr b="1"/>
+              <a:t>5 000 utilisateurs, expansion 5 villes</a:t>
+            </a:r>
+          </a:p>
+          <a:p>
+            <a:pPr lvl="0" indent="0" marL="0">
+              <a:buNone/>
+            </a:pPr>
+            <a:r>
+              <a:rPr b="1"/>
+              <a:t>Phase 3 (An 2) : Scale national</a:t>
+            </a:r>
+            <a:r>
+              <a:rPr/>
+              <a:t> - Version Premium - Duels multi-joueurs (3-5 coureurs) - Partenariats marques - </a:t>
+            </a:r>
+            <a:r>
+              <a:rPr b="1"/>
+              <a:t>50 000 utilisateurs, 10+ villes</a:t>
+            </a:r>
+          </a:p>
+        </p:txBody>
+      </p:sp>
+    </p:spTree>
+  </p:cSld>
+</p:sld>
+</file>
+
+<file path=ppt/slides/slide18.xml><?xml version="1.0" encoding="utf-8"?>
+<p:sld xmlns:a="http://schemas.openxmlformats.org/drawingml/2006/main" xmlns:r="http://schemas.openxmlformats.org/officeDocument/2006/relationships" xmlns:p="http://schemas.openxmlformats.org/presentationml/2006/main">
+  <p:cSld>
+    <p:spTree>
+      <p:nvGrpSpPr>
+        <p:cNvPr id="1" name=""/>
+        <p:cNvGrpSpPr/>
+        <p:nvPr/>
+      </p:nvGrpSpPr>
+      <p:grpSpPr>
+        <a:xfrm>
+          <a:off x="0" y="0"/>
+          <a:ext cx="0" cy="0"/>
+          <a:chOff x="0" y="0"/>
+          <a:chExt cx="0" cy="0"/>
+        </a:xfrm>
+      </p:grpSpPr>
+      <p:sp>
+        <p:nvSpPr>
+          <p:cNvPr id="2" name="Title 1"/>
+          <p:cNvSpPr>
+            <a:spLocks noGrp="1"/>
+          </p:cNvSpPr>
+          <p:nvPr>
+            <p:ph type="title"/>
+          </p:nvPr>
+        </p:nvSpPr>
+        <p:spPr/>
+        <p:txBody>
+          <a:bodyPr/>
+          <a:lstStyle/>
+          <a:p>
+            <a:pPr lvl="0" indent="0" marL="0">
+              <a:buNone/>
+            </a:pPr>
+            <a:r>
+              <a:rPr/>
+              <a:t>🟦 Slide 17 - Pourquoi maintenant ?</a:t>
+            </a:r>
+          </a:p>
+        </p:txBody>
+      </p:sp>
+      <p:sp>
+        <p:nvSpPr>
+          <p:cNvPr id="3" name="Content Placeholder 2"/>
+          <p:cNvSpPr>
+            <a:spLocks noGrp="1"/>
+          </p:cNvSpPr>
+          <p:nvPr>
+            <p:ph idx="1"/>
+          </p:nvPr>
+        </p:nvSpPr>
+        <p:spPr/>
+        <p:txBody>
+          <a:bodyPr/>
+          <a:lstStyle/>
+          <a:p>
+            <a:pPr lvl="0" indent="0" marL="0">
+              <a:buNone/>
+            </a:pPr>
+            <a:r>
+              <a:rPr b="1"/>
+              <a:t>Le timing parfait pour GeoRace</a:t>
+            </a:r>
+          </a:p>
+          <a:p>
+            <a:pPr lvl="0" indent="0" marL="0">
+              <a:buNone/>
+            </a:pPr>
+            <a:r>
+              <a:rPr b="1"/>
+              <a:t>1. MARCHÉ MATURE MAIS STAGNANT</a:t>
+            </a:r>
+            <a:r>
+              <a:rPr/>
+              <a:t> - Strava : 100M users, mais taux engagement en baisse - Utilisateurs cherchent nouveauté et excitation</a:t>
+            </a:r>
+          </a:p>
+          <a:p>
+            <a:pPr lvl="0" indent="0" marL="0">
+              <a:buNone/>
+            </a:pPr>
+            <a:r>
+              <a:rPr b="1"/>
+              <a:t>2. TECHNOLOGIE DISPONIBLE</a:t>
+            </a:r>
+            <a:r>
+              <a:rPr/>
+              <a:t> - GPS précis sur tous les smartphones - WebSocket et infra cloud à faible coût - Algorithmes géospatiaux open-source (PostGIS)</a:t>
+            </a:r>
+          </a:p>
+          <a:p>
+            <a:pPr lvl="0" indent="0" marL="0">
+              <a:buNone/>
+            </a:pPr>
+            <a:r>
+              <a:rPr b="1"/>
+              <a:t>3. TENDANCE SOCIALE</a:t>
+            </a:r>
+            <a:r>
+              <a:rPr/>
+              <a:t> - Génération Z/Millennials : veulent compétition et instant gratification - Esport et gamification mainstream - Communautés locales en recherche de connexion IRL</a:t>
+            </a:r>
+          </a:p>
+          <a:p>
+            <a:pPr lvl="0" indent="0" marL="0">
+              <a:buNone/>
+            </a:pPr>
+            <a:r>
+              <a:rPr b="1"/>
+              <a:t>4. COVID A BOOSTÉ LE RUNNING</a:t>
+            </a:r>
+            <a:r>
+              <a:rPr/>
+              <a:t> - +40% de coureurs réguliers depuis 2020 - Besoin d’interaction sociale post-confinement</a:t>
+            </a:r>
+          </a:p>
+        </p:txBody>
+      </p:sp>
+    </p:spTree>
+  </p:cSld>
+</p:sld>
+</file>
+
+<file path=ppt/slides/slide19.xml><?xml version="1.0" encoding="utf-8"?>
+<p:sld xmlns:a="http://schemas.openxmlformats.org/drawingml/2006/main" xmlns:r="http://schemas.openxmlformats.org/officeDocument/2006/relationships" xmlns:p="http://schemas.openxmlformats.org/presentationml/2006/main">
+  <p:cSld>
+    <p:spTree>
+      <p:nvGrpSpPr>
+        <p:cNvPr id="1" name=""/>
+        <p:cNvGrpSpPr/>
+        <p:nvPr/>
+      </p:nvGrpSpPr>
+      <p:grpSpPr>
+        <a:xfrm>
+          <a:off x="0" y="0"/>
+          <a:ext cx="0" cy="0"/>
+          <a:chOff x="0" y="0"/>
+          <a:chExt cx="0" cy="0"/>
+        </a:xfrm>
+      </p:grpSpPr>
+      <p:sp>
+        <p:nvSpPr>
+          <p:cNvPr id="2" name="Title 1"/>
+          <p:cNvSpPr>
+            <a:spLocks noGrp="1"/>
+          </p:cNvSpPr>
+          <p:nvPr>
+            <p:ph type="title"/>
+          </p:nvPr>
+        </p:nvSpPr>
+        <p:spPr/>
+        <p:txBody>
+          <a:bodyPr/>
+          <a:lstStyle/>
+          <a:p>
+            <a:pPr lvl="0" indent="0" marL="0">
+              <a:buNone/>
+            </a:pPr>
+            <a:r>
+              <a:rPr/>
+              <a:t>🟦 Slide 18 - Vision finale</a:t>
+            </a:r>
+          </a:p>
+        </p:txBody>
+      </p:sp>
+      <p:sp>
+        <p:nvSpPr>
+          <p:cNvPr id="3" name="Content Placeholder 2"/>
+          <p:cNvSpPr>
+            <a:spLocks noGrp="1"/>
+          </p:cNvSpPr>
+          <p:nvPr>
+            <p:ph idx="1"/>
+          </p:nvPr>
+        </p:nvSpPr>
+        <p:spPr/>
+        <p:txBody>
+          <a:bodyPr/>
+          <a:lstStyle/>
           <a:p>
             <a:pPr lvl="0" indent="0" marL="1270000">
               <a:buNone/>
             </a:pPr>
             <a:r>
-              <a:rPr sz="2000"/>
-              <a:t>Chaque course est un duel. Chaque duel est une opportunité. Transformez votre motivation.</a:t>
-            </a:r>
-          </a:p>
-          <a:p>
-            <a:pPr lvl="0" indent="0" marL="0">
-              <a:buNone/>
-            </a:pPr>
-            <a:r>
-              <a:rPr b="1"/>
-              <a:t>Prêt à relever le défi ?</a:t>
+              <a:rPr sz="2000" b="1"/>
+              <a:t>GeoRace ne remplace pas Strava.</a:t>
+            </a:r>
+            <a:br/>
+            <a:r>
+              <a:rPr sz="2000" b="1"/>
+              <a:t>GeoRace transforme la course en sport compétitif accessible.</a:t>
+            </a:r>
+          </a:p>
+          <a:p>
+            <a:pPr lvl="0" indent="0" marL="0">
+              <a:buNone/>
+            </a:pPr>
+            <a:r>
+              <a:rPr b="1"/>
+              <a:t>Notre ambition :</a:t>
+            </a:r>
+          </a:p>
+          <a:p>
+            <a:pPr lvl="0" indent="0" marL="0">
+              <a:buNone/>
+            </a:pPr>
+            <a:r>
+              <a:rPr/>
+              <a:t>🎯 Devenir la plateforme #1 de compétition running temps réel</a:t>
+            </a:r>
+            <a:br/>
+            <a:r>
+              <a:rPr/>
+              <a:t>🌍 Créer une communauté mondiale de 1M+ coureurs compétitifs</a:t>
+            </a:r>
+            <a:br/>
+            <a:r>
+              <a:rPr/>
+              <a:t>🏆 Organiser des ligues professionnelles GeoRace (comme l’esport)</a:t>
+            </a:r>
+          </a:p>
+          <a:p>
+            <a:pPr lvl="0" indent="0" marL="0">
+              <a:buNone/>
+            </a:pPr>
+            <a:r>
+              <a:rPr b="1"/>
+              <a:t>Dans 5 ans :</a:t>
+            </a:r>
+            <a:r>
+              <a:rPr/>
+              <a:t> - “Tu es sur GeoRace ?” = nouvelle norme chez les coureurs - Événements physiques GeoRace dans 50 villes - Partenariats JO Paris 2028 (course urbaine compétitive)</a:t>
             </a:r>
           </a:p>
         </p:txBody>
@@ -4142,7 +4492,7 @@
             </a:pPr>
             <a:r>
               <a:rPr/>
-              <a:t>🟦 Slide 1 – Titre</a:t>
+              <a:t>🟦 Slide 1 - Titre</a:t>
             </a:r>
           </a:p>
         </p:txBody>
@@ -4189,7 +4539,288 @@
             </a:r>
             <a:r>
               <a:rPr/>
-              <a:t> Transformez chaque sortie running en duel excitant.</a:t>
+              <a:t> Le premier vrai duel de course instantané et équitable.</a:t>
+            </a:r>
+          </a:p>
+        </p:txBody>
+      </p:sp>
+    </p:spTree>
+  </p:cSld>
+</p:sld>
+</file>
+
+<file path=ppt/slides/slide20.xml><?xml version="1.0" encoding="utf-8"?>
+<p:sld xmlns:a="http://schemas.openxmlformats.org/drawingml/2006/main" xmlns:r="http://schemas.openxmlformats.org/officeDocument/2006/relationships" xmlns:p="http://schemas.openxmlformats.org/presentationml/2006/main">
+  <p:cSld>
+    <p:spTree>
+      <p:nvGrpSpPr>
+        <p:cNvPr id="1" name=""/>
+        <p:cNvGrpSpPr/>
+        <p:nvPr/>
+      </p:nvGrpSpPr>
+      <p:grpSpPr>
+        <a:xfrm>
+          <a:off x="0" y="0"/>
+          <a:ext cx="0" cy="0"/>
+          <a:chOff x="0" y="0"/>
+          <a:chExt cx="0" cy="0"/>
+        </a:xfrm>
+      </p:grpSpPr>
+      <p:sp>
+        <p:nvSpPr>
+          <p:cNvPr id="2" name="Title 1"/>
+          <p:cNvSpPr>
+            <a:spLocks noGrp="1"/>
+          </p:cNvSpPr>
+          <p:nvPr>
+            <p:ph type="title"/>
+          </p:nvPr>
+        </p:nvSpPr>
+        <p:spPr/>
+        <p:txBody>
+          <a:bodyPr/>
+          <a:lstStyle/>
+          <a:p>
+            <a:pPr lvl="0" indent="0" marL="0">
+              <a:buNone/>
+            </a:pPr>
+            <a:r>
+              <a:rPr/>
+              <a:t>🟦 Slide 19 - Appel à l’action</a:t>
+            </a:r>
+          </a:p>
+        </p:txBody>
+      </p:sp>
+      <p:sp>
+        <p:nvSpPr>
+          <p:cNvPr id="3" name="Content Placeholder 2"/>
+          <p:cNvSpPr>
+            <a:spLocks noGrp="1"/>
+          </p:cNvSpPr>
+          <p:nvPr>
+            <p:ph idx="1"/>
+          </p:nvPr>
+        </p:nvSpPr>
+        <p:spPr/>
+        <p:txBody>
+          <a:bodyPr/>
+          <a:lstStyle/>
+          <a:p>
+            <a:pPr lvl="0" indent="0" marL="0">
+              <a:buNone/>
+            </a:pPr>
+            <a:r>
+              <a:rPr b="1"/>
+              <a:t>Pourquoi investir/soutenir GeoRace ?</a:t>
+            </a:r>
+          </a:p>
+          <a:p>
+            <a:pPr lvl="0" indent="0" marL="0">
+              <a:buNone/>
+            </a:pPr>
+            <a:r>
+              <a:rPr/>
+              <a:t>✅ </a:t>
+            </a:r>
+            <a:r>
+              <a:rPr b="1"/>
+              <a:t>Concept unique</a:t>
+            </a:r>
+            <a:r>
+              <a:rPr/>
+              <a:t> : aucun concurrent direct sur le duel temps réel équitable</a:t>
+            </a:r>
+            <a:br/>
+            <a:r>
+              <a:rPr/>
+              <a:t>✅ </a:t>
+            </a:r>
+            <a:r>
+              <a:rPr b="1"/>
+              <a:t>Marché prouvé</a:t>
+            </a:r>
+            <a:r>
+              <a:rPr/>
+              <a:t> : 100M+ utilisateurs apps running cherchent motivation</a:t>
+            </a:r>
+            <a:br/>
+            <a:r>
+              <a:rPr/>
+              <a:t>✅ </a:t>
+            </a:r>
+            <a:r>
+              <a:rPr b="1"/>
+              <a:t>Différenciation forte</a:t>
+            </a:r>
+            <a:r>
+              <a:rPr/>
+              <a:t> : impossible pour Strava de pivoter vers notre modèle</a:t>
+            </a:r>
+            <a:br/>
+            <a:r>
+              <a:rPr/>
+              <a:t>✅ </a:t>
+            </a:r>
+            <a:r>
+              <a:rPr b="1"/>
+              <a:t>Équipe motivée</a:t>
+            </a:r>
+            <a:r>
+              <a:rPr/>
+              <a:t> : passion pour le running + compétences tech</a:t>
+            </a:r>
+            <a:br/>
+            <a:r>
+              <a:rPr/>
+              <a:t>✅ </a:t>
+            </a:r>
+            <a:r>
+              <a:rPr b="1"/>
+              <a:t>Roadmap claire</a:t>
+            </a:r>
+            <a:r>
+              <a:rPr/>
+              <a:t> : MVP en 6 mois, traction mesurable</a:t>
+            </a:r>
+          </a:p>
+          <a:p>
+            <a:pPr lvl="0" indent="0" marL="0">
+              <a:buNone/>
+            </a:pPr>
+            <a:r>
+              <a:rPr b="1"/>
+              <a:t>Prochaines étapes :</a:t>
+            </a:r>
+            <a:r>
+              <a:rPr/>
+              <a:t> 1. Finaliser MVP (dev en cours) 2. Tester avec 50 beta-testeurs (running clubs Paris) 3. Lancement public dans 3 mois</a:t>
+            </a:r>
+          </a:p>
+          <a:p>
+            <a:pPr lvl="0" indent="0" marL="0">
+              <a:buNone/>
+            </a:pPr>
+            <a:r>
+              <a:rPr b="1"/>
+              <a:t>Rejoignez-nous pour transformer le running en vraie compétition.</a:t>
+            </a:r>
+          </a:p>
+        </p:txBody>
+      </p:sp>
+    </p:spTree>
+  </p:cSld>
+</p:sld>
+</file>
+
+<file path=ppt/slides/slide21.xml><?xml version="1.0" encoding="utf-8"?>
+<p:sld xmlns:a="http://schemas.openxmlformats.org/drawingml/2006/main" xmlns:r="http://schemas.openxmlformats.org/officeDocument/2006/relationships" xmlns:p="http://schemas.openxmlformats.org/presentationml/2006/main">
+  <p:cSld>
+    <p:spTree>
+      <p:nvGrpSpPr>
+        <p:cNvPr id="1" name=""/>
+        <p:cNvGrpSpPr/>
+        <p:nvPr/>
+      </p:nvGrpSpPr>
+      <p:grpSpPr>
+        <a:xfrm>
+          <a:off x="0" y="0"/>
+          <a:ext cx="0" cy="0"/>
+          <a:chOff x="0" y="0"/>
+          <a:chExt cx="0" cy="0"/>
+        </a:xfrm>
+      </p:grpSpPr>
+      <p:sp>
+        <p:nvSpPr>
+          <p:cNvPr id="2" name="Title 1"/>
+          <p:cNvSpPr>
+            <a:spLocks noGrp="1"/>
+          </p:cNvSpPr>
+          <p:nvPr>
+            <p:ph type="title"/>
+          </p:nvPr>
+        </p:nvSpPr>
+        <p:spPr/>
+        <p:txBody>
+          <a:bodyPr/>
+          <a:lstStyle/>
+          <a:p>
+            <a:pPr lvl="0" indent="0" marL="0">
+              <a:buNone/>
+            </a:pPr>
+            <a:r>
+              <a:rPr/>
+              <a:t>🟦 Slide 20 - Phrase finale</a:t>
+            </a:r>
+          </a:p>
+        </p:txBody>
+      </p:sp>
+      <p:sp>
+        <p:nvSpPr>
+          <p:cNvPr id="3" name="Content Placeholder 2"/>
+          <p:cNvSpPr>
+            <a:spLocks noGrp="1"/>
+          </p:cNvSpPr>
+          <p:nvPr>
+            <p:ph idx="1"/>
+          </p:nvPr>
+        </p:nvSpPr>
+        <p:spPr/>
+        <p:txBody>
+          <a:bodyPr/>
+          <a:lstStyle/>
+          <a:p>
+            <a:pPr lvl="0" indent="0" marL="0">
+              <a:buNone/>
+            </a:pPr>
+            <a:r>
+              <a:rPr b="1"/>
+              <a:t>GeoRace</a:t>
+            </a:r>
+          </a:p>
+          <a:p>
+            <a:pPr lvl="0" indent="0" marL="1270000">
+              <a:buNone/>
+            </a:pPr>
+            <a:r>
+              <a:rPr sz="2000"/>
+              <a:t>Chaque course est un duel.</a:t>
+            </a:r>
+            <a:br/>
+            <a:r>
+              <a:rPr sz="2000"/>
+              <a:t>Chaque duel est une victoire ou une leçon.</a:t>
+            </a:r>
+            <a:br/>
+            <a:r>
+              <a:rPr sz="2000"/>
+              <a:t>La motivation ne vient pas du tracking.</a:t>
+            </a:r>
+            <a:br/>
+            <a:r>
+              <a:rPr sz="2000"/>
+              <a:t>Elle vient de la COMPÉTITION.</a:t>
+            </a:r>
+          </a:p>
+          <a:p>
+            <a:pPr lvl="0" indent="0" marL="0">
+              <a:buNone/>
+            </a:pPr>
+            <a:r>
+              <a:rPr b="1"/>
+              <a:t>Êtes-vous prêt à courir pour GAGNER ?</a:t>
+            </a:r>
+          </a:p>
+          <a:p>
+            <a:pPr lvl="0" indent="0" marL="0">
+              <a:buNone/>
+            </a:pPr>
+            <a:r>
+              <a:rPr/>
+              <a:t>🏁 </a:t>
+            </a:r>
+            <a:r>
+              <a:rPr b="1"/>
+              <a:t>GeoRace - Run. Race. Win.</a:t>
             </a:r>
           </a:p>
         </p:txBody>
@@ -4236,7 +4867,7 @@
             </a:pPr>
             <a:r>
               <a:rPr/>
-              <a:t>🟦 Slide 2 – Problème</a:t>
+              <a:t>🟦 Slide 2 - Le problème des apps actuelles</a:t>
             </a:r>
           </a:p>
         </p:txBody>
@@ -4261,44 +4892,61 @@
             </a:pPr>
             <a:r>
               <a:rPr b="1"/>
-              <a:t>Courir seul, une motivation en berne</a:t>
-            </a:r>
-          </a:p>
-          <a:p>
-            <a:pPr lvl="0"/>
-            <a:r>
-              <a:rPr/>
-              <a:t>De nombreux coureurs se sentent démotivés seuls</a:t>
-            </a:r>
-          </a:p>
-          <a:p>
-            <a:pPr lvl="0"/>
-            <a:r>
-              <a:rPr/>
-              <a:t>Manque de défi et d’interaction</a:t>
-            </a:r>
-          </a:p>
-          <a:p>
-            <a:pPr lvl="0"/>
-            <a:r>
-              <a:rPr/>
-              <a:t>Difficulté à mesurer ses progrès face à d’autres</a:t>
-            </a:r>
-          </a:p>
-          <a:p>
-            <a:pPr lvl="0"/>
-            <a:r>
-              <a:rPr/>
-              <a:t>Risque d’abandon des objectifs sportifs</a:t>
-            </a:r>
-          </a:p>
-          <a:p>
-            <a:pPr lvl="0" indent="0" marL="0">
-              <a:buNone/>
-            </a:pPr>
-            <a:r>
-              <a:rPr/>
-              <a:t>➡ Résultat : monotonie, perte de motivation, arrêt de la pratique</a:t>
+              <a:t>Pourquoi les coureurs s’ennuient sur Strava, Nike Run Club et Runkeeper</a:t>
+            </a:r>
+          </a:p>
+          <a:p>
+            <a:pPr lvl="0" indent="0" marL="0">
+              <a:buNone/>
+            </a:pPr>
+            <a:r>
+              <a:rPr/>
+              <a:t>❌ </a:t>
+            </a:r>
+            <a:r>
+              <a:rPr b="1"/>
+              <a:t>Compétition asynchrone</a:t>
+            </a:r>
+            <a:r>
+              <a:rPr/>
+              <a:t> : vous comparez vos temps à des performances passées ❌ </a:t>
+            </a:r>
+            <a:r>
+              <a:rPr b="1"/>
+              <a:t>Pas d’interaction réelle</a:t>
+            </a:r>
+            <a:r>
+              <a:rPr/>
+              <a:t> : vous êtes seul face à votre écran ❌ </a:t>
+            </a:r>
+            <a:r>
+              <a:rPr b="1"/>
+              <a:t>Segments fixes</a:t>
+            </a:r>
+            <a:r>
+              <a:rPr/>
+              <a:t> : toujours les mêmes parcours, aucune surprise ❌ </a:t>
+            </a:r>
+            <a:r>
+              <a:rPr b="1"/>
+              <a:t>Motivation en déclin</a:t>
+            </a:r>
+            <a:r>
+              <a:rPr/>
+              <a:t> : partager des stats ne crée pas d’excitation</a:t>
+            </a:r>
+          </a:p>
+          <a:p>
+            <a:pPr lvl="0" indent="0" marL="0">
+              <a:buNone/>
+            </a:pPr>
+            <a:r>
+              <a:rPr b="1"/>
+              <a:t>Résultat :</a:t>
+            </a:r>
+            <a:r>
+              <a:rPr/>
+              <a:t> 60% des utilisateurs abandonnent après 3 mois</a:t>
             </a:r>
           </a:p>
         </p:txBody>
@@ -4345,7 +4993,7 @@
             </a:pPr>
             <a:r>
               <a:rPr/>
-              <a:t>🟦 Slide 3 – Concept innovant</a:t>
+              <a:t>🟦 Slide 3 - Notre réponse : LE DUEL EN TEMPS RÉEL</a:t>
             </a:r>
           </a:p>
         </p:txBody>
@@ -4370,58 +5018,61 @@
             </a:pPr>
             <a:r>
               <a:rPr b="1"/>
-              <a:t>Duels en temps réel pour tous</a:t>
-            </a:r>
-          </a:p>
-          <a:p>
-            <a:pPr lvl="0" indent="0" marL="0">
-              <a:buNone/>
-            </a:pPr>
-            <a:r>
-              <a:rPr/>
-              <a:t>🏃 </a:t>
-            </a:r>
-            <a:r>
-              <a:rPr b="1"/>
-              <a:t>DUELS EN TEMPS RÉEL</a:t>
-            </a:r>
-            <a:r>
-              <a:rPr/>
-              <a:t> Affrontez d’autres coureurs à proximité dans des courses spontanées</a:t>
-            </a:r>
-          </a:p>
-          <a:p>
-            <a:pPr lvl="0" indent="0" marL="0">
-              <a:buNone/>
-            </a:pPr>
-            <a:r>
-              <a:rPr/>
-              <a:t>📍 </a:t>
-            </a:r>
-            <a:r>
-              <a:rPr b="1"/>
-              <a:t>POINT D’ARRIVÉE ÉQUITABLE</a:t>
-            </a:r>
-            <a:r>
-              <a:rPr/>
-              <a:t> Chaque duel se termine à un point équidistant pour tous les participants</a:t>
-            </a:r>
-          </a:p>
-          <a:p>
-            <a:pPr lvl="0" indent="0" marL="0">
-              <a:buNone/>
-            </a:pPr>
-            <a:r>
-              <a:rPr/>
-              <a:t>⚖️ </a:t>
-            </a:r>
-            <a:r>
-              <a:rPr b="1"/>
-              <a:t>COMPÉTITION JUSTE</a:t>
-            </a:r>
-            <a:r>
-              <a:rPr/>
-              <a:t> Système ELO garantit des matchs équilibrés quel que soit votre niveau</a:t>
+              <a:t>GeoRace = La seule app qui crée de vraies courses spontanées</a:t>
+            </a:r>
+          </a:p>
+          <a:p>
+            <a:pPr lvl="0" indent="0" marL="0">
+              <a:buNone/>
+            </a:pPr>
+            <a:r>
+              <a:rPr/>
+              <a:t>🎯 </a:t>
+            </a:r>
+            <a:r>
+              <a:rPr b="1"/>
+              <a:t>Détection instantanée</a:t>
+            </a:r>
+            <a:r>
+              <a:rPr/>
+              <a:t> : l’app repère les coureurs actifs près de vous ⚡ </a:t>
+            </a:r>
+            <a:r>
+              <a:rPr b="1"/>
+              <a:t>Défi immédiat</a:t>
+            </a:r>
+            <a:r>
+              <a:rPr/>
+              <a:t> : “Paul (ELO 1420) vous défie - Accepter?” 📍 </a:t>
+            </a:r>
+            <a:r>
+              <a:rPr b="1"/>
+              <a:t>Point équidistant</a:t>
+            </a:r>
+            <a:r>
+              <a:rPr/>
+              <a:t> : algorithme calcule un finish accessible à la même distance pour tous 🏁 </a:t>
+            </a:r>
+            <a:r>
+              <a:rPr b="1"/>
+              <a:t>Course en direct</a:t>
+            </a:r>
+            <a:r>
+              <a:rPr/>
+              <a:t> : départ synchronisé, positions live, arrivée simultanée</a:t>
+            </a:r>
+          </a:p>
+          <a:p>
+            <a:pPr lvl="0" indent="0" marL="0">
+              <a:buNone/>
+            </a:pPr>
+            <a:r>
+              <a:rPr b="1"/>
+              <a:t>LA DIFFÉRENCE :</a:t>
+            </a:r>
+            <a:r>
+              <a:rPr/>
+              <a:t> Ce n’est plus du tracking, c’est une vraie compétition !</a:t>
             </a:r>
           </a:p>
         </p:txBody>
@@ -4468,7 +5119,7 @@
             </a:pPr>
             <a:r>
               <a:rPr/>
-              <a:t>🟦 Slide 4 – Fonctionnement d’un duel</a:t>
+              <a:t>🟦 Slide 4 - Pourquoi le duel change tout</a:t>
             </a:r>
           </a:p>
         </p:txBody>
@@ -4493,46 +5144,77 @@
             </a:pPr>
             <a:r>
               <a:rPr b="1"/>
-              <a:t>3 étapes simples</a:t>
-            </a:r>
-          </a:p>
-          <a:p>
-            <a:pPr lvl="0" indent="0" marL="0">
-              <a:buNone/>
-            </a:pPr>
-            <a:r>
-              <a:rPr b="1"/>
-              <a:t>01 - DÉTECTION DES COUREURS</a:t>
-            </a:r>
-            <a:r>
-              <a:rPr/>
-              <a:t> Identification automatique des coureurs actifs à proximité</a:t>
-            </a:r>
-          </a:p>
-          <a:p>
-            <a:pPr lvl="0" indent="0" marL="0">
-              <a:buNone/>
-            </a:pPr>
-            <a:r>
-              <a:rPr b="1"/>
-              <a:t>02 - POINT D’ARRIVÉE ÉQUITABLE</a:t>
-            </a:r>
-            <a:r>
-              <a:rPr/>
-              <a:t> Calcul algorithmique d’un point accessible à distance ��gale pour tous</a:t>
-            </a:r>
-          </a:p>
-          <a:p>
-            <a:pPr lvl="0" indent="0" marL="0">
-              <a:buNone/>
-            </a:pPr>
-            <a:r>
-              <a:rPr b="1"/>
-              <a:t>03 - DÉPART SIMULTANÉ</a:t>
-            </a:r>
-            <a:r>
-              <a:rPr/>
-              <a:t> Compte à rebours synchronisé après acceptation mutuelle</a:t>
+              <a:t>L’adrénaline d’une vraie course, à chaque sortie</a:t>
+            </a:r>
+          </a:p>
+          <a:p>
+            <a:pPr lvl="0" indent="0" marL="0">
+              <a:buNone/>
+            </a:pPr>
+            <a:r>
+              <a:rPr b="1"/>
+              <a:t>Ce que ressent l’utilisateur :</a:t>
+            </a:r>
+          </a:p>
+          <a:p>
+            <a:pPr lvl="0" indent="-342900" marL="342900">
+              <a:buAutoNum type="arabicPeriod"/>
+            </a:pPr>
+            <a:r>
+              <a:rPr b="1"/>
+              <a:t>AVANT</a:t>
+            </a:r>
+            <a:r>
+              <a:rPr/>
+              <a:t> : “Je vais courir 30 minutes…” </a:t>
+            </a:r>
+            <a:r>
+              <a:rPr b="1"/>
+              <a:t>AVEC GEORACE</a:t>
+            </a:r>
+            <a:r>
+              <a:rPr/>
+              <a:t> : “Je vais AFFRONTER ce coureur que je vois au parc !”</a:t>
+            </a:r>
+          </a:p>
+          <a:p>
+            <a:pPr lvl="0" indent="-342900" marL="342900">
+              <a:buAutoNum type="arabicPeriod"/>
+            </a:pPr>
+            <a:r>
+              <a:rPr b="1"/>
+              <a:t>PENDANT</a:t>
+            </a:r>
+            <a:r>
+              <a:rPr/>
+              <a:t> : “Je suis à 500m du but, je le dépasse ou pas ?” → GPS live, distance restante, position de l’adversaire</a:t>
+            </a:r>
+          </a:p>
+          <a:p>
+            <a:pPr lvl="0" indent="-342900" marL="342900">
+              <a:buAutoNum type="arabicPeriod"/>
+            </a:pPr>
+            <a:r>
+              <a:rPr b="1"/>
+              <a:t>APRÈS</a:t>
+            </a:r>
+            <a:r>
+              <a:rPr/>
+              <a:t> : “+25 ELO, 1er sur 3 dans ma ville cette semaine !” → Gratification immédiate, envie de recommencer</a:t>
+            </a:r>
+          </a:p>
+          <a:p>
+            <a:pPr lvl="0" indent="0" marL="0">
+              <a:buNone/>
+            </a:pPr>
+            <a:r>
+              <a:rPr b="1"/>
+              <a:t>Strava vous dit combien vous avez couru.</a:t>
+            </a:r>
+            <a:br/>
+            <a:r>
+              <a:rPr b="1"/>
+              <a:t>GeoRace vous dit si vous avez GAGNÉ.</a:t>
             </a:r>
           </a:p>
         </p:txBody>
@@ -4579,7 +5261,7 @@
             </a:pPr>
             <a:r>
               <a:rPr/>
-              <a:t>🟦 Slide 5 – Un duel GeoRace</a:t>
+              <a:t>🟦 Slide 5 - Le point équidistant : notre innovation technique</a:t>
             </a:r>
           </a:p>
         </p:txBody>
@@ -4604,7 +5286,29 @@
             </a:pPr>
             <a:r>
               <a:rPr b="1"/>
-              <a:t>Scénario typique :</a:t>
+              <a:t>Pourquoi personne d’autre ne le fait</a:t>
+            </a:r>
+          </a:p>
+          <a:p>
+            <a:pPr lvl="0" indent="0" marL="0">
+              <a:buNone/>
+            </a:pPr>
+            <a:r>
+              <a:rPr b="1"/>
+              <a:t>Le problème des courses spontanées :</a:t>
+            </a:r>
+            <a:r>
+              <a:rPr/>
+              <a:t> - Si on court vers le même point → celui qui est plus proche gagne toujours - Si on court chacun son parcours → impossible de comparer équitablement</a:t>
+            </a:r>
+          </a:p>
+          <a:p>
+            <a:pPr lvl="0" indent="0" marL="0">
+              <a:buNone/>
+            </a:pPr>
+            <a:r>
+              <a:rPr b="1"/>
+              <a:t>Notre solution brevetable :</a:t>
             </a:r>
           </a:p>
           <a:p>
@@ -4613,11 +5317,11 @@
             </a:pPr>
             <a:r>
               <a:rPr b="1"/>
-              <a:t>Vous commencez votre course</a:t>
-            </a:r>
-            <a:r>
-              <a:rPr/>
-              <a:t> → l’app détecte 3 coureurs dans un rayon de 800m</a:t>
+              <a:t>Algorithme de géolocalisation</a:t>
+            </a:r>
+            <a:r>
+              <a:rPr/>
+              <a:t> : calcule un point accessible à distance ÉGALE pour tous</a:t>
             </a:r>
           </a:p>
           <a:p>
@@ -4626,11 +5330,11 @@
             </a:pPr>
             <a:r>
               <a:rPr b="1"/>
-              <a:t>Proposition de duel</a:t>
-            </a:r>
-            <a:r>
-              <a:rPr/>
-              <a:t> → notification “Paul (ELO 1420) vous défie”</a:t>
+              <a:t>Prise en compte du terrain</a:t>
+            </a:r>
+            <a:r>
+              <a:rPr/>
+              <a:t> : routes, chemins, zones interdites</a:t>
             </a:r>
           </a:p>
           <a:p>
@@ -4639,50 +5343,33 @@
             </a:pPr>
             <a:r>
               <a:rPr b="1"/>
-              <a:t>Vous acceptez</a:t>
-            </a:r>
-            <a:r>
-              <a:rPr/>
-              <a:t> → le système calcule un point d’arrivée à 1,2km pour chacun</a:t>
-            </a:r>
-          </a:p>
-          <a:p>
-            <a:pPr lvl="0" indent="-342900" marL="342900">
-              <a:buAutoNum type="arabicPeriod"/>
-            </a:pPr>
-            <a:r>
-              <a:rPr b="1"/>
-              <a:t>Départ dans 10 secondes</a:t>
-            </a:r>
-            <a:r>
-              <a:rPr/>
-              <a:t> → compte à rebours</a:t>
-            </a:r>
-          </a:p>
-          <a:p>
-            <a:pPr lvl="0" indent="-342900" marL="342900">
-              <a:buAutoNum type="arabicPeriod"/>
-            </a:pPr>
-            <a:r>
-              <a:rPr b="1"/>
-              <a:t>Course en direct</a:t>
-            </a:r>
-            <a:r>
-              <a:rPr/>
-              <a:t> → GPS vous guide, position de l’adversaire visible</a:t>
-            </a:r>
-          </a:p>
-          <a:p>
-            <a:pPr lvl="0" indent="-342900" marL="342900">
-              <a:buAutoNum type="arabicPeriod"/>
-            </a:pPr>
-            <a:r>
-              <a:rPr b="1"/>
-              <a:t>Arrivée</a:t>
-            </a:r>
-            <a:r>
-              <a:rPr/>
-              <a:t> → +25 ELO, badge “5 victoires consécutives” débloqué</a:t>
+              <a:t>Validation en temps réel</a:t>
+            </a:r>
+            <a:r>
+              <a:rPr/>
+              <a:t> : les coureurs voient le parcours avant d’accepter</a:t>
+            </a:r>
+          </a:p>
+          <a:p>
+            <a:pPr lvl="0" indent="0" marL="0">
+              <a:buNone/>
+            </a:pPr>
+            <a:r>
+              <a:rPr b="1"/>
+              <a:t>Résultat :</a:t>
+            </a:r>
+            <a:r>
+              <a:rPr/>
+              <a:t> Compétition 100% équitable, quelle que soit votre position de départ</a:t>
+            </a:r>
+          </a:p>
+          <a:p>
+            <a:pPr lvl="0" indent="0" marL="0">
+              <a:buNone/>
+            </a:pPr>
+            <a:r>
+              <a:rPr b="1"/>
+              <a:t>Aucun concurrent ne propose cela.</a:t>
             </a:r>
           </a:p>
         </p:txBody>
@@ -4729,7 +5416,7 @@
             </a:pPr>
             <a:r>
               <a:rPr/>
-              <a:t>🟦 Slide 6 – Aspect social</a:t>
+              <a:t>🟦 Slide 6 - Scénario utilisateur : Emma vs Strava</a:t>
             </a:r>
           </a:p>
         </p:txBody>
@@ -4754,46 +5441,54 @@
             </a:pPr>
             <a:r>
               <a:rPr b="1"/>
-              <a:t>Construisez une communauté de coureurs</a:t>
-            </a:r>
-          </a:p>
-          <a:p>
-            <a:pPr lvl="0" indent="0" marL="0">
-              <a:buNone/>
-            </a:pPr>
-            <a:r>
-              <a:rPr b="1"/>
-              <a:t>01 - MATCHMAKING ÉQUILIBRÉ</a:t>
-            </a:r>
-            <a:r>
-              <a:rPr/>
-              <a:t> Connexion automatique entre coureurs de niveaux similaires grâce à l’ELO</a:t>
-            </a:r>
-          </a:p>
-          <a:p>
-            <a:pPr lvl="0" indent="0" marL="0">
-              <a:buNone/>
-            </a:pPr>
-            <a:r>
-              <a:rPr b="1"/>
-              <a:t>02 - DISCUSSION ET PARTAGE</a:t>
-            </a:r>
-            <a:r>
-              <a:rPr/>
-              <a:t> Chat en direct, ajout d’amis, profils détaillés avec statistiques</a:t>
-            </a:r>
-          </a:p>
-          <a:p>
-            <a:pPr lvl="0" indent="0" marL="0">
-              <a:buNone/>
-            </a:pPr>
-            <a:r>
-              <a:rPr b="1"/>
-              <a:t>03 - ÉVÉNEMENTS COMMUNAUTAIRES</a:t>
-            </a:r>
-            <a:r>
-              <a:rPr/>
-              <a:t> Courses organisées, défis collectifs, ligues locales par ville/quartier</a:t>
+              <a:t>Pourquoi Emma (29 ans, 4 courses/semaine) quitte Strava pour GeoRace</a:t>
+            </a:r>
+          </a:p>
+          <a:p>
+            <a:pPr lvl="0" indent="0" marL="0">
+              <a:buNone/>
+            </a:pPr>
+            <a:r>
+              <a:rPr b="1"/>
+              <a:t>SUR STRAVA (avant) :</a:t>
+            </a:r>
+            <a:r>
+              <a:rPr/>
+              <a:t> - Lance l’app → court seule → partage son temps → 12 likes - “Mon meilleur temps sur ce segment : 8min23” - Motivation : ★★☆☆☆</a:t>
+            </a:r>
+          </a:p>
+          <a:p>
+            <a:pPr lvl="0" indent="0" marL="0">
+              <a:buNone/>
+            </a:pPr>
+            <a:r>
+              <a:rPr b="1"/>
+              <a:t>SUR GEORACE (maintenant) :</a:t>
+            </a:r>
+            <a:r>
+              <a:rPr/>
+              <a:t> - Lance l’app → “3 coureurs détectés à 600m” - Accepte le défi de Lucas (ELO 1395, proche de son niveau 1420) - Course de 1,8km vers un point au bord de la rivière - </a:t>
+            </a:r>
+            <a:r>
+              <a:rPr b="1"/>
+              <a:t>ELLE GAGNE de 12 secondes</a:t>
+            </a:r>
+            <a:r>
+              <a:rPr/>
+              <a:t> → +28 ELO, badge “5 victoires” - Motivation : ★★★★★</a:t>
+            </a:r>
+          </a:p>
+          <a:p>
+            <a:pPr lvl="0" indent="0" marL="0">
+              <a:buNone/>
+            </a:pPr>
+            <a:r>
+              <a:rPr b="1"/>
+              <a:t>CE QUI CHANGE :</a:t>
+            </a:r>
+            <a:r>
+              <a:rPr/>
+              <a:t> L’excitation d’une vraie compétition vs comparaison de chiffres</a:t>
             </a:r>
           </a:p>
         </p:txBody>
@@ -4840,7 +5535,7 @@
             </a:pPr>
             <a:r>
               <a:rPr/>
-              <a:t>🟦 Slide 7 – Système de classement ELO</a:t>
+              <a:t>🟦 Slide 7 - Pourquoi les utilisateurs nous rejoindront</a:t>
             </a:r>
           </a:p>
         </p:txBody>
@@ -4865,46 +5560,108 @@
             </a:pPr>
             <a:r>
               <a:rPr b="1"/>
-              <a:t>Compétition équitable et progression motivante</a:t>
-            </a:r>
-          </a:p>
-          <a:p>
-            <a:pPr lvl="0" indent="0" marL="0">
-              <a:buNone/>
-            </a:pPr>
-            <a:r>
-              <a:rPr b="1"/>
-              <a:t>01 - MATCHS ÉQUILIBRÉS</a:t>
-            </a:r>
-            <a:r>
-              <a:rPr/>
-              <a:t> Algorithme ELO vous oppose à des coureurs de niveau proche</a:t>
-            </a:r>
-          </a:p>
-          <a:p>
-            <a:pPr lvl="0" indent="0" marL="0">
-              <a:buNone/>
-            </a:pPr>
-            <a:r>
-              <a:rPr b="1"/>
-              <a:t>02 - PROGRESSION VISIBLE</a:t>
-            </a:r>
-            <a:r>
-              <a:rPr/>
-              <a:t> Suivez votre montée dans les classements (Bronze → Argent → Or → Platine)</a:t>
-            </a:r>
-          </a:p>
-          <a:p>
-            <a:pPr lvl="0" indent="0" marL="0">
-              <a:buNone/>
-            </a:pPr>
-            <a:r>
-              <a:rPr b="1"/>
-              <a:t>03 - RÉCOMPENSES ET BADGES</a:t>
-            </a:r>
-            <a:r>
-              <a:rPr/>
-              <a:t> Débloquez des achievements à chaque niveau atteint</a:t>
+              <a:t>ARGUMENTS CONCRETS POUR CONVAINCRE LES UTILISATEURS ACTIFS SUR D’AUTRES APPS</a:t>
+            </a:r>
+          </a:p>
+          <a:p>
+            <a:pPr lvl="0" indent="0" marL="0">
+              <a:buNone/>
+            </a:pPr>
+            <a:r>
+              <a:rPr b="1"/>
+              <a:t>1️⃣ DUEL INSTANTANÉ : L’ADRÉNALINE D’UNE VRAIE COURSE</a:t>
+            </a:r>
+            <a:r>
+              <a:rPr/>
+              <a:t> - Fini l’ennui de courir seul en comparant des chiffres - Compétition réelle, en temps réel, avec des adversaires proches - Gratification immédiate : “J’ai gagné !” au lieu de “J’ai fait 5km en 28min”</a:t>
+            </a:r>
+          </a:p>
+          <a:p>
+            <a:pPr lvl="0" indent="0" marL="0">
+              <a:buNone/>
+            </a:pPr>
+            <a:r>
+              <a:rPr b="1"/>
+              <a:t>2️⃣ PROGRESSION VISIBLE VIA ELO</a:t>
+            </a:r>
+            <a:r>
+              <a:rPr/>
+              <a:t> - Système de classement clair et motivant (comme les échecs) - Chaque victoire vous fait monter : Bronze → Argent → Or → Platine - Objectif tangible : “Je veux atteindre 1500 ELO ce mois-ci” - Contrairement à Strava : pas besoin de courir plus vite, juste de battre des adversaires de votre niveau</a:t>
+            </a:r>
+          </a:p>
+          <a:p>
+            <a:pPr lvl="0" indent="0" marL="0">
+              <a:buNone/>
+            </a:pPr>
+            <a:r>
+              <a:rPr b="1"/>
+              <a:t>3️⃣ FAIR PLAY GARANTI</a:t>
+            </a:r>
+            <a:r>
+              <a:rPr/>
+              <a:t> - Point d’arrivée équidistant : tout le monde parcourt la même distance - Matchmaking intelligent : oppositions équilibrées (pas de débutant vs expert) - Anti-triche robuste : détection automatique des tricheurs et bannissement - Justice sportive : vous gagnez si vous courez mieux, pas si vous trichez</a:t>
+            </a:r>
+          </a:p>
+          <a:p>
+            <a:pPr lvl="0" indent="0" marL="0">
+              <a:buNone/>
+            </a:pPr>
+            <a:r>
+              <a:rPr b="1"/>
+              <a:t>4️⃣ PRIVACY-FIRST : VIE PRIVÉE RESPECTÉE</a:t>
+            </a:r>
+            <a:r>
+              <a:rPr/>
+              <a:t> - Position GPS partagée UNIQUEMENT pendant les duels actifs - Pas de tracking permanent comme sur Strava (qui sait où vous habitez) - Mode anonyme : pas besoin de donner votre vraie identité - Contrôle total : bloquez des utilisateurs, limitez votre zone de confort</a:t>
+            </a:r>
+          </a:p>
+          <a:p>
+            <a:pPr lvl="0" indent="0" marL="0">
+              <a:buNone/>
+            </a:pPr>
+            <a:r>
+              <a:rPr b="1"/>
+              <a:t>5️⃣ MICRO-COMPÉTITIONS LOCALES</a:t>
+            </a:r>
+            <a:r>
+              <a:rPr/>
+              <a:t> - Affrontez vos voisins et collègues : “Top 10 de Paris 15e” - Tournois hebdomadaires dans votre quartier - Effet communauté : vous courez avec des gens de votre ville, pas des inconnus lointains</a:t>
+            </a:r>
+          </a:p>
+          <a:p>
+            <a:pPr lvl="0" indent="0" marL="0">
+              <a:buNone/>
+            </a:pPr>
+            <a:r>
+              <a:rPr b="1"/>
+              <a:t>6️⃣ GAIN DE STATUT SOCIAL GRÂCE AUX BADGES</a:t>
+            </a:r>
+            <a:r>
+              <a:rPr/>
+              <a:t> - Badges débloquables : “5 victoires d’affilée”, “Champion local”, “Tueur de géants” - Profil de compétiteur : montrez vos exploits, pas juste vos kilomètres - Chat et smack talk : créez des rivalités amicales</a:t>
+            </a:r>
+          </a:p>
+          <a:p>
+            <a:pPr lvl="0" indent="0" marL="0">
+              <a:buNone/>
+            </a:pPr>
+            <a:r>
+              <a:rPr b="1"/>
+              <a:t>➜ STRAVA VOUS DIT COMBIEN VOUS AVEZ COURU.</a:t>
+            </a:r>
+            <a:br/>
+            <a:r>
+              <a:rPr b="1"/>
+              <a:t>➜ GEORACE VOUS DIT SI VOUS AVEZ GAGNÉ.</a:t>
+            </a:r>
+          </a:p>
+          <a:p>
+            <a:pPr lvl="0" indent="0" marL="0">
+              <a:buNone/>
+            </a:pPr>
+            <a:r>
+              <a:rPr b="1"/>
+              <a:t>La motivation ne vient pas du tracking. Elle vient de la COMPÉTITION.</a:t>
             </a:r>
           </a:p>
         </p:txBody>
@@ -4951,7 +5708,7 @@
             </a:pPr>
             <a:r>
               <a:rPr/>
-              <a:t>🟦 Slide 8 – Bénéfices de GeoRace</a:t>
+              <a:t>🟦 Slide 8 - Fonctionnalités différenciantes : Ce qui nous distingue</a:t>
             </a:r>
           </a:p>
         </p:txBody>
@@ -4976,46 +5733,118 @@
             </a:pPr>
             <a:r>
               <a:rPr b="1"/>
-              <a:t>Plus qu’une app de running</a:t>
-            </a:r>
-          </a:p>
-          <a:p>
-            <a:pPr lvl="0" indent="0" marL="0">
-              <a:buNone/>
-            </a:pPr>
-            <a:r>
-              <a:rPr b="1"/>
-              <a:t>01 - MOTIVATION ACCRUE</a:t>
-            </a:r>
-            <a:r>
-              <a:rPr/>
-              <a:t> Chaque sortie devient un défi concret et excitant</a:t>
-            </a:r>
-          </a:p>
-          <a:p>
-            <a:pPr lvl="0" indent="0" marL="0">
-              <a:buNone/>
-            </a:pPr>
-            <a:r>
-              <a:rPr b="1"/>
-              <a:t>02 - AMÉLIORATION DES PERFORMANCES</a:t>
-            </a:r>
-            <a:r>
-              <a:rPr/>
-              <a:t> La compétition pousse naturellement au dépassement de soi</a:t>
-            </a:r>
-          </a:p>
-          <a:p>
-            <a:pPr lvl="0" indent="0" marL="0">
-              <a:buNone/>
-            </a:pPr>
-            <a:r>
-              <a:rPr b="1"/>
-              <a:t>03 - BIEN-ÊTRE SOCIAL</a:t>
-            </a:r>
-            <a:r>
-              <a:rPr/>
-              <a:t> Rencontrez et interagissez avec d’autres coureurs passionnés</a:t>
+              <a:t>NOS AVANTAGES UNIQUES</a:t>
+            </a:r>
+          </a:p>
+          <a:p>
+            <a:pPr lvl="0" indent="0" marL="0">
+              <a:buNone/>
+            </a:pPr>
+            <a:r>
+              <a:rPr/>
+              <a:t>🏁 </a:t>
+            </a:r>
+            <a:r>
+              <a:rPr b="1"/>
+              <a:t>DUEL EN TEMPS RÉEL AVEC FINISH ÉQUIDISTANT</a:t>
+            </a:r>
+            <a:r>
+              <a:rPr/>
+              <a:t> - Algorithme propriétaire : calcul d’un point d’arrivée équidistant pour tous - Garantie d’équité : chaque participant parcourt exactement la même distance - Aucun concurrent ne propose cette technologie</a:t>
+            </a:r>
+          </a:p>
+          <a:p>
+            <a:pPr lvl="0" indent="0" marL="0">
+              <a:buNone/>
+            </a:pPr>
+            <a:r>
+              <a:rPr/>
+              <a:t>🎯 </a:t>
+            </a:r>
+            <a:r>
+              <a:rPr b="1"/>
+              <a:t>MATCHMAKING ELO INTELLIGENT</a:t>
+            </a:r>
+            <a:r>
+              <a:rPr/>
+              <a:t> - Système de classement comme aux échecs - Oppositions équilibrées : adversaires de niveau similaire (±100 ELO) - Progression motivante : chaque victoire compte, chaque défaite enseigne</a:t>
+            </a:r>
+          </a:p>
+          <a:p>
+            <a:pPr lvl="0" indent="0" marL="0">
+              <a:buNone/>
+            </a:pPr>
+            <a:r>
+              <a:rPr/>
+              <a:t>🔒 </a:t>
+            </a:r>
+            <a:r>
+              <a:rPr b="1"/>
+              <a:t>RESPECT DE LA VIE PRIVÉE</a:t>
+            </a:r>
+            <a:r>
+              <a:rPr/>
+              <a:t> - Position GPS partagée UNIQUEMENT pendant les duels actifs - Pas de tracking permanent contrairement à Strava - Mode anonyme disponible : pseudonyme, pas d’identité réelle</a:t>
+            </a:r>
+          </a:p>
+          <a:p>
+            <a:pPr lvl="0" indent="0" marL="0">
+              <a:buNone/>
+            </a:pPr>
+            <a:r>
+              <a:rPr/>
+              <a:t>🛡️ </a:t>
+            </a:r>
+            <a:r>
+              <a:rPr b="1"/>
+              <a:t>SYSTÈME ANTI-TRICHE ROBUSTE</a:t>
+            </a:r>
+            <a:r>
+              <a:rPr/>
+              <a:t> - Détection automatique de vitesses anormales (&gt;18 km/h prolongé) - Analyse des patterns GPS : accélération impossible détectée - Signalement communautaire + vérification manuelle - Bannissement permanent des tricheurs</a:t>
+            </a:r>
+          </a:p>
+          <a:p>
+            <a:pPr lvl="0" indent="0" marL="0">
+              <a:buNone/>
+            </a:pPr>
+            <a:r>
+              <a:rPr/>
+              <a:t>🔐 </a:t>
+            </a:r>
+            <a:r>
+              <a:rPr b="1"/>
+              <a:t>SÉCURITÉ ET PROTECTION</a:t>
+            </a:r>
+            <a:r>
+              <a:rPr/>
+              <a:t> - Blocage d’utilisateurs indésirables - Zone de confort paramétrable : accepter duels uniquement dans votre périmètre - Alertes de sécurité si rythme cardiaque trop élevé (intégration montres connectées)</a:t>
+            </a:r>
+          </a:p>
+          <a:p>
+            <a:pPr lvl="0" indent="0" marL="0">
+              <a:buNone/>
+            </a:pPr>
+            <a:r>
+              <a:rPr/>
+              <a:t>👥 </a:t>
+            </a:r>
+            <a:r>
+              <a:rPr b="1"/>
+              <a:t>SOCIAL &amp; ENGAGEMENT</a:t>
+            </a:r>
+            <a:r>
+              <a:rPr/>
+              <a:t> - Profils de compétiteurs avec historique des duels - Chat en direct avant/après les courses - Badges et récompenses débloquables - Ligues locales et tournois hebdomadaires</a:t>
+            </a:r>
+          </a:p>
+          <a:p>
+            <a:pPr lvl="0" indent="0" marL="0">
+              <a:buNone/>
+            </a:pPr>
+            <a:r>
+              <a:rPr b="1"/>
+              <a:t>➜ Ces 6 piliers créent une expérience que nos concurrents ne peuvent pas copier</a:t>
             </a:r>
           </a:p>
         </p:txBody>

</xml_diff>